<commit_message>
Fix Preview ripple cut
</commit_message>
<xml_diff>
--- a/Documentation/Keymap.pptx
+++ b/Documentation/Keymap.pptx
@@ -197,7 +197,7 @@
           <a:p>
             <a:fld id="{D04F8CED-0623-C742-B972-F53D35E16E19}" type="datetimeFigureOut">
               <a:rPr lang="de-DE" smtClean="0"/>
-              <a:t>26.02.17</a:t>
+              <a:t>01.03.17</a:t>
             </a:fld>
             <a:endParaRPr lang="de-DE"/>
           </a:p>
@@ -680,7 +680,7 @@
           <a:p>
             <a:fld id="{A97692CC-6688-1145-811E-FE1ABB97A7A4}" type="datetimeFigureOut">
               <a:rPr lang="de-DE" smtClean="0"/>
-              <a:t>26.02.17</a:t>
+              <a:t>01.03.17</a:t>
             </a:fld>
             <a:endParaRPr lang="de-DE"/>
           </a:p>
@@ -845,7 +845,7 @@
           <a:p>
             <a:fld id="{A97692CC-6688-1145-811E-FE1ABB97A7A4}" type="datetimeFigureOut">
               <a:rPr lang="de-DE" smtClean="0"/>
-              <a:t>26.02.17</a:t>
+              <a:t>01.03.17</a:t>
             </a:fld>
             <a:endParaRPr lang="de-DE"/>
           </a:p>
@@ -1020,7 +1020,7 @@
           <a:p>
             <a:fld id="{A97692CC-6688-1145-811E-FE1ABB97A7A4}" type="datetimeFigureOut">
               <a:rPr lang="de-DE" smtClean="0"/>
-              <a:t>26.02.17</a:t>
+              <a:t>01.03.17</a:t>
             </a:fld>
             <a:endParaRPr lang="de-DE"/>
           </a:p>
@@ -1185,7 +1185,7 @@
           <a:p>
             <a:fld id="{A97692CC-6688-1145-811E-FE1ABB97A7A4}" type="datetimeFigureOut">
               <a:rPr lang="de-DE" smtClean="0"/>
-              <a:t>26.02.17</a:t>
+              <a:t>01.03.17</a:t>
             </a:fld>
             <a:endParaRPr lang="de-DE"/>
           </a:p>
@@ -1424,7 +1424,7 @@
           <a:p>
             <a:fld id="{A97692CC-6688-1145-811E-FE1ABB97A7A4}" type="datetimeFigureOut">
               <a:rPr lang="de-DE" smtClean="0"/>
-              <a:t>26.02.17</a:t>
+              <a:t>01.03.17</a:t>
             </a:fld>
             <a:endParaRPr lang="de-DE"/>
           </a:p>
@@ -1651,7 +1651,7 @@
           <a:p>
             <a:fld id="{A97692CC-6688-1145-811E-FE1ABB97A7A4}" type="datetimeFigureOut">
               <a:rPr lang="de-DE" smtClean="0"/>
-              <a:t>26.02.17</a:t>
+              <a:t>01.03.17</a:t>
             </a:fld>
             <a:endParaRPr lang="de-DE"/>
           </a:p>
@@ -2013,7 +2013,7 @@
           <a:p>
             <a:fld id="{A97692CC-6688-1145-811E-FE1ABB97A7A4}" type="datetimeFigureOut">
               <a:rPr lang="de-DE" smtClean="0"/>
-              <a:t>26.02.17</a:t>
+              <a:t>01.03.17</a:t>
             </a:fld>
             <a:endParaRPr lang="de-DE"/>
           </a:p>
@@ -2126,7 +2126,7 @@
           <a:p>
             <a:fld id="{A97692CC-6688-1145-811E-FE1ABB97A7A4}" type="datetimeFigureOut">
               <a:rPr lang="de-DE" smtClean="0"/>
-              <a:t>26.02.17</a:t>
+              <a:t>01.03.17</a:t>
             </a:fld>
             <a:endParaRPr lang="de-DE"/>
           </a:p>
@@ -2216,7 +2216,7 @@
           <a:p>
             <a:fld id="{A97692CC-6688-1145-811E-FE1ABB97A7A4}" type="datetimeFigureOut">
               <a:rPr lang="de-DE" smtClean="0"/>
-              <a:t>26.02.17</a:t>
+              <a:t>01.03.17</a:t>
             </a:fld>
             <a:endParaRPr lang="de-DE"/>
           </a:p>
@@ -2488,7 +2488,7 @@
           <a:p>
             <a:fld id="{A97692CC-6688-1145-811E-FE1ABB97A7A4}" type="datetimeFigureOut">
               <a:rPr lang="de-DE" smtClean="0"/>
-              <a:t>26.02.17</a:t>
+              <a:t>01.03.17</a:t>
             </a:fld>
             <a:endParaRPr lang="de-DE"/>
           </a:p>
@@ -2740,7 +2740,7 @@
           <a:p>
             <a:fld id="{A97692CC-6688-1145-811E-FE1ABB97A7A4}" type="datetimeFigureOut">
               <a:rPr lang="de-DE" smtClean="0"/>
-              <a:t>26.02.17</a:t>
+              <a:t>01.03.17</a:t>
             </a:fld>
             <a:endParaRPr lang="de-DE"/>
           </a:p>
@@ -2948,7 +2948,7 @@
           <a:p>
             <a:fld id="{A97692CC-6688-1145-811E-FE1ABB97A7A4}" type="datetimeFigureOut">
               <a:rPr lang="de-DE" smtClean="0"/>
-              <a:t>26.02.17</a:t>
+              <a:t>01.03.17</a:t>
             </a:fld>
             <a:endParaRPr lang="de-DE"/>
           </a:p>
@@ -3355,6 +3355,67 @@
       </p:grpSpPr>
       <p:sp>
         <p:nvSpPr>
+          <p:cNvPr id="288" name="Abgerundetes Rechteck 287"/>
+          <p:cNvSpPr/>
+          <p:nvPr/>
+        </p:nvSpPr>
+        <p:spPr>
+          <a:xfrm>
+            <a:off x="1297753" y="3765311"/>
+            <a:ext cx="495160" cy="483856"/>
+          </a:xfrm>
+          <a:prstGeom prst="roundRect">
+            <a:avLst>
+              <a:gd name="adj" fmla="val 8710"/>
+            </a:avLst>
+          </a:prstGeom>
+          <a:solidFill>
+            <a:schemeClr val="accent6">
+              <a:lumMod val="20000"/>
+              <a:lumOff val="80000"/>
+            </a:schemeClr>
+          </a:solidFill>
+          <a:ln>
+            <a:solidFill>
+              <a:schemeClr val="accent6">
+                <a:lumMod val="50000"/>
+              </a:schemeClr>
+            </a:solidFill>
+          </a:ln>
+        </p:spPr>
+        <p:style>
+          <a:lnRef idx="2">
+            <a:schemeClr val="accent1">
+              <a:shade val="50000"/>
+            </a:schemeClr>
+          </a:lnRef>
+          <a:fillRef idx="1">
+            <a:schemeClr val="accent1"/>
+          </a:fillRef>
+          <a:effectRef idx="0">
+            <a:schemeClr val="accent1"/>
+          </a:effectRef>
+          <a:fontRef idx="minor">
+            <a:schemeClr val="lt1"/>
+          </a:fontRef>
+        </p:style>
+        <p:txBody>
+          <a:bodyPr rtlCol="0" anchor="b"/>
+          <a:lstStyle/>
+          <a:p>
+            <a:endParaRPr lang="de-DE" sz="1000" dirty="0">
+              <a:solidFill>
+                <a:schemeClr val="tx1"/>
+              </a:solidFill>
+              <a:latin typeface="Helvetica Neue LT Std 67 Medium Condensed" charset="0"/>
+              <a:ea typeface="Helvetica Neue LT Std 67 Medium Condensed" charset="0"/>
+              <a:cs typeface="Helvetica Neue LT Std 67 Medium Condensed" charset="0"/>
+            </a:endParaRPr>
+          </a:p>
+        </p:txBody>
+      </p:sp>
+      <p:sp>
+        <p:nvSpPr>
           <p:cNvPr id="287" name="Abgerundetes Rechteck 286"/>
           <p:cNvSpPr/>
           <p:nvPr/>
@@ -13863,13 +13924,54 @@
       </p:sp>
       <p:sp>
         <p:nvSpPr>
-          <p:cNvPr id="200" name="Abgerundetes Rechteck 199"/>
+          <p:cNvPr id="201" name="Textfeld 200"/>
+          <p:cNvSpPr txBox="1"/>
+          <p:nvPr/>
+        </p:nvSpPr>
+        <p:spPr>
+          <a:xfrm>
+            <a:off x="1270548" y="4040765"/>
+            <a:ext cx="255198" cy="253916"/>
+          </a:xfrm>
+          <a:prstGeom prst="rect">
+            <a:avLst/>
+          </a:prstGeom>
+          <a:noFill/>
+          <a:ln>
+            <a:noFill/>
+          </a:ln>
+        </p:spPr>
+        <p:txBody>
+          <a:bodyPr wrap="none" rtlCol="0">
+            <a:spAutoFit/>
+          </a:bodyPr>
+          <a:lstStyle/>
+          <a:p>
+            <a:r>
+              <a:rPr lang="de-DE" sz="1050" dirty="0" smtClean="0">
+                <a:latin typeface="Helvetica Neue LT Std 67 Medium Condensed" charset="0"/>
+                <a:ea typeface="Helvetica Neue LT Std 67 Medium Condensed" charset="0"/>
+                <a:cs typeface="Helvetica Neue LT Std 67 Medium Condensed" charset="0"/>
+              </a:rPr>
+              <a:t>A</a:t>
+            </a:r>
+            <a:endParaRPr lang="de-DE" sz="1050" dirty="0">
+              <a:latin typeface="Helvetica Neue LT Std 67 Medium Condensed" charset="0"/>
+              <a:ea typeface="Helvetica Neue LT Std 67 Medium Condensed" charset="0"/>
+              <a:cs typeface="Helvetica Neue LT Std 67 Medium Condensed" charset="0"/>
+            </a:endParaRPr>
+          </a:p>
+        </p:txBody>
+      </p:sp>
+      <p:sp>
+        <p:nvSpPr>
+          <p:cNvPr id="202" name="Abgerundetes Rechteck 201"/>
           <p:cNvSpPr/>
           <p:nvPr/>
         </p:nvSpPr>
         <p:spPr>
           <a:xfrm>
-            <a:off x="1308573" y="3772794"/>
+            <a:off x="2517008" y="3772794"/>
             <a:ext cx="495160" cy="483856"/>
           </a:xfrm>
           <a:prstGeom prst="roundRect">
@@ -13921,14 +14023,14 @@
       </p:sp>
       <p:sp>
         <p:nvSpPr>
-          <p:cNvPr id="201" name="Textfeld 200"/>
+          <p:cNvPr id="203" name="Textfeld 202"/>
           <p:cNvSpPr txBox="1"/>
           <p:nvPr/>
         </p:nvSpPr>
         <p:spPr>
           <a:xfrm>
-            <a:off x="1270548" y="4040765"/>
-            <a:ext cx="255198" cy="253916"/>
+            <a:off x="2478983" y="4039579"/>
+            <a:ext cx="260008" cy="253916"/>
           </a:xfrm>
           <a:prstGeom prst="rect">
             <a:avLst/>
@@ -13950,7 +14052,7 @@
                 <a:ea typeface="Helvetica Neue LT Std 67 Medium Condensed" charset="0"/>
                 <a:cs typeface="Helvetica Neue LT Std 67 Medium Condensed" charset="0"/>
               </a:rPr>
-              <a:t>A</a:t>
+              <a:t>D</a:t>
             </a:r>
             <a:endParaRPr lang="de-DE" sz="1050" dirty="0">
               <a:latin typeface="Helvetica Neue LT Std 67 Medium Condensed" charset="0"/>
@@ -13962,13 +14064,13 @@
       </p:sp>
       <p:sp>
         <p:nvSpPr>
-          <p:cNvPr id="202" name="Abgerundetes Rechteck 201"/>
+          <p:cNvPr id="206" name="Abgerundetes Rechteck 205"/>
           <p:cNvSpPr/>
           <p:nvPr/>
         </p:nvSpPr>
         <p:spPr>
           <a:xfrm>
-            <a:off x="2517008" y="3772794"/>
+            <a:off x="4325984" y="3772794"/>
             <a:ext cx="495160" cy="483856"/>
           </a:xfrm>
           <a:prstGeom prst="roundRect">
@@ -14020,13 +14122,13 @@
       </p:sp>
       <p:sp>
         <p:nvSpPr>
-          <p:cNvPr id="203" name="Textfeld 202"/>
+          <p:cNvPr id="207" name="Textfeld 206"/>
           <p:cNvSpPr txBox="1"/>
           <p:nvPr/>
         </p:nvSpPr>
         <p:spPr>
           <a:xfrm>
-            <a:off x="2478983" y="4039579"/>
+            <a:off x="4287959" y="4029640"/>
             <a:ext cx="260008" cy="253916"/>
           </a:xfrm>
           <a:prstGeom prst="rect">
@@ -14049,7 +14151,7 @@
                 <a:ea typeface="Helvetica Neue LT Std 67 Medium Condensed" charset="0"/>
                 <a:cs typeface="Helvetica Neue LT Std 67 Medium Condensed" charset="0"/>
               </a:rPr>
-              <a:t>D</a:t>
+              <a:t>H</a:t>
             </a:r>
             <a:endParaRPr lang="de-DE" sz="1050" dirty="0">
               <a:latin typeface="Helvetica Neue LT Std 67 Medium Condensed" charset="0"/>
@@ -14061,13 +14163,13 @@
       </p:sp>
       <p:sp>
         <p:nvSpPr>
-          <p:cNvPr id="206" name="Abgerundetes Rechteck 205"/>
+          <p:cNvPr id="208" name="Abgerundetes Rechteck 207"/>
           <p:cNvSpPr/>
           <p:nvPr/>
         </p:nvSpPr>
         <p:spPr>
           <a:xfrm>
-            <a:off x="4325984" y="3772794"/>
+            <a:off x="4916820" y="3772794"/>
             <a:ext cx="495160" cy="483856"/>
           </a:xfrm>
           <a:prstGeom prst="roundRect">
@@ -14119,14 +14221,14 @@
       </p:sp>
       <p:sp>
         <p:nvSpPr>
-          <p:cNvPr id="207" name="Textfeld 206"/>
+          <p:cNvPr id="209" name="Textfeld 208"/>
           <p:cNvSpPr txBox="1"/>
           <p:nvPr/>
         </p:nvSpPr>
         <p:spPr>
           <a:xfrm>
-            <a:off x="4287959" y="4029640"/>
-            <a:ext cx="260008" cy="253916"/>
+            <a:off x="4878795" y="4027695"/>
+            <a:ext cx="243978" cy="253916"/>
           </a:xfrm>
           <a:prstGeom prst="rect">
             <a:avLst/>
@@ -14148,7 +14250,7 @@
                 <a:ea typeface="Helvetica Neue LT Std 67 Medium Condensed" charset="0"/>
                 <a:cs typeface="Helvetica Neue LT Std 67 Medium Condensed" charset="0"/>
               </a:rPr>
-              <a:t>H</a:t>
+              <a:t>J</a:t>
             </a:r>
             <a:endParaRPr lang="de-DE" sz="1050" dirty="0">
               <a:latin typeface="Helvetica Neue LT Std 67 Medium Condensed" charset="0"/>
@@ -14160,13 +14262,13 @@
       </p:sp>
       <p:sp>
         <p:nvSpPr>
-          <p:cNvPr id="208" name="Abgerundetes Rechteck 207"/>
+          <p:cNvPr id="210" name="Abgerundetes Rechteck 209"/>
           <p:cNvSpPr/>
           <p:nvPr/>
         </p:nvSpPr>
         <p:spPr>
           <a:xfrm>
-            <a:off x="4916820" y="3772794"/>
+            <a:off x="5516804" y="3772794"/>
             <a:ext cx="495160" cy="483856"/>
           </a:xfrm>
           <a:prstGeom prst="roundRect">
@@ -14218,14 +14320,14 @@
       </p:sp>
       <p:sp>
         <p:nvSpPr>
-          <p:cNvPr id="209" name="Textfeld 208"/>
+          <p:cNvPr id="211" name="Textfeld 210"/>
           <p:cNvSpPr txBox="1"/>
           <p:nvPr/>
         </p:nvSpPr>
         <p:spPr>
           <a:xfrm>
-            <a:off x="4878795" y="4027695"/>
-            <a:ext cx="243978" cy="253916"/>
+            <a:off x="5478779" y="4025956"/>
+            <a:ext cx="255198" cy="253916"/>
           </a:xfrm>
           <a:prstGeom prst="rect">
             <a:avLst/>
@@ -14247,7 +14349,7 @@
                 <a:ea typeface="Helvetica Neue LT Std 67 Medium Condensed" charset="0"/>
                 <a:cs typeface="Helvetica Neue LT Std 67 Medium Condensed" charset="0"/>
               </a:rPr>
-              <a:t>J</a:t>
+              <a:t>K</a:t>
             </a:r>
             <a:endParaRPr lang="de-DE" sz="1050" dirty="0">
               <a:latin typeface="Helvetica Neue LT Std 67 Medium Condensed" charset="0"/>
@@ -14259,13 +14361,13 @@
       </p:sp>
       <p:sp>
         <p:nvSpPr>
-          <p:cNvPr id="210" name="Abgerundetes Rechteck 209"/>
+          <p:cNvPr id="212" name="Abgerundetes Rechteck 211"/>
           <p:cNvSpPr/>
           <p:nvPr/>
         </p:nvSpPr>
         <p:spPr>
           <a:xfrm>
-            <a:off x="5516804" y="3772794"/>
+            <a:off x="6724413" y="3772794"/>
             <a:ext cx="495160" cy="483856"/>
           </a:xfrm>
           <a:prstGeom prst="roundRect">
@@ -14317,14 +14419,14 @@
       </p:sp>
       <p:sp>
         <p:nvSpPr>
-          <p:cNvPr id="211" name="Textfeld 210"/>
+          <p:cNvPr id="213" name="Textfeld 212"/>
           <p:cNvSpPr txBox="1"/>
           <p:nvPr/>
         </p:nvSpPr>
         <p:spPr>
           <a:xfrm>
-            <a:off x="5478779" y="4025956"/>
-            <a:ext cx="255198" cy="253916"/>
+            <a:off x="6686388" y="4038068"/>
+            <a:ext cx="260008" cy="253916"/>
           </a:xfrm>
           <a:prstGeom prst="rect">
             <a:avLst/>
@@ -14346,7 +14448,7 @@
                 <a:ea typeface="Helvetica Neue LT Std 67 Medium Condensed" charset="0"/>
                 <a:cs typeface="Helvetica Neue LT Std 67 Medium Condensed" charset="0"/>
               </a:rPr>
-              <a:t>K</a:t>
+              <a:t>Ö</a:t>
             </a:r>
             <a:endParaRPr lang="de-DE" sz="1050" dirty="0">
               <a:latin typeface="Helvetica Neue LT Std 67 Medium Condensed" charset="0"/>
@@ -14358,13 +14460,95 @@
       </p:sp>
       <p:sp>
         <p:nvSpPr>
-          <p:cNvPr id="212" name="Abgerundetes Rechteck 211"/>
+          <p:cNvPr id="215" name="Textfeld 214"/>
+          <p:cNvSpPr txBox="1"/>
+          <p:nvPr/>
+        </p:nvSpPr>
+        <p:spPr>
+          <a:xfrm>
+            <a:off x="7880176" y="4030871"/>
+            <a:ext cx="248786" cy="253916"/>
+          </a:xfrm>
+          <a:prstGeom prst="rect">
+            <a:avLst/>
+          </a:prstGeom>
+          <a:noFill/>
+          <a:ln>
+            <a:noFill/>
+          </a:ln>
+        </p:spPr>
+        <p:txBody>
+          <a:bodyPr wrap="none" rtlCol="0">
+            <a:spAutoFit/>
+          </a:bodyPr>
+          <a:lstStyle/>
+          <a:p>
+            <a:r>
+              <a:rPr lang="de-DE" sz="1050" dirty="0" smtClean="0">
+                <a:latin typeface="Helvetica Neue LT Std 67 Medium Condensed" charset="0"/>
+                <a:ea typeface="Helvetica Neue LT Std 67 Medium Condensed" charset="0"/>
+                <a:cs typeface="Helvetica Neue LT Std 67 Medium Condensed" charset="0"/>
+              </a:rPr>
+              <a:t>#</a:t>
+            </a:r>
+            <a:endParaRPr lang="de-DE" sz="1050" dirty="0">
+              <a:latin typeface="Helvetica Neue LT Std 67 Medium Condensed" charset="0"/>
+              <a:ea typeface="Helvetica Neue LT Std 67 Medium Condensed" charset="0"/>
+              <a:cs typeface="Helvetica Neue LT Std 67 Medium Condensed" charset="0"/>
+            </a:endParaRPr>
+          </a:p>
+        </p:txBody>
+      </p:sp>
+      <p:sp>
+        <p:nvSpPr>
+          <p:cNvPr id="221" name="Textfeld 220"/>
+          <p:cNvSpPr txBox="1"/>
+          <p:nvPr/>
+        </p:nvSpPr>
+        <p:spPr>
+          <a:xfrm>
+            <a:off x="3375987" y="4612399"/>
+            <a:ext cx="248786" cy="253916"/>
+          </a:xfrm>
+          <a:prstGeom prst="rect">
+            <a:avLst/>
+          </a:prstGeom>
+          <a:noFill/>
+          <a:ln>
+            <a:noFill/>
+          </a:ln>
+        </p:spPr>
+        <p:txBody>
+          <a:bodyPr wrap="none" rtlCol="0">
+            <a:spAutoFit/>
+          </a:bodyPr>
+          <a:lstStyle/>
+          <a:p>
+            <a:r>
+              <a:rPr lang="de-DE" sz="1050" dirty="0" smtClean="0">
+                <a:latin typeface="Helvetica Neue LT Std 67 Medium Condensed" charset="0"/>
+                <a:ea typeface="Helvetica Neue LT Std 67 Medium Condensed" charset="0"/>
+                <a:cs typeface="Helvetica Neue LT Std 67 Medium Condensed" charset="0"/>
+              </a:rPr>
+              <a:t>V</a:t>
+            </a:r>
+            <a:endParaRPr lang="de-DE" sz="1050" dirty="0">
+              <a:latin typeface="Helvetica Neue LT Std 67 Medium Condensed" charset="0"/>
+              <a:ea typeface="Helvetica Neue LT Std 67 Medium Condensed" charset="0"/>
+              <a:cs typeface="Helvetica Neue LT Std 67 Medium Condensed" charset="0"/>
+            </a:endParaRPr>
+          </a:p>
+        </p:txBody>
+      </p:sp>
+      <p:sp>
+        <p:nvSpPr>
+          <p:cNvPr id="222" name="Abgerundetes Rechteck 221"/>
           <p:cNvSpPr/>
           <p:nvPr/>
         </p:nvSpPr>
         <p:spPr>
           <a:xfrm>
-            <a:off x="6724413" y="3772794"/>
+            <a:off x="4020078" y="4346279"/>
             <a:ext cx="495160" cy="483856"/>
           </a:xfrm>
           <a:prstGeom prst="roundRect">
@@ -14416,14 +14600,14 @@
       </p:sp>
       <p:sp>
         <p:nvSpPr>
-          <p:cNvPr id="213" name="Textfeld 212"/>
+          <p:cNvPr id="223" name="Textfeld 222"/>
           <p:cNvSpPr txBox="1"/>
           <p:nvPr/>
         </p:nvSpPr>
         <p:spPr>
           <a:xfrm>
-            <a:off x="6686388" y="4038068"/>
-            <a:ext cx="260008" cy="253916"/>
+            <a:off x="3982053" y="4611491"/>
+            <a:ext cx="256802" cy="253916"/>
           </a:xfrm>
           <a:prstGeom prst="rect">
             <a:avLst/>
@@ -14445,7 +14629,7 @@
                 <a:ea typeface="Helvetica Neue LT Std 67 Medium Condensed" charset="0"/>
                 <a:cs typeface="Helvetica Neue LT Std 67 Medium Condensed" charset="0"/>
               </a:rPr>
-              <a:t>Ö</a:t>
+              <a:t>B</a:t>
             </a:r>
             <a:endParaRPr lang="de-DE" sz="1050" dirty="0">
               <a:latin typeface="Helvetica Neue LT Std 67 Medium Condensed" charset="0"/>
@@ -14457,95 +14641,13 @@
       </p:sp>
       <p:sp>
         <p:nvSpPr>
-          <p:cNvPr id="215" name="Textfeld 214"/>
-          <p:cNvSpPr txBox="1"/>
-          <p:nvPr/>
-        </p:nvSpPr>
-        <p:spPr>
-          <a:xfrm>
-            <a:off x="7880176" y="4030871"/>
-            <a:ext cx="248786" cy="253916"/>
-          </a:xfrm>
-          <a:prstGeom prst="rect">
-            <a:avLst/>
-          </a:prstGeom>
-          <a:noFill/>
-          <a:ln>
-            <a:noFill/>
-          </a:ln>
-        </p:spPr>
-        <p:txBody>
-          <a:bodyPr wrap="none" rtlCol="0">
-            <a:spAutoFit/>
-          </a:bodyPr>
-          <a:lstStyle/>
-          <a:p>
-            <a:r>
-              <a:rPr lang="de-DE" sz="1050" dirty="0" smtClean="0">
-                <a:latin typeface="Helvetica Neue LT Std 67 Medium Condensed" charset="0"/>
-                <a:ea typeface="Helvetica Neue LT Std 67 Medium Condensed" charset="0"/>
-                <a:cs typeface="Helvetica Neue LT Std 67 Medium Condensed" charset="0"/>
-              </a:rPr>
-              <a:t>#</a:t>
-            </a:r>
-            <a:endParaRPr lang="de-DE" sz="1050" dirty="0">
-              <a:latin typeface="Helvetica Neue LT Std 67 Medium Condensed" charset="0"/>
-              <a:ea typeface="Helvetica Neue LT Std 67 Medium Condensed" charset="0"/>
-              <a:cs typeface="Helvetica Neue LT Std 67 Medium Condensed" charset="0"/>
-            </a:endParaRPr>
-          </a:p>
-        </p:txBody>
-      </p:sp>
-      <p:sp>
-        <p:nvSpPr>
-          <p:cNvPr id="221" name="Textfeld 220"/>
-          <p:cNvSpPr txBox="1"/>
-          <p:nvPr/>
-        </p:nvSpPr>
-        <p:spPr>
-          <a:xfrm>
-            <a:off x="3375987" y="4612399"/>
-            <a:ext cx="248786" cy="253916"/>
-          </a:xfrm>
-          <a:prstGeom prst="rect">
-            <a:avLst/>
-          </a:prstGeom>
-          <a:noFill/>
-          <a:ln>
-            <a:noFill/>
-          </a:ln>
-        </p:spPr>
-        <p:txBody>
-          <a:bodyPr wrap="none" rtlCol="0">
-            <a:spAutoFit/>
-          </a:bodyPr>
-          <a:lstStyle/>
-          <a:p>
-            <a:r>
-              <a:rPr lang="de-DE" sz="1050" dirty="0" smtClean="0">
-                <a:latin typeface="Helvetica Neue LT Std 67 Medium Condensed" charset="0"/>
-                <a:ea typeface="Helvetica Neue LT Std 67 Medium Condensed" charset="0"/>
-                <a:cs typeface="Helvetica Neue LT Std 67 Medium Condensed" charset="0"/>
-              </a:rPr>
-              <a:t>V</a:t>
-            </a:r>
-            <a:endParaRPr lang="de-DE" sz="1050" dirty="0">
-              <a:latin typeface="Helvetica Neue LT Std 67 Medium Condensed" charset="0"/>
-              <a:ea typeface="Helvetica Neue LT Std 67 Medium Condensed" charset="0"/>
-              <a:cs typeface="Helvetica Neue LT Std 67 Medium Condensed" charset="0"/>
-            </a:endParaRPr>
-          </a:p>
-        </p:txBody>
-      </p:sp>
-      <p:sp>
-        <p:nvSpPr>
-          <p:cNvPr id="222" name="Abgerundetes Rechteck 221"/>
+          <p:cNvPr id="224" name="Abgerundetes Rechteck 223"/>
           <p:cNvSpPr/>
           <p:nvPr/>
         </p:nvSpPr>
         <p:spPr>
           <a:xfrm>
-            <a:off x="4020078" y="4346279"/>
+            <a:off x="4618087" y="4346279"/>
             <a:ext cx="495160" cy="483856"/>
           </a:xfrm>
           <a:prstGeom prst="roundRect">
@@ -14597,14 +14699,14 @@
       </p:sp>
       <p:sp>
         <p:nvSpPr>
-          <p:cNvPr id="223" name="Textfeld 222"/>
+          <p:cNvPr id="225" name="Textfeld 224"/>
           <p:cNvSpPr txBox="1"/>
           <p:nvPr/>
         </p:nvSpPr>
         <p:spPr>
           <a:xfrm>
-            <a:off x="3982053" y="4611491"/>
-            <a:ext cx="256802" cy="253916"/>
+            <a:off x="4580062" y="4609314"/>
+            <a:ext cx="261610" cy="253916"/>
           </a:xfrm>
           <a:prstGeom prst="rect">
             <a:avLst/>
@@ -14626,7 +14728,7 @@
                 <a:ea typeface="Helvetica Neue LT Std 67 Medium Condensed" charset="0"/>
                 <a:cs typeface="Helvetica Neue LT Std 67 Medium Condensed" charset="0"/>
               </a:rPr>
-              <a:t>B</a:t>
+              <a:t>N</a:t>
             </a:r>
             <a:endParaRPr lang="de-DE" sz="1050" dirty="0">
               <a:latin typeface="Helvetica Neue LT Std 67 Medium Condensed" charset="0"/>
@@ -14638,14 +14740,55 @@
       </p:sp>
       <p:sp>
         <p:nvSpPr>
-          <p:cNvPr id="224" name="Abgerundetes Rechteck 223"/>
+          <p:cNvPr id="227" name="Textfeld 226"/>
+          <p:cNvSpPr txBox="1"/>
+          <p:nvPr/>
+        </p:nvSpPr>
+        <p:spPr>
+          <a:xfrm>
+            <a:off x="6380654" y="4620694"/>
+            <a:ext cx="216726" cy="253916"/>
+          </a:xfrm>
+          <a:prstGeom prst="rect">
+            <a:avLst/>
+          </a:prstGeom>
+          <a:noFill/>
+          <a:ln>
+            <a:noFill/>
+          </a:ln>
+        </p:spPr>
+        <p:txBody>
+          <a:bodyPr wrap="none" rtlCol="0">
+            <a:spAutoFit/>
+          </a:bodyPr>
+          <a:lstStyle/>
+          <a:p>
+            <a:r>
+              <a:rPr lang="de-DE" sz="1050" dirty="0" smtClean="0">
+                <a:latin typeface="Helvetica Neue LT Std 67 Medium Condensed" charset="0"/>
+                <a:ea typeface="Helvetica Neue LT Std 67 Medium Condensed" charset="0"/>
+                <a:cs typeface="Helvetica Neue LT Std 67 Medium Condensed" charset="0"/>
+              </a:rPr>
+              <a:t>.</a:t>
+            </a:r>
+            <a:endParaRPr lang="de-DE" sz="1050" dirty="0">
+              <a:latin typeface="Helvetica Neue LT Std 67 Medium Condensed" charset="0"/>
+              <a:ea typeface="Helvetica Neue LT Std 67 Medium Condensed" charset="0"/>
+              <a:cs typeface="Helvetica Neue LT Std 67 Medium Condensed" charset="0"/>
+            </a:endParaRPr>
+          </a:p>
+        </p:txBody>
+      </p:sp>
+      <p:sp>
+        <p:nvSpPr>
+          <p:cNvPr id="230" name="Abgerundetes Rechteck 229"/>
           <p:cNvSpPr/>
           <p:nvPr/>
         </p:nvSpPr>
         <p:spPr>
           <a:xfrm>
-            <a:off x="4618087" y="4346279"/>
-            <a:ext cx="495160" cy="483856"/>
+            <a:off x="861232" y="4939926"/>
+            <a:ext cx="508273" cy="565152"/>
           </a:xfrm>
           <a:prstGeom prst="roundRect">
             <a:avLst>
@@ -14696,22 +14839,19 @@
       </p:sp>
       <p:sp>
         <p:nvSpPr>
-          <p:cNvPr id="225" name="Textfeld 224"/>
+          <p:cNvPr id="231" name="Textfeld 230"/>
           <p:cNvSpPr txBox="1"/>
           <p:nvPr/>
         </p:nvSpPr>
         <p:spPr>
           <a:xfrm>
-            <a:off x="4580062" y="4609314"/>
-            <a:ext cx="261610" cy="253916"/>
+            <a:off x="1056062" y="5237666"/>
+            <a:ext cx="352982" cy="253916"/>
           </a:xfrm>
           <a:prstGeom prst="rect">
             <a:avLst/>
           </a:prstGeom>
           <a:noFill/>
-          <a:ln>
-            <a:noFill/>
-          </a:ln>
         </p:spPr>
         <p:txBody>
           <a:bodyPr wrap="none" rtlCol="0">
@@ -14720,12 +14860,12 @@
           <a:lstStyle/>
           <a:p>
             <a:r>
-              <a:rPr lang="de-DE" sz="1050" dirty="0" smtClean="0">
-                <a:latin typeface="Helvetica Neue LT Std 67 Medium Condensed" charset="0"/>
-                <a:ea typeface="Helvetica Neue LT Std 67 Medium Condensed" charset="0"/>
-                <a:cs typeface="Helvetica Neue LT Std 67 Medium Condensed" charset="0"/>
-              </a:rPr>
-              <a:t>N</a:t>
+              <a:rPr lang="de-DE" sz="1050" dirty="0" err="1" smtClean="0">
+                <a:latin typeface="Helvetica Neue LT Std 67 Medium Condensed" charset="0"/>
+                <a:ea typeface="Helvetica Neue LT Std 67 Medium Condensed" charset="0"/>
+                <a:cs typeface="Helvetica Neue LT Std 67 Medium Condensed" charset="0"/>
+              </a:rPr>
+              <a:t>ctrl</a:t>
             </a:r>
             <a:endParaRPr lang="de-DE" sz="1050" dirty="0">
               <a:latin typeface="Helvetica Neue LT Std 67 Medium Condensed" charset="0"/>
@@ -14737,54 +14877,13 @@
       </p:sp>
       <p:sp>
         <p:nvSpPr>
-          <p:cNvPr id="227" name="Textfeld 226"/>
-          <p:cNvSpPr txBox="1"/>
-          <p:nvPr/>
-        </p:nvSpPr>
-        <p:spPr>
-          <a:xfrm>
-            <a:off x="6380654" y="4620694"/>
-            <a:ext cx="216726" cy="253916"/>
-          </a:xfrm>
-          <a:prstGeom prst="rect">
-            <a:avLst/>
-          </a:prstGeom>
-          <a:noFill/>
-          <a:ln>
-            <a:noFill/>
-          </a:ln>
-        </p:spPr>
-        <p:txBody>
-          <a:bodyPr wrap="none" rtlCol="0">
-            <a:spAutoFit/>
-          </a:bodyPr>
-          <a:lstStyle/>
-          <a:p>
-            <a:r>
-              <a:rPr lang="de-DE" sz="1050" dirty="0" smtClean="0">
-                <a:latin typeface="Helvetica Neue LT Std 67 Medium Condensed" charset="0"/>
-                <a:ea typeface="Helvetica Neue LT Std 67 Medium Condensed" charset="0"/>
-                <a:cs typeface="Helvetica Neue LT Std 67 Medium Condensed" charset="0"/>
-              </a:rPr>
-              <a:t>.</a:t>
-            </a:r>
-            <a:endParaRPr lang="de-DE" sz="1050" dirty="0">
-              <a:latin typeface="Helvetica Neue LT Std 67 Medium Condensed" charset="0"/>
-              <a:ea typeface="Helvetica Neue LT Std 67 Medium Condensed" charset="0"/>
-              <a:cs typeface="Helvetica Neue LT Std 67 Medium Condensed" charset="0"/>
-            </a:endParaRPr>
-          </a:p>
-        </p:txBody>
-      </p:sp>
-      <p:sp>
-        <p:nvSpPr>
-          <p:cNvPr id="230" name="Abgerundetes Rechteck 229"/>
+          <p:cNvPr id="232" name="Abgerundetes Rechteck 231"/>
           <p:cNvSpPr/>
           <p:nvPr/>
         </p:nvSpPr>
         <p:spPr>
           <a:xfrm>
-            <a:off x="861232" y="4939926"/>
+            <a:off x="268822" y="4939778"/>
             <a:ext cx="508273" cy="565152"/>
           </a:xfrm>
           <a:prstGeom prst="roundRect">
@@ -14836,14 +14935,14 @@
       </p:sp>
       <p:sp>
         <p:nvSpPr>
-          <p:cNvPr id="231" name="Textfeld 230"/>
+          <p:cNvPr id="233" name="Textfeld 232"/>
           <p:cNvSpPr txBox="1"/>
           <p:nvPr/>
         </p:nvSpPr>
         <p:spPr>
           <a:xfrm>
-            <a:off x="1056062" y="5237666"/>
-            <a:ext cx="352982" cy="253916"/>
+            <a:off x="463652" y="5237518"/>
+            <a:ext cx="285656" cy="253916"/>
           </a:xfrm>
           <a:prstGeom prst="rect">
             <a:avLst/>
@@ -14862,7 +14961,7 @@
                 <a:ea typeface="Helvetica Neue LT Std 67 Medium Condensed" charset="0"/>
                 <a:cs typeface="Helvetica Neue LT Std 67 Medium Condensed" charset="0"/>
               </a:rPr>
-              <a:t>ctrl</a:t>
+              <a:t>fn</a:t>
             </a:r>
             <a:endParaRPr lang="de-DE" sz="1050" dirty="0">
               <a:latin typeface="Helvetica Neue LT Std 67 Medium Condensed" charset="0"/>
@@ -14874,14 +14973,14 @@
       </p:sp>
       <p:sp>
         <p:nvSpPr>
-          <p:cNvPr id="232" name="Abgerundetes Rechteck 231"/>
+          <p:cNvPr id="234" name="Abgerundetes Rechteck 233"/>
           <p:cNvSpPr/>
           <p:nvPr/>
         </p:nvSpPr>
         <p:spPr>
           <a:xfrm>
-            <a:off x="268822" y="4939778"/>
-            <a:ext cx="508273" cy="565152"/>
+            <a:off x="268320" y="3772794"/>
+            <a:ext cx="940728" cy="483856"/>
           </a:xfrm>
           <a:prstGeom prst="roundRect">
             <a:avLst>
@@ -14932,52 +15031,55 @@
       </p:sp>
       <p:sp>
         <p:nvSpPr>
-          <p:cNvPr id="233" name="Textfeld 232"/>
+          <p:cNvPr id="235" name="Textfeld 234"/>
           <p:cNvSpPr txBox="1"/>
           <p:nvPr/>
         </p:nvSpPr>
         <p:spPr>
           <a:xfrm>
-            <a:off x="463652" y="5237518"/>
-            <a:ext cx="285656" cy="253916"/>
+            <a:off x="254068" y="3981582"/>
+            <a:ext cx="709352" cy="369332"/>
           </a:xfrm>
           <a:prstGeom prst="rect">
             <a:avLst/>
           </a:prstGeom>
           <a:noFill/>
-        </p:spPr>
-        <p:txBody>
-          <a:bodyPr wrap="none" rtlCol="0">
+          <a:ln>
+            <a:noFill/>
+          </a:ln>
+        </p:spPr>
+        <p:txBody>
+          <a:bodyPr wrap="square" rtlCol="0">
             <a:spAutoFit/>
           </a:bodyPr>
           <a:lstStyle/>
           <a:p>
             <a:r>
-              <a:rPr lang="de-DE" sz="1050" dirty="0" err="1" smtClean="0">
-                <a:latin typeface="Helvetica Neue LT Std 67 Medium Condensed" charset="0"/>
-                <a:ea typeface="Helvetica Neue LT Std 67 Medium Condensed" charset="0"/>
-                <a:cs typeface="Helvetica Neue LT Std 67 Medium Condensed" charset="0"/>
-              </a:rPr>
-              <a:t>fn</a:t>
-            </a:r>
-            <a:endParaRPr lang="de-DE" sz="1050" dirty="0">
-              <a:latin typeface="Helvetica Neue LT Std 67 Medium Condensed" charset="0"/>
-              <a:ea typeface="Helvetica Neue LT Std 67 Medium Condensed" charset="0"/>
-              <a:cs typeface="Helvetica Neue LT Std 67 Medium Condensed" charset="0"/>
-            </a:endParaRPr>
-          </a:p>
-        </p:txBody>
-      </p:sp>
-      <p:sp>
-        <p:nvSpPr>
-          <p:cNvPr id="234" name="Abgerundetes Rechteck 233"/>
+              <a:rPr lang="de-DE" dirty="0" smtClean="0">
+                <a:latin typeface="Helvetica Neue LT Std 67 Medium Condensed" charset="0"/>
+                <a:ea typeface="Helvetica Neue LT Std 67 Medium Condensed" charset="0"/>
+                <a:cs typeface="Helvetica Neue LT Std 67 Medium Condensed" charset="0"/>
+              </a:rPr>
+              <a:t>⇪</a:t>
+            </a:r>
+            <a:endParaRPr lang="de-DE" sz="700" dirty="0">
+              <a:latin typeface="Helvetica Neue LT Std 67 Medium Condensed" charset="0"/>
+              <a:ea typeface="Helvetica Neue LT Std 67 Medium Condensed" charset="0"/>
+              <a:cs typeface="Helvetica Neue LT Std 67 Medium Condensed" charset="0"/>
+            </a:endParaRPr>
+          </a:p>
+        </p:txBody>
+      </p:sp>
+      <p:sp>
+        <p:nvSpPr>
+          <p:cNvPr id="236" name="Abgerundetes Rechteck 235"/>
           <p:cNvSpPr/>
           <p:nvPr/>
         </p:nvSpPr>
         <p:spPr>
           <a:xfrm>
-            <a:off x="268320" y="3772794"/>
-            <a:ext cx="940728" cy="483856"/>
+            <a:off x="900827" y="2140413"/>
+            <a:ext cx="495160" cy="349570"/>
           </a:xfrm>
           <a:prstGeom prst="roundRect">
             <a:avLst>
@@ -15028,54 +15130,51 @@
       </p:sp>
       <p:sp>
         <p:nvSpPr>
-          <p:cNvPr id="235" name="Textfeld 234"/>
+          <p:cNvPr id="237" name="Textfeld 236"/>
           <p:cNvSpPr txBox="1"/>
           <p:nvPr/>
         </p:nvSpPr>
         <p:spPr>
           <a:xfrm>
-            <a:off x="254068" y="3981582"/>
-            <a:ext cx="709352" cy="369332"/>
+            <a:off x="862802" y="2321699"/>
+            <a:ext cx="282450" cy="215444"/>
           </a:xfrm>
           <a:prstGeom prst="rect">
             <a:avLst/>
           </a:prstGeom>
           <a:noFill/>
-          <a:ln>
-            <a:noFill/>
-          </a:ln>
-        </p:spPr>
-        <p:txBody>
-          <a:bodyPr wrap="square" rtlCol="0">
+        </p:spPr>
+        <p:txBody>
+          <a:bodyPr wrap="none" rtlCol="0">
             <a:spAutoFit/>
           </a:bodyPr>
           <a:lstStyle/>
           <a:p>
             <a:r>
-              <a:rPr lang="de-DE" dirty="0" smtClean="0">
-                <a:latin typeface="Helvetica Neue LT Std 67 Medium Condensed" charset="0"/>
-                <a:ea typeface="Helvetica Neue LT Std 67 Medium Condensed" charset="0"/>
-                <a:cs typeface="Helvetica Neue LT Std 67 Medium Condensed" charset="0"/>
-              </a:rPr>
-              <a:t>⇪</a:t>
-            </a:r>
-            <a:endParaRPr lang="de-DE" sz="700" dirty="0">
-              <a:latin typeface="Helvetica Neue LT Std 67 Medium Condensed" charset="0"/>
-              <a:ea typeface="Helvetica Neue LT Std 67 Medium Condensed" charset="0"/>
-              <a:cs typeface="Helvetica Neue LT Std 67 Medium Condensed" charset="0"/>
-            </a:endParaRPr>
-          </a:p>
-        </p:txBody>
-      </p:sp>
-      <p:sp>
-        <p:nvSpPr>
-          <p:cNvPr id="236" name="Abgerundetes Rechteck 235"/>
+              <a:rPr lang="de-DE" sz="800" dirty="0" smtClean="0">
+                <a:latin typeface="Helvetica Neue LT Std 67 Medium Condensed" charset="0"/>
+                <a:ea typeface="Helvetica Neue LT Std 67 Medium Condensed" charset="0"/>
+                <a:cs typeface="Helvetica Neue LT Std 67 Medium Condensed" charset="0"/>
+              </a:rPr>
+              <a:t>F1</a:t>
+            </a:r>
+            <a:endParaRPr lang="de-DE" sz="800" dirty="0">
+              <a:latin typeface="Helvetica Neue LT Std 67 Medium Condensed" charset="0"/>
+              <a:ea typeface="Helvetica Neue LT Std 67 Medium Condensed" charset="0"/>
+              <a:cs typeface="Helvetica Neue LT Std 67 Medium Condensed" charset="0"/>
+            </a:endParaRPr>
+          </a:p>
+        </p:txBody>
+      </p:sp>
+      <p:sp>
+        <p:nvSpPr>
+          <p:cNvPr id="238" name="Abgerundetes Rechteck 237"/>
           <p:cNvSpPr/>
           <p:nvPr/>
         </p:nvSpPr>
         <p:spPr>
           <a:xfrm>
-            <a:off x="900827" y="2140413"/>
+            <a:off x="1522612" y="2140413"/>
             <a:ext cx="495160" cy="349570"/>
           </a:xfrm>
           <a:prstGeom prst="roundRect">
@@ -15127,13 +15226,13 @@
       </p:sp>
       <p:sp>
         <p:nvSpPr>
-          <p:cNvPr id="237" name="Textfeld 236"/>
+          <p:cNvPr id="239" name="Textfeld 238"/>
           <p:cNvSpPr txBox="1"/>
           <p:nvPr/>
         </p:nvSpPr>
         <p:spPr>
           <a:xfrm>
-            <a:off x="862802" y="2321699"/>
+            <a:off x="1484587" y="2321072"/>
             <a:ext cx="282450" cy="215444"/>
           </a:xfrm>
           <a:prstGeom prst="rect">
@@ -15153,7 +15252,7 @@
                 <a:ea typeface="Helvetica Neue LT Std 67 Medium Condensed" charset="0"/>
                 <a:cs typeface="Helvetica Neue LT Std 67 Medium Condensed" charset="0"/>
               </a:rPr>
-              <a:t>F1</a:t>
+              <a:t>F2</a:t>
             </a:r>
             <a:endParaRPr lang="de-DE" sz="800" dirty="0">
               <a:latin typeface="Helvetica Neue LT Std 67 Medium Condensed" charset="0"/>
@@ -15165,13 +15264,13 @@
       </p:sp>
       <p:sp>
         <p:nvSpPr>
-          <p:cNvPr id="238" name="Abgerundetes Rechteck 237"/>
+          <p:cNvPr id="240" name="Abgerundetes Rechteck 239"/>
           <p:cNvSpPr/>
           <p:nvPr/>
         </p:nvSpPr>
         <p:spPr>
           <a:xfrm>
-            <a:off x="1522612" y="2140413"/>
+            <a:off x="2142616" y="2140413"/>
             <a:ext cx="495160" cy="349570"/>
           </a:xfrm>
           <a:prstGeom prst="roundRect">
@@ -15223,13 +15322,13 @@
       </p:sp>
       <p:sp>
         <p:nvSpPr>
-          <p:cNvPr id="239" name="Textfeld 238"/>
+          <p:cNvPr id="241" name="Textfeld 240"/>
           <p:cNvSpPr txBox="1"/>
           <p:nvPr/>
         </p:nvSpPr>
         <p:spPr>
           <a:xfrm>
-            <a:off x="1484587" y="2321072"/>
+            <a:off x="2104591" y="2326716"/>
             <a:ext cx="282450" cy="215444"/>
           </a:xfrm>
           <a:prstGeom prst="rect">
@@ -15249,7 +15348,7 @@
                 <a:ea typeface="Helvetica Neue LT Std 67 Medium Condensed" charset="0"/>
                 <a:cs typeface="Helvetica Neue LT Std 67 Medium Condensed" charset="0"/>
               </a:rPr>
-              <a:t>F2</a:t>
+              <a:t>F3</a:t>
             </a:r>
             <a:endParaRPr lang="de-DE" sz="800" dirty="0">
               <a:latin typeface="Helvetica Neue LT Std 67 Medium Condensed" charset="0"/>
@@ -15261,13 +15360,13 @@
       </p:sp>
       <p:sp>
         <p:nvSpPr>
-          <p:cNvPr id="240" name="Abgerundetes Rechteck 239"/>
+          <p:cNvPr id="242" name="Abgerundetes Rechteck 241"/>
           <p:cNvSpPr/>
           <p:nvPr/>
         </p:nvSpPr>
         <p:spPr>
           <a:xfrm>
-            <a:off x="2142616" y="2140413"/>
+            <a:off x="2760575" y="2140413"/>
             <a:ext cx="495160" cy="349570"/>
           </a:xfrm>
           <a:prstGeom prst="roundRect">
@@ -15319,13 +15418,13 @@
       </p:sp>
       <p:sp>
         <p:nvSpPr>
-          <p:cNvPr id="241" name="Textfeld 240"/>
+          <p:cNvPr id="243" name="Textfeld 242"/>
           <p:cNvSpPr txBox="1"/>
           <p:nvPr/>
         </p:nvSpPr>
         <p:spPr>
           <a:xfrm>
-            <a:off x="2104591" y="2326716"/>
+            <a:off x="2715876" y="2324714"/>
             <a:ext cx="282450" cy="215444"/>
           </a:xfrm>
           <a:prstGeom prst="rect">
@@ -15345,7 +15444,7 @@
                 <a:ea typeface="Helvetica Neue LT Std 67 Medium Condensed" charset="0"/>
                 <a:cs typeface="Helvetica Neue LT Std 67 Medium Condensed" charset="0"/>
               </a:rPr>
-              <a:t>F3</a:t>
+              <a:t>F4</a:t>
             </a:r>
             <a:endParaRPr lang="de-DE" sz="800" dirty="0">
               <a:latin typeface="Helvetica Neue LT Std 67 Medium Condensed" charset="0"/>
@@ -15357,13 +15456,13 @@
       </p:sp>
       <p:sp>
         <p:nvSpPr>
-          <p:cNvPr id="242" name="Abgerundetes Rechteck 241"/>
+          <p:cNvPr id="244" name="Abgerundetes Rechteck 243"/>
           <p:cNvSpPr/>
           <p:nvPr/>
         </p:nvSpPr>
         <p:spPr>
           <a:xfrm>
-            <a:off x="2760575" y="2140413"/>
+            <a:off x="3382265" y="2140413"/>
             <a:ext cx="495160" cy="349570"/>
           </a:xfrm>
           <a:prstGeom prst="roundRect">
@@ -15415,13 +15514,13 @@
       </p:sp>
       <p:sp>
         <p:nvSpPr>
-          <p:cNvPr id="243" name="Textfeld 242"/>
+          <p:cNvPr id="245" name="Textfeld 244"/>
           <p:cNvSpPr txBox="1"/>
           <p:nvPr/>
         </p:nvSpPr>
         <p:spPr>
           <a:xfrm>
-            <a:off x="2715876" y="2324714"/>
+            <a:off x="3350914" y="2323366"/>
             <a:ext cx="282450" cy="215444"/>
           </a:xfrm>
           <a:prstGeom prst="rect">
@@ -15441,7 +15540,7 @@
                 <a:ea typeface="Helvetica Neue LT Std 67 Medium Condensed" charset="0"/>
                 <a:cs typeface="Helvetica Neue LT Std 67 Medium Condensed" charset="0"/>
               </a:rPr>
-              <a:t>F4</a:t>
+              <a:t>F5</a:t>
             </a:r>
             <a:endParaRPr lang="de-DE" sz="800" dirty="0">
               <a:latin typeface="Helvetica Neue LT Std 67 Medium Condensed" charset="0"/>
@@ -15453,13 +15552,13 @@
       </p:sp>
       <p:sp>
         <p:nvSpPr>
-          <p:cNvPr id="244" name="Abgerundetes Rechteck 243"/>
+          <p:cNvPr id="246" name="Abgerundetes Rechteck 245"/>
           <p:cNvSpPr/>
           <p:nvPr/>
         </p:nvSpPr>
         <p:spPr>
           <a:xfrm>
-            <a:off x="3382265" y="2140413"/>
+            <a:off x="3994850" y="2140413"/>
             <a:ext cx="495160" cy="349570"/>
           </a:xfrm>
           <a:prstGeom prst="roundRect">
@@ -15511,13 +15610,13 @@
       </p:sp>
       <p:sp>
         <p:nvSpPr>
-          <p:cNvPr id="245" name="Textfeld 244"/>
+          <p:cNvPr id="247" name="Textfeld 246"/>
           <p:cNvSpPr txBox="1"/>
           <p:nvPr/>
         </p:nvSpPr>
         <p:spPr>
           <a:xfrm>
-            <a:off x="3350914" y="2323366"/>
+            <a:off x="3956825" y="2323144"/>
             <a:ext cx="282450" cy="215444"/>
           </a:xfrm>
           <a:prstGeom prst="rect">
@@ -15537,7 +15636,7 @@
                 <a:ea typeface="Helvetica Neue LT Std 67 Medium Condensed" charset="0"/>
                 <a:cs typeface="Helvetica Neue LT Std 67 Medium Condensed" charset="0"/>
               </a:rPr>
-              <a:t>F5</a:t>
+              <a:t>F6</a:t>
             </a:r>
             <a:endParaRPr lang="de-DE" sz="800" dirty="0">
               <a:latin typeface="Helvetica Neue LT Std 67 Medium Condensed" charset="0"/>
@@ -15549,13 +15648,13 @@
       </p:sp>
       <p:sp>
         <p:nvSpPr>
-          <p:cNvPr id="246" name="Abgerundetes Rechteck 245"/>
+          <p:cNvPr id="248" name="Abgerundetes Rechteck 247"/>
           <p:cNvSpPr/>
           <p:nvPr/>
         </p:nvSpPr>
         <p:spPr>
           <a:xfrm>
-            <a:off x="3994850" y="2140413"/>
+            <a:off x="7111064" y="2140413"/>
             <a:ext cx="495160" cy="349570"/>
           </a:xfrm>
           <a:prstGeom prst="roundRect">
@@ -15607,14 +15706,14 @@
       </p:sp>
       <p:sp>
         <p:nvSpPr>
-          <p:cNvPr id="247" name="Textfeld 246"/>
+          <p:cNvPr id="249" name="Textfeld 248"/>
           <p:cNvSpPr txBox="1"/>
           <p:nvPr/>
         </p:nvSpPr>
         <p:spPr>
           <a:xfrm>
-            <a:off x="3956825" y="2323144"/>
-            <a:ext cx="282450" cy="215444"/>
+            <a:off x="7073039" y="2323144"/>
+            <a:ext cx="332142" cy="215444"/>
           </a:xfrm>
           <a:prstGeom prst="rect">
             <a:avLst/>
@@ -15633,7 +15732,7 @@
                 <a:ea typeface="Helvetica Neue LT Std 67 Medium Condensed" charset="0"/>
                 <a:cs typeface="Helvetica Neue LT Std 67 Medium Condensed" charset="0"/>
               </a:rPr>
-              <a:t>F6</a:t>
+              <a:t>F11</a:t>
             </a:r>
             <a:endParaRPr lang="de-DE" sz="800" dirty="0">
               <a:latin typeface="Helvetica Neue LT Std 67 Medium Condensed" charset="0"/>
@@ -15645,13 +15744,13 @@
       </p:sp>
       <p:sp>
         <p:nvSpPr>
-          <p:cNvPr id="248" name="Abgerundetes Rechteck 247"/>
+          <p:cNvPr id="250" name="Abgerundetes Rechteck 249"/>
           <p:cNvSpPr/>
           <p:nvPr/>
         </p:nvSpPr>
         <p:spPr>
           <a:xfrm>
-            <a:off x="7111064" y="2140413"/>
+            <a:off x="7737683" y="2140413"/>
             <a:ext cx="495160" cy="349570"/>
           </a:xfrm>
           <a:prstGeom prst="roundRect">
@@ -15703,13 +15802,13 @@
       </p:sp>
       <p:sp>
         <p:nvSpPr>
-          <p:cNvPr id="249" name="Textfeld 248"/>
+          <p:cNvPr id="251" name="Textfeld 250"/>
           <p:cNvSpPr txBox="1"/>
           <p:nvPr/>
         </p:nvSpPr>
         <p:spPr>
           <a:xfrm>
-            <a:off x="7073039" y="2323144"/>
+            <a:off x="7699658" y="2322724"/>
             <a:ext cx="332142" cy="215444"/>
           </a:xfrm>
           <a:prstGeom prst="rect">
@@ -15729,7 +15828,7 @@
                 <a:ea typeface="Helvetica Neue LT Std 67 Medium Condensed" charset="0"/>
                 <a:cs typeface="Helvetica Neue LT Std 67 Medium Condensed" charset="0"/>
               </a:rPr>
-              <a:t>F11</a:t>
+              <a:t>F12</a:t>
             </a:r>
             <a:endParaRPr lang="de-DE" sz="800" dirty="0">
               <a:latin typeface="Helvetica Neue LT Std 67 Medium Condensed" charset="0"/>
@@ -15741,13 +15840,13 @@
       </p:sp>
       <p:sp>
         <p:nvSpPr>
-          <p:cNvPr id="250" name="Abgerundetes Rechteck 249"/>
+          <p:cNvPr id="252" name="Abgerundetes Rechteck 251"/>
           <p:cNvSpPr/>
           <p:nvPr/>
         </p:nvSpPr>
         <p:spPr>
           <a:xfrm>
-            <a:off x="7737683" y="2140413"/>
+            <a:off x="8353581" y="2140413"/>
             <a:ext cx="495160" cy="349570"/>
           </a:xfrm>
           <a:prstGeom prst="roundRect">
@@ -15799,14 +15898,14 @@
       </p:sp>
       <p:sp>
         <p:nvSpPr>
-          <p:cNvPr id="251" name="Textfeld 250"/>
+          <p:cNvPr id="253" name="Textfeld 252"/>
           <p:cNvSpPr txBox="1"/>
           <p:nvPr/>
         </p:nvSpPr>
         <p:spPr>
           <a:xfrm>
-            <a:off x="7699658" y="2322724"/>
-            <a:ext cx="332142" cy="215444"/>
+            <a:off x="8295533" y="2314271"/>
+            <a:ext cx="251992" cy="215444"/>
           </a:xfrm>
           <a:prstGeom prst="rect">
             <a:avLst/>
@@ -15820,31 +15919,31 @@
           <a:lstStyle/>
           <a:p>
             <a:r>
-              <a:rPr lang="de-DE" sz="800" dirty="0" smtClean="0">
-                <a:latin typeface="Helvetica Neue LT Std 67 Medium Condensed" charset="0"/>
-                <a:ea typeface="Helvetica Neue LT Std 67 Medium Condensed" charset="0"/>
-                <a:cs typeface="Helvetica Neue LT Std 67 Medium Condensed" charset="0"/>
-              </a:rPr>
-              <a:t>F12</a:t>
-            </a:r>
-            <a:endParaRPr lang="de-DE" sz="800" dirty="0">
-              <a:latin typeface="Helvetica Neue LT Std 67 Medium Condensed" charset="0"/>
-              <a:ea typeface="Helvetica Neue LT Std 67 Medium Condensed" charset="0"/>
-              <a:cs typeface="Helvetica Neue LT Std 67 Medium Condensed" charset="0"/>
-            </a:endParaRPr>
-          </a:p>
-        </p:txBody>
-      </p:sp>
-      <p:sp>
-        <p:nvSpPr>
-          <p:cNvPr id="252" name="Abgerundetes Rechteck 251"/>
+              <a:rPr lang="de-DE" sz="800" b="1" dirty="0" smtClean="0">
+                <a:latin typeface="Helvetica Neue LT Std 67 Medium Condensed" charset="0"/>
+                <a:ea typeface="Helvetica Neue LT Std 67 Medium Condensed" charset="0"/>
+                <a:cs typeface="Helvetica Neue LT Std 67 Medium Condensed" charset="0"/>
+              </a:rPr>
+              <a:t>⌽</a:t>
+            </a:r>
+            <a:endParaRPr lang="de-DE" sz="800" b="1" dirty="0">
+              <a:latin typeface="Helvetica Neue LT Std 67 Medium Condensed" charset="0"/>
+              <a:ea typeface="Helvetica Neue LT Std 67 Medium Condensed" charset="0"/>
+              <a:cs typeface="Helvetica Neue LT Std 67 Medium Condensed" charset="0"/>
+            </a:endParaRPr>
+          </a:p>
+        </p:txBody>
+      </p:sp>
+      <p:sp>
+        <p:nvSpPr>
+          <p:cNvPr id="254" name="Abgerundetes Rechteck 253"/>
           <p:cNvSpPr/>
           <p:nvPr/>
         </p:nvSpPr>
         <p:spPr>
           <a:xfrm>
-            <a:off x="8353581" y="2140413"/>
-            <a:ext cx="495160" cy="349570"/>
+            <a:off x="6566843" y="3174834"/>
+            <a:ext cx="495160" cy="483856"/>
           </a:xfrm>
           <a:prstGeom prst="roundRect">
             <a:avLst>
@@ -15852,11 +15951,14 @@
             </a:avLst>
           </a:prstGeom>
           <a:solidFill>
-            <a:schemeClr val="bg1"/>
+            <a:schemeClr val="accent6">
+              <a:lumMod val="20000"/>
+              <a:lumOff val="80000"/>
+            </a:schemeClr>
           </a:solidFill>
           <a:ln>
             <a:solidFill>
-              <a:schemeClr val="bg1">
+              <a:schemeClr val="accent6">
                 <a:lumMod val="50000"/>
               </a:schemeClr>
             </a:solidFill>
@@ -15895,105 +15997,6 @@
       </p:sp>
       <p:sp>
         <p:nvSpPr>
-          <p:cNvPr id="253" name="Textfeld 252"/>
-          <p:cNvSpPr txBox="1"/>
-          <p:nvPr/>
-        </p:nvSpPr>
-        <p:spPr>
-          <a:xfrm>
-            <a:off x="8295533" y="2314271"/>
-            <a:ext cx="251992" cy="215444"/>
-          </a:xfrm>
-          <a:prstGeom prst="rect">
-            <a:avLst/>
-          </a:prstGeom>
-          <a:noFill/>
-        </p:spPr>
-        <p:txBody>
-          <a:bodyPr wrap="none" rtlCol="0">
-            <a:spAutoFit/>
-          </a:bodyPr>
-          <a:lstStyle/>
-          <a:p>
-            <a:r>
-              <a:rPr lang="de-DE" sz="800" b="1" dirty="0" smtClean="0">
-                <a:latin typeface="Helvetica Neue LT Std 67 Medium Condensed" charset="0"/>
-                <a:ea typeface="Helvetica Neue LT Std 67 Medium Condensed" charset="0"/>
-                <a:cs typeface="Helvetica Neue LT Std 67 Medium Condensed" charset="0"/>
-              </a:rPr>
-              <a:t>⌽</a:t>
-            </a:r>
-            <a:endParaRPr lang="de-DE" sz="800" b="1" dirty="0">
-              <a:latin typeface="Helvetica Neue LT Std 67 Medium Condensed" charset="0"/>
-              <a:ea typeface="Helvetica Neue LT Std 67 Medium Condensed" charset="0"/>
-              <a:cs typeface="Helvetica Neue LT Std 67 Medium Condensed" charset="0"/>
-            </a:endParaRPr>
-          </a:p>
-        </p:txBody>
-      </p:sp>
-      <p:sp>
-        <p:nvSpPr>
-          <p:cNvPr id="254" name="Abgerundetes Rechteck 253"/>
-          <p:cNvSpPr/>
-          <p:nvPr/>
-        </p:nvSpPr>
-        <p:spPr>
-          <a:xfrm>
-            <a:off x="6566843" y="3174834"/>
-            <a:ext cx="495160" cy="483856"/>
-          </a:xfrm>
-          <a:prstGeom prst="roundRect">
-            <a:avLst>
-              <a:gd name="adj" fmla="val 8710"/>
-            </a:avLst>
-          </a:prstGeom>
-          <a:solidFill>
-            <a:schemeClr val="accent6">
-              <a:lumMod val="20000"/>
-              <a:lumOff val="80000"/>
-            </a:schemeClr>
-          </a:solidFill>
-          <a:ln>
-            <a:solidFill>
-              <a:schemeClr val="accent6">
-                <a:lumMod val="50000"/>
-              </a:schemeClr>
-            </a:solidFill>
-          </a:ln>
-        </p:spPr>
-        <p:style>
-          <a:lnRef idx="2">
-            <a:schemeClr val="accent1">
-              <a:shade val="50000"/>
-            </a:schemeClr>
-          </a:lnRef>
-          <a:fillRef idx="1">
-            <a:schemeClr val="accent1"/>
-          </a:fillRef>
-          <a:effectRef idx="0">
-            <a:schemeClr val="accent1"/>
-          </a:effectRef>
-          <a:fontRef idx="minor">
-            <a:schemeClr val="lt1"/>
-          </a:fontRef>
-        </p:style>
-        <p:txBody>
-          <a:bodyPr rtlCol="0" anchor="b"/>
-          <a:lstStyle/>
-          <a:p>
-            <a:endParaRPr lang="de-DE" sz="1000" dirty="0">
-              <a:solidFill>
-                <a:schemeClr val="tx1"/>
-              </a:solidFill>
-              <a:latin typeface="Helvetica Neue LT Std 67 Medium Condensed" charset="0"/>
-              <a:ea typeface="Helvetica Neue LT Std 67 Medium Condensed" charset="0"/>
-              <a:cs typeface="Helvetica Neue LT Std 67 Medium Condensed" charset="0"/>
-            </a:endParaRPr>
-          </a:p>
-        </p:txBody>
-      </p:sp>
-      <p:sp>
-        <p:nvSpPr>
           <p:cNvPr id="195" name="Textfeld 194"/>
           <p:cNvSpPr txBox="1"/>
           <p:nvPr/>
@@ -16041,7 +16044,7 @@
         </p:nvSpPr>
         <p:spPr>
           <a:xfrm>
-            <a:off x="6665998" y="3436679"/>
+            <a:off x="1389833" y="3782484"/>
             <a:ext cx="447558" cy="220573"/>
           </a:xfrm>
           <a:prstGeom prst="rect">
@@ -18143,19 +18146,6 @@
               </a:rPr>
               <a:t>Add Stretch</a:t>
             </a:r>
-            <a:r>
-              <a:rPr lang="de-DE" sz="500" dirty="0" smtClean="0">
-                <a:solidFill>
-                  <a:schemeClr val="accent2">
-                    <a:lumMod val="75000"/>
-                  </a:schemeClr>
-                </a:solidFill>
-                <a:latin typeface="Helvetica Neue LT Std 67 Medium Condensed" charset="0"/>
-                <a:ea typeface="Helvetica Neue LT Std 67 Medium Condensed" charset="0"/>
-                <a:cs typeface="Helvetica Neue LT Std 67 Medium Condensed" charset="0"/>
-              </a:rPr>
-              <a:t/>
-            </a:r>
             <a:br>
               <a:rPr lang="de-DE" sz="500" dirty="0" smtClean="0">
                 <a:solidFill>
@@ -18182,6 +18172,109 @@
               <a:t> Marker</a:t>
             </a:r>
             <a:endParaRPr lang="de-DE" sz="500" dirty="0"/>
+          </a:p>
+        </p:txBody>
+      </p:sp>
+      <p:sp>
+        <p:nvSpPr>
+          <p:cNvPr id="289" name="Rechteck 288"/>
+          <p:cNvSpPr/>
+          <p:nvPr/>
+        </p:nvSpPr>
+        <p:spPr>
+          <a:xfrm>
+            <a:off x="6653555" y="3432354"/>
+            <a:ext cx="457176" cy="223779"/>
+          </a:xfrm>
+          <a:prstGeom prst="rect">
+            <a:avLst/>
+          </a:prstGeom>
+        </p:spPr>
+        <p:txBody>
+          <a:bodyPr wrap="none">
+            <a:spAutoFit/>
+          </a:bodyPr>
+          <a:lstStyle/>
+          <a:p>
+            <a:pPr algn="r">
+              <a:lnSpc>
+                <a:spcPts val="500"/>
+              </a:lnSpc>
+            </a:pPr>
+            <a:r>
+              <a:rPr lang="de-DE" sz="500" dirty="0">
+                <a:solidFill>
+                  <a:schemeClr val="accent6">
+                    <a:lumMod val="75000"/>
+                  </a:schemeClr>
+                </a:solidFill>
+                <a:latin typeface="Helvetica Neue LT Std 67 Medium Condensed" charset="0"/>
+                <a:ea typeface="Helvetica Neue LT Std 67 Medium Condensed" charset="0"/>
+                <a:cs typeface="Helvetica Neue LT Std 67 Medium Condensed" charset="0"/>
+              </a:rPr>
+              <a:t>⌥ </a:t>
+            </a:r>
+            <a:r>
+              <a:rPr lang="de-DE" sz="500" dirty="0" smtClean="0">
+                <a:solidFill>
+                  <a:schemeClr val="accent6">
+                    <a:lumMod val="75000"/>
+                  </a:schemeClr>
+                </a:solidFill>
+                <a:latin typeface="Helvetica Neue LT Std 67 Medium Condensed" charset="0"/>
+                <a:ea typeface="Helvetica Neue LT Std 67 Medium Condensed" charset="0"/>
+                <a:cs typeface="Helvetica Neue LT Std 67 Medium Condensed" charset="0"/>
+              </a:rPr>
+              <a:t>Preview</a:t>
+            </a:r>
+            <a:r>
+              <a:rPr lang="de-DE" sz="500" dirty="0" smtClean="0">
+                <a:solidFill>
+                  <a:schemeClr val="accent6">
+                    <a:lumMod val="75000"/>
+                  </a:schemeClr>
+                </a:solidFill>
+                <a:latin typeface="Helvetica Neue LT Std 67 Medium Condensed" charset="0"/>
+                <a:ea typeface="Helvetica Neue LT Std 67 Medium Condensed" charset="0"/>
+                <a:cs typeface="Helvetica Neue LT Std 67 Medium Condensed" charset="0"/>
+              </a:rPr>
+              <a:t/>
+            </a:r>
+            <a:br>
+              <a:rPr lang="de-DE" sz="500" dirty="0" smtClean="0">
+                <a:solidFill>
+                  <a:schemeClr val="accent6">
+                    <a:lumMod val="75000"/>
+                  </a:schemeClr>
+                </a:solidFill>
+                <a:latin typeface="Helvetica Neue LT Std 67 Medium Condensed" charset="0"/>
+                <a:ea typeface="Helvetica Neue LT Std 67 Medium Condensed" charset="0"/>
+                <a:cs typeface="Helvetica Neue LT Std 67 Medium Condensed" charset="0"/>
+              </a:rPr>
+            </a:br>
+            <a:r>
+              <a:rPr lang="de-DE" sz="500" dirty="0" smtClean="0">
+                <a:solidFill>
+                  <a:schemeClr val="accent6">
+                    <a:lumMod val="75000"/>
+                  </a:schemeClr>
+                </a:solidFill>
+                <a:latin typeface="Helvetica Neue LT Std 67 Medium Condensed" charset="0"/>
+                <a:ea typeface="Helvetica Neue LT Std 67 Medium Condensed" charset="0"/>
+                <a:cs typeface="Helvetica Neue LT Std 67 Medium Condensed" charset="0"/>
+              </a:rPr>
+              <a:t>Relative</a:t>
+            </a:r>
+            <a:endParaRPr lang="de-DE" sz="500" dirty="0">
+              <a:solidFill>
+                <a:schemeClr val="accent6">
+                  <a:lumMod val="75000"/>
+                </a:schemeClr>
+              </a:solidFill>
+              <a:latin typeface="Helvetica Neue LT Std 67 Medium Condensed" charset="0"/>
+              <a:ea typeface="Helvetica Neue LT Std 67 Medium Condensed" charset="0"/>
+              <a:cs typeface="Helvetica Neue LT Std 67 Medium Condensed" charset="0"/>
+            </a:endParaRPr>
           </a:p>
         </p:txBody>
       </p:sp>

</xml_diff>

<commit_message>
Keymap foo for 3.0.2
</commit_message>
<xml_diff>
--- a/Documentation/Keymap.pptx
+++ b/Documentation/Keymap.pptx
@@ -197,7 +197,7 @@
           <a:p>
             <a:fld id="{D04F8CED-0623-C742-B972-F53D35E16E19}" type="datetimeFigureOut">
               <a:rPr lang="de-DE" smtClean="0"/>
-              <a:t>06.03.17</a:t>
+              <a:t>07.03.17</a:t>
             </a:fld>
             <a:endParaRPr lang="de-DE"/>
           </a:p>
@@ -680,7 +680,7 @@
           <a:p>
             <a:fld id="{A97692CC-6688-1145-811E-FE1ABB97A7A4}" type="datetimeFigureOut">
               <a:rPr lang="de-DE" smtClean="0"/>
-              <a:t>06.03.17</a:t>
+              <a:t>07.03.17</a:t>
             </a:fld>
             <a:endParaRPr lang="de-DE"/>
           </a:p>
@@ -845,7 +845,7 @@
           <a:p>
             <a:fld id="{A97692CC-6688-1145-811E-FE1ABB97A7A4}" type="datetimeFigureOut">
               <a:rPr lang="de-DE" smtClean="0"/>
-              <a:t>06.03.17</a:t>
+              <a:t>07.03.17</a:t>
             </a:fld>
             <a:endParaRPr lang="de-DE"/>
           </a:p>
@@ -1020,7 +1020,7 @@
           <a:p>
             <a:fld id="{A97692CC-6688-1145-811E-FE1ABB97A7A4}" type="datetimeFigureOut">
               <a:rPr lang="de-DE" smtClean="0"/>
-              <a:t>06.03.17</a:t>
+              <a:t>07.03.17</a:t>
             </a:fld>
             <a:endParaRPr lang="de-DE"/>
           </a:p>
@@ -1185,7 +1185,7 @@
           <a:p>
             <a:fld id="{A97692CC-6688-1145-811E-FE1ABB97A7A4}" type="datetimeFigureOut">
               <a:rPr lang="de-DE" smtClean="0"/>
-              <a:t>06.03.17</a:t>
+              <a:t>07.03.17</a:t>
             </a:fld>
             <a:endParaRPr lang="de-DE"/>
           </a:p>
@@ -1424,7 +1424,7 @@
           <a:p>
             <a:fld id="{A97692CC-6688-1145-811E-FE1ABB97A7A4}" type="datetimeFigureOut">
               <a:rPr lang="de-DE" smtClean="0"/>
-              <a:t>06.03.17</a:t>
+              <a:t>07.03.17</a:t>
             </a:fld>
             <a:endParaRPr lang="de-DE"/>
           </a:p>
@@ -1651,7 +1651,7 @@
           <a:p>
             <a:fld id="{A97692CC-6688-1145-811E-FE1ABB97A7A4}" type="datetimeFigureOut">
               <a:rPr lang="de-DE" smtClean="0"/>
-              <a:t>06.03.17</a:t>
+              <a:t>07.03.17</a:t>
             </a:fld>
             <a:endParaRPr lang="de-DE"/>
           </a:p>
@@ -2013,7 +2013,7 @@
           <a:p>
             <a:fld id="{A97692CC-6688-1145-811E-FE1ABB97A7A4}" type="datetimeFigureOut">
               <a:rPr lang="de-DE" smtClean="0"/>
-              <a:t>06.03.17</a:t>
+              <a:t>07.03.17</a:t>
             </a:fld>
             <a:endParaRPr lang="de-DE"/>
           </a:p>
@@ -2126,7 +2126,7 @@
           <a:p>
             <a:fld id="{A97692CC-6688-1145-811E-FE1ABB97A7A4}" type="datetimeFigureOut">
               <a:rPr lang="de-DE" smtClean="0"/>
-              <a:t>06.03.17</a:t>
+              <a:t>07.03.17</a:t>
             </a:fld>
             <a:endParaRPr lang="de-DE"/>
           </a:p>
@@ -2216,7 +2216,7 @@
           <a:p>
             <a:fld id="{A97692CC-6688-1145-811E-FE1ABB97A7A4}" type="datetimeFigureOut">
               <a:rPr lang="de-DE" smtClean="0"/>
-              <a:t>06.03.17</a:t>
+              <a:t>07.03.17</a:t>
             </a:fld>
             <a:endParaRPr lang="de-DE"/>
           </a:p>
@@ -2488,7 +2488,7 @@
           <a:p>
             <a:fld id="{A97692CC-6688-1145-811E-FE1ABB97A7A4}" type="datetimeFigureOut">
               <a:rPr lang="de-DE" smtClean="0"/>
-              <a:t>06.03.17</a:t>
+              <a:t>07.03.17</a:t>
             </a:fld>
             <a:endParaRPr lang="de-DE"/>
           </a:p>
@@ -2740,7 +2740,7 @@
           <a:p>
             <a:fld id="{A97692CC-6688-1145-811E-FE1ABB97A7A4}" type="datetimeFigureOut">
               <a:rPr lang="de-DE" smtClean="0"/>
-              <a:t>06.03.17</a:t>
+              <a:t>07.03.17</a:t>
             </a:fld>
             <a:endParaRPr lang="de-DE"/>
           </a:p>
@@ -2948,7 +2948,7 @@
           <a:p>
             <a:fld id="{A97692CC-6688-1145-811E-FE1ABB97A7A4}" type="datetimeFigureOut">
               <a:rPr lang="de-DE" smtClean="0"/>
-              <a:t>06.03.17</a:t>
+              <a:t>07.03.17</a:t>
             </a:fld>
             <a:endParaRPr lang="de-DE"/>
           </a:p>
@@ -3355,6 +3355,187 @@
       </p:grpSpPr>
       <p:sp>
         <p:nvSpPr>
+          <p:cNvPr id="310" name="Abgerundetes Rechteck 309"/>
+          <p:cNvSpPr/>
+          <p:nvPr/>
+        </p:nvSpPr>
+        <p:spPr>
+          <a:xfrm>
+            <a:off x="4618424" y="4345071"/>
+            <a:ext cx="495160" cy="483856"/>
+          </a:xfrm>
+          <a:prstGeom prst="roundRect">
+            <a:avLst>
+              <a:gd name="adj" fmla="val 8710"/>
+            </a:avLst>
+          </a:prstGeom>
+          <a:solidFill>
+            <a:schemeClr val="accent4">
+              <a:lumMod val="20000"/>
+              <a:lumOff val="80000"/>
+            </a:schemeClr>
+          </a:solidFill>
+          <a:ln>
+            <a:solidFill>
+              <a:schemeClr val="accent4">
+                <a:lumMod val="50000"/>
+              </a:schemeClr>
+            </a:solidFill>
+          </a:ln>
+        </p:spPr>
+        <p:style>
+          <a:lnRef idx="2">
+            <a:schemeClr val="accent1">
+              <a:shade val="50000"/>
+            </a:schemeClr>
+          </a:lnRef>
+          <a:fillRef idx="1">
+            <a:schemeClr val="accent1"/>
+          </a:fillRef>
+          <a:effectRef idx="0">
+            <a:schemeClr val="accent1"/>
+          </a:effectRef>
+          <a:fontRef idx="minor">
+            <a:schemeClr val="lt1"/>
+          </a:fontRef>
+        </p:style>
+        <p:txBody>
+          <a:bodyPr rtlCol="0" anchor="b"/>
+          <a:lstStyle/>
+          <a:p>
+            <a:endParaRPr lang="de-DE" sz="1000" dirty="0">
+              <a:solidFill>
+                <a:schemeClr val="tx1"/>
+              </a:solidFill>
+              <a:latin typeface="Helvetica Neue LT Std 67 Medium Condensed" charset="0"/>
+              <a:ea typeface="Helvetica Neue LT Std 67 Medium Condensed" charset="0"/>
+              <a:cs typeface="Helvetica Neue LT Std 67 Medium Condensed" charset="0"/>
+            </a:endParaRPr>
+          </a:p>
+        </p:txBody>
+      </p:sp>
+      <p:sp>
+        <p:nvSpPr>
+          <p:cNvPr id="307" name="Abgerundetes Rechteck 306"/>
+          <p:cNvSpPr/>
+          <p:nvPr/>
+        </p:nvSpPr>
+        <p:spPr>
+          <a:xfrm>
+            <a:off x="4918021" y="3771051"/>
+            <a:ext cx="495160" cy="483856"/>
+          </a:xfrm>
+          <a:prstGeom prst="roundRect">
+            <a:avLst>
+              <a:gd name="adj" fmla="val 8710"/>
+            </a:avLst>
+          </a:prstGeom>
+          <a:solidFill>
+            <a:schemeClr val="accent1">
+              <a:lumMod val="20000"/>
+              <a:lumOff val="80000"/>
+            </a:schemeClr>
+          </a:solidFill>
+          <a:ln>
+            <a:solidFill>
+              <a:schemeClr val="accent1"/>
+            </a:solidFill>
+          </a:ln>
+        </p:spPr>
+        <p:style>
+          <a:lnRef idx="2">
+            <a:schemeClr val="accent1">
+              <a:shade val="50000"/>
+            </a:schemeClr>
+          </a:lnRef>
+          <a:fillRef idx="1">
+            <a:schemeClr val="accent1"/>
+          </a:fillRef>
+          <a:effectRef idx="0">
+            <a:schemeClr val="accent1"/>
+          </a:effectRef>
+          <a:fontRef idx="minor">
+            <a:schemeClr val="lt1"/>
+          </a:fontRef>
+        </p:style>
+        <p:txBody>
+          <a:bodyPr rtlCol="0" anchor="b"/>
+          <a:lstStyle/>
+          <a:p>
+            <a:endParaRPr lang="de-DE" sz="1000" dirty="0">
+              <a:solidFill>
+                <a:schemeClr val="tx1"/>
+              </a:solidFill>
+              <a:latin typeface="Helvetica Neue LT Std 67 Medium Condensed" charset="0"/>
+              <a:ea typeface="Helvetica Neue LT Std 67 Medium Condensed" charset="0"/>
+              <a:cs typeface="Helvetica Neue LT Std 67 Medium Condensed" charset="0"/>
+            </a:endParaRPr>
+          </a:p>
+        </p:txBody>
+      </p:sp>
+      <p:sp>
+        <p:nvSpPr>
+          <p:cNvPr id="304" name="Abgerundetes Rechteck 303"/>
+          <p:cNvSpPr/>
+          <p:nvPr/>
+        </p:nvSpPr>
+        <p:spPr>
+          <a:xfrm>
+            <a:off x="2519035" y="3773947"/>
+            <a:ext cx="495160" cy="483856"/>
+          </a:xfrm>
+          <a:prstGeom prst="roundRect">
+            <a:avLst>
+              <a:gd name="adj" fmla="val 8710"/>
+            </a:avLst>
+          </a:prstGeom>
+          <a:solidFill>
+            <a:schemeClr val="accent4">
+              <a:lumMod val="20000"/>
+              <a:lumOff val="80000"/>
+            </a:schemeClr>
+          </a:solidFill>
+          <a:ln>
+            <a:solidFill>
+              <a:schemeClr val="accent4">
+                <a:lumMod val="50000"/>
+              </a:schemeClr>
+            </a:solidFill>
+          </a:ln>
+        </p:spPr>
+        <p:style>
+          <a:lnRef idx="2">
+            <a:schemeClr val="accent1">
+              <a:shade val="50000"/>
+            </a:schemeClr>
+          </a:lnRef>
+          <a:fillRef idx="1">
+            <a:schemeClr val="accent1"/>
+          </a:fillRef>
+          <a:effectRef idx="0">
+            <a:schemeClr val="accent1"/>
+          </a:effectRef>
+          <a:fontRef idx="minor">
+            <a:schemeClr val="lt1"/>
+          </a:fontRef>
+        </p:style>
+        <p:txBody>
+          <a:bodyPr rtlCol="0" anchor="b"/>
+          <a:lstStyle/>
+          <a:p>
+            <a:endParaRPr lang="de-DE" sz="1000" dirty="0">
+              <a:solidFill>
+                <a:schemeClr val="tx1"/>
+              </a:solidFill>
+              <a:latin typeface="Helvetica Neue LT Std 67 Medium Condensed" charset="0"/>
+              <a:ea typeface="Helvetica Neue LT Std 67 Medium Condensed" charset="0"/>
+              <a:cs typeface="Helvetica Neue LT Std 67 Medium Condensed" charset="0"/>
+            </a:endParaRPr>
+          </a:p>
+        </p:txBody>
+      </p:sp>
+      <p:sp>
+        <p:nvSpPr>
           <p:cNvPr id="296" name="Abgerundetes Rechteck 295"/>
           <p:cNvSpPr/>
           <p:nvPr/>
@@ -10609,7 +10790,7 @@
         </p:nvSpPr>
         <p:spPr>
           <a:xfrm>
-            <a:off x="2901323" y="3142733"/>
+            <a:off x="2901323" y="3247232"/>
             <a:ext cx="248786" cy="246221"/>
           </a:xfrm>
           <a:prstGeom prst="rect">
@@ -10647,8 +10828,8 @@
         </p:nvSpPr>
         <p:spPr>
           <a:xfrm>
-            <a:off x="2964534" y="3182765"/>
-            <a:ext cx="577402" cy="287899"/>
+            <a:off x="2958003" y="3300328"/>
+            <a:ext cx="574196" cy="223779"/>
           </a:xfrm>
           <a:prstGeom prst="rect">
             <a:avLst/>
@@ -10740,45 +10921,7 @@
                 <a:ea typeface="Helvetica Neue LT Std 67 Medium Condensed" charset="0"/>
                 <a:cs typeface="Helvetica Neue LT Std 67 Medium Condensed" charset="0"/>
               </a:rPr>
-              <a:t/>
-            </a:r>
-            <a:br>
-              <a:rPr lang="de-DE" sz="500" dirty="0" smtClean="0">
-                <a:solidFill>
-                  <a:schemeClr val="accent2">
-                    <a:lumMod val="75000"/>
-                  </a:schemeClr>
-                </a:solidFill>
-                <a:latin typeface="Helvetica Neue LT Std 67 Medium Condensed" charset="0"/>
-                <a:ea typeface="Helvetica Neue LT Std 67 Medium Condensed" charset="0"/>
-                <a:cs typeface="Helvetica Neue LT Std 67 Medium Condensed" charset="0"/>
-              </a:rPr>
-            </a:br>
-            <a:r>
-              <a:rPr lang="de-DE" sz="500" dirty="0" smtClean="0">
-                <a:solidFill>
-                  <a:schemeClr val="accent2">
-                    <a:lumMod val="75000"/>
-                  </a:schemeClr>
-                </a:solidFill>
-                <a:latin typeface="Helvetica Neue LT Std 67 Medium Condensed" charset="0"/>
-                <a:ea typeface="Helvetica Neue LT Std 67 Medium Condensed" charset="0"/>
-                <a:cs typeface="Helvetica Neue LT Std 67 Medium Condensed" charset="0"/>
-              </a:rPr>
-              <a:t> Time-</a:t>
-            </a:r>
-            <a:r>
-              <a:rPr lang="de-DE" sz="500" dirty="0" err="1" smtClean="0">
-                <a:solidFill>
-                  <a:schemeClr val="accent2">
-                    <a:lumMod val="75000"/>
-                  </a:schemeClr>
-                </a:solidFill>
-                <a:latin typeface="Helvetica Neue LT Std 67 Medium Condensed" charset="0"/>
-                <a:ea typeface="Helvetica Neue LT Std 67 Medium Condensed" charset="0"/>
-                <a:cs typeface="Helvetica Neue LT Std 67 Medium Condensed" charset="0"/>
-              </a:rPr>
-              <a:t>Selection</a:t>
+              <a:t> Time-Sel.</a:t>
             </a:r>
             <a:endParaRPr lang="de-DE" sz="500" dirty="0"/>
           </a:p>
@@ -10981,7 +11124,7 @@
         </p:nvSpPr>
         <p:spPr>
           <a:xfrm>
-            <a:off x="7749768" y="3191909"/>
+            <a:off x="7917509" y="3191909"/>
             <a:ext cx="759239" cy="169277"/>
           </a:xfrm>
           <a:prstGeom prst="rect">
@@ -14125,13 +14268,136 @@
       </p:sp>
       <p:sp>
         <p:nvSpPr>
-          <p:cNvPr id="202" name="Abgerundetes Rechteck 201"/>
+          <p:cNvPr id="203" name="Textfeld 202"/>
+          <p:cNvSpPr txBox="1"/>
+          <p:nvPr/>
+        </p:nvSpPr>
+        <p:spPr>
+          <a:xfrm>
+            <a:off x="2478983" y="4039579"/>
+            <a:ext cx="260008" cy="253916"/>
+          </a:xfrm>
+          <a:prstGeom prst="rect">
+            <a:avLst/>
+          </a:prstGeom>
+          <a:noFill/>
+          <a:ln>
+            <a:noFill/>
+          </a:ln>
+        </p:spPr>
+        <p:txBody>
+          <a:bodyPr wrap="none" rtlCol="0">
+            <a:spAutoFit/>
+          </a:bodyPr>
+          <a:lstStyle/>
+          <a:p>
+            <a:r>
+              <a:rPr lang="de-DE" sz="1050" dirty="0" smtClean="0">
+                <a:latin typeface="Helvetica Neue LT Std 67 Medium Condensed" charset="0"/>
+                <a:ea typeface="Helvetica Neue LT Std 67 Medium Condensed" charset="0"/>
+                <a:cs typeface="Helvetica Neue LT Std 67 Medium Condensed" charset="0"/>
+              </a:rPr>
+              <a:t>D</a:t>
+            </a:r>
+            <a:endParaRPr lang="de-DE" sz="1050" dirty="0">
+              <a:latin typeface="Helvetica Neue LT Std 67 Medium Condensed" charset="0"/>
+              <a:ea typeface="Helvetica Neue LT Std 67 Medium Condensed" charset="0"/>
+              <a:cs typeface="Helvetica Neue LT Std 67 Medium Condensed" charset="0"/>
+            </a:endParaRPr>
+          </a:p>
+        </p:txBody>
+      </p:sp>
+      <p:sp>
+        <p:nvSpPr>
+          <p:cNvPr id="207" name="Textfeld 206"/>
+          <p:cNvSpPr txBox="1"/>
+          <p:nvPr/>
+        </p:nvSpPr>
+        <p:spPr>
+          <a:xfrm>
+            <a:off x="4287959" y="4029640"/>
+            <a:ext cx="260008" cy="253916"/>
+          </a:xfrm>
+          <a:prstGeom prst="rect">
+            <a:avLst/>
+          </a:prstGeom>
+          <a:noFill/>
+          <a:ln>
+            <a:noFill/>
+          </a:ln>
+        </p:spPr>
+        <p:txBody>
+          <a:bodyPr wrap="none" rtlCol="0">
+            <a:spAutoFit/>
+          </a:bodyPr>
+          <a:lstStyle/>
+          <a:p>
+            <a:r>
+              <a:rPr lang="de-DE" sz="1050" dirty="0" smtClean="0">
+                <a:latin typeface="Helvetica Neue LT Std 67 Medium Condensed" charset="0"/>
+                <a:ea typeface="Helvetica Neue LT Std 67 Medium Condensed" charset="0"/>
+                <a:cs typeface="Helvetica Neue LT Std 67 Medium Condensed" charset="0"/>
+              </a:rPr>
+              <a:t>H</a:t>
+            </a:r>
+            <a:endParaRPr lang="de-DE" sz="1050" dirty="0">
+              <a:latin typeface="Helvetica Neue LT Std 67 Medium Condensed" charset="0"/>
+              <a:ea typeface="Helvetica Neue LT Std 67 Medium Condensed" charset="0"/>
+              <a:cs typeface="Helvetica Neue LT Std 67 Medium Condensed" charset="0"/>
+            </a:endParaRPr>
+          </a:p>
+        </p:txBody>
+      </p:sp>
+      <p:sp>
+        <p:nvSpPr>
+          <p:cNvPr id="209" name="Textfeld 208"/>
+          <p:cNvSpPr txBox="1"/>
+          <p:nvPr/>
+        </p:nvSpPr>
+        <p:spPr>
+          <a:xfrm>
+            <a:off x="4878795" y="4027695"/>
+            <a:ext cx="243978" cy="253916"/>
+          </a:xfrm>
+          <a:prstGeom prst="rect">
+            <a:avLst/>
+          </a:prstGeom>
+          <a:noFill/>
+          <a:ln>
+            <a:noFill/>
+          </a:ln>
+        </p:spPr>
+        <p:txBody>
+          <a:bodyPr wrap="none" rtlCol="0">
+            <a:spAutoFit/>
+          </a:bodyPr>
+          <a:lstStyle/>
+          <a:p>
+            <a:r>
+              <a:rPr lang="de-DE" sz="1050" dirty="0" smtClean="0">
+                <a:latin typeface="Helvetica Neue LT Std 67 Medium Condensed" charset="0"/>
+                <a:ea typeface="Helvetica Neue LT Std 67 Medium Condensed" charset="0"/>
+                <a:cs typeface="Helvetica Neue LT Std 67 Medium Condensed" charset="0"/>
+              </a:rPr>
+              <a:t>J</a:t>
+            </a:r>
+            <a:endParaRPr lang="de-DE" sz="1050" dirty="0">
+              <a:latin typeface="Helvetica Neue LT Std 67 Medium Condensed" charset="0"/>
+              <a:ea typeface="Helvetica Neue LT Std 67 Medium Condensed" charset="0"/>
+              <a:cs typeface="Helvetica Neue LT Std 67 Medium Condensed" charset="0"/>
+            </a:endParaRPr>
+          </a:p>
+        </p:txBody>
+      </p:sp>
+      <p:sp>
+        <p:nvSpPr>
+          <p:cNvPr id="210" name="Abgerundetes Rechteck 209"/>
           <p:cNvSpPr/>
           <p:nvPr/>
         </p:nvSpPr>
         <p:spPr>
           <a:xfrm>
-            <a:off x="2517008" y="3772794"/>
+            <a:off x="5516804" y="3772794"/>
             <a:ext cx="495160" cy="483856"/>
           </a:xfrm>
           <a:prstGeom prst="roundRect">
@@ -14183,14 +14449,14 @@
       </p:sp>
       <p:sp>
         <p:nvSpPr>
-          <p:cNvPr id="203" name="Textfeld 202"/>
+          <p:cNvPr id="211" name="Textfeld 210"/>
           <p:cNvSpPr txBox="1"/>
           <p:nvPr/>
         </p:nvSpPr>
         <p:spPr>
           <a:xfrm>
-            <a:off x="2478983" y="4039579"/>
-            <a:ext cx="260008" cy="253916"/>
+            <a:off x="5478779" y="4025956"/>
+            <a:ext cx="255198" cy="253916"/>
           </a:xfrm>
           <a:prstGeom prst="rect">
             <a:avLst/>
@@ -14212,7 +14478,7 @@
                 <a:ea typeface="Helvetica Neue LT Std 67 Medium Condensed" charset="0"/>
                 <a:cs typeface="Helvetica Neue LT Std 67 Medium Condensed" charset="0"/>
               </a:rPr>
-              <a:t>D</a:t>
+              <a:t>K</a:t>
             </a:r>
             <a:endParaRPr lang="de-DE" sz="1050" dirty="0">
               <a:latin typeface="Helvetica Neue LT Std 67 Medium Condensed" charset="0"/>
@@ -14224,54 +14490,13 @@
       </p:sp>
       <p:sp>
         <p:nvSpPr>
-          <p:cNvPr id="207" name="Textfeld 206"/>
-          <p:cNvSpPr txBox="1"/>
-          <p:nvPr/>
-        </p:nvSpPr>
-        <p:spPr>
-          <a:xfrm>
-            <a:off x="4287959" y="4029640"/>
-            <a:ext cx="260008" cy="253916"/>
-          </a:xfrm>
-          <a:prstGeom prst="rect">
-            <a:avLst/>
-          </a:prstGeom>
-          <a:noFill/>
-          <a:ln>
-            <a:noFill/>
-          </a:ln>
-        </p:spPr>
-        <p:txBody>
-          <a:bodyPr wrap="none" rtlCol="0">
-            <a:spAutoFit/>
-          </a:bodyPr>
-          <a:lstStyle/>
-          <a:p>
-            <a:r>
-              <a:rPr lang="de-DE" sz="1050" dirty="0" smtClean="0">
-                <a:latin typeface="Helvetica Neue LT Std 67 Medium Condensed" charset="0"/>
-                <a:ea typeface="Helvetica Neue LT Std 67 Medium Condensed" charset="0"/>
-                <a:cs typeface="Helvetica Neue LT Std 67 Medium Condensed" charset="0"/>
-              </a:rPr>
-              <a:t>H</a:t>
-            </a:r>
-            <a:endParaRPr lang="de-DE" sz="1050" dirty="0">
-              <a:latin typeface="Helvetica Neue LT Std 67 Medium Condensed" charset="0"/>
-              <a:ea typeface="Helvetica Neue LT Std 67 Medium Condensed" charset="0"/>
-              <a:cs typeface="Helvetica Neue LT Std 67 Medium Condensed" charset="0"/>
-            </a:endParaRPr>
-          </a:p>
-        </p:txBody>
-      </p:sp>
-      <p:sp>
-        <p:nvSpPr>
-          <p:cNvPr id="208" name="Abgerundetes Rechteck 207"/>
+          <p:cNvPr id="212" name="Abgerundetes Rechteck 211"/>
           <p:cNvSpPr/>
           <p:nvPr/>
         </p:nvSpPr>
         <p:spPr>
           <a:xfrm>
-            <a:off x="4916820" y="3772794"/>
+            <a:off x="6724413" y="3772794"/>
             <a:ext cx="495160" cy="483856"/>
           </a:xfrm>
           <a:prstGeom prst="roundRect">
@@ -14323,14 +14548,14 @@
       </p:sp>
       <p:sp>
         <p:nvSpPr>
-          <p:cNvPr id="209" name="Textfeld 208"/>
+          <p:cNvPr id="213" name="Textfeld 212"/>
           <p:cNvSpPr txBox="1"/>
           <p:nvPr/>
         </p:nvSpPr>
         <p:spPr>
           <a:xfrm>
-            <a:off x="4878795" y="4027695"/>
-            <a:ext cx="243978" cy="253916"/>
+            <a:off x="6686388" y="4038068"/>
+            <a:ext cx="260008" cy="253916"/>
           </a:xfrm>
           <a:prstGeom prst="rect">
             <a:avLst/>
@@ -14352,7 +14577,7 @@
                 <a:ea typeface="Helvetica Neue LT Std 67 Medium Condensed" charset="0"/>
                 <a:cs typeface="Helvetica Neue LT Std 67 Medium Condensed" charset="0"/>
               </a:rPr>
-              <a:t>J</a:t>
+              <a:t>Ö</a:t>
             </a:r>
             <a:endParaRPr lang="de-DE" sz="1050" dirty="0">
               <a:latin typeface="Helvetica Neue LT Std 67 Medium Condensed" charset="0"/>
@@ -14364,13 +14589,95 @@
       </p:sp>
       <p:sp>
         <p:nvSpPr>
-          <p:cNvPr id="210" name="Abgerundetes Rechteck 209"/>
+          <p:cNvPr id="215" name="Textfeld 214"/>
+          <p:cNvSpPr txBox="1"/>
+          <p:nvPr/>
+        </p:nvSpPr>
+        <p:spPr>
+          <a:xfrm>
+            <a:off x="7880176" y="4030871"/>
+            <a:ext cx="248786" cy="253916"/>
+          </a:xfrm>
+          <a:prstGeom prst="rect">
+            <a:avLst/>
+          </a:prstGeom>
+          <a:noFill/>
+          <a:ln>
+            <a:noFill/>
+          </a:ln>
+        </p:spPr>
+        <p:txBody>
+          <a:bodyPr wrap="none" rtlCol="0">
+            <a:spAutoFit/>
+          </a:bodyPr>
+          <a:lstStyle/>
+          <a:p>
+            <a:r>
+              <a:rPr lang="de-DE" sz="1050" dirty="0" smtClean="0">
+                <a:latin typeface="Helvetica Neue LT Std 67 Medium Condensed" charset="0"/>
+                <a:ea typeface="Helvetica Neue LT Std 67 Medium Condensed" charset="0"/>
+                <a:cs typeface="Helvetica Neue LT Std 67 Medium Condensed" charset="0"/>
+              </a:rPr>
+              <a:t>#</a:t>
+            </a:r>
+            <a:endParaRPr lang="de-DE" sz="1050" dirty="0">
+              <a:latin typeface="Helvetica Neue LT Std 67 Medium Condensed" charset="0"/>
+              <a:ea typeface="Helvetica Neue LT Std 67 Medium Condensed" charset="0"/>
+              <a:cs typeface="Helvetica Neue LT Std 67 Medium Condensed" charset="0"/>
+            </a:endParaRPr>
+          </a:p>
+        </p:txBody>
+      </p:sp>
+      <p:sp>
+        <p:nvSpPr>
+          <p:cNvPr id="221" name="Textfeld 220"/>
+          <p:cNvSpPr txBox="1"/>
+          <p:nvPr/>
+        </p:nvSpPr>
+        <p:spPr>
+          <a:xfrm>
+            <a:off x="3375987" y="4612399"/>
+            <a:ext cx="248786" cy="253916"/>
+          </a:xfrm>
+          <a:prstGeom prst="rect">
+            <a:avLst/>
+          </a:prstGeom>
+          <a:noFill/>
+          <a:ln>
+            <a:noFill/>
+          </a:ln>
+        </p:spPr>
+        <p:txBody>
+          <a:bodyPr wrap="none" rtlCol="0">
+            <a:spAutoFit/>
+          </a:bodyPr>
+          <a:lstStyle/>
+          <a:p>
+            <a:r>
+              <a:rPr lang="de-DE" sz="1050" dirty="0" smtClean="0">
+                <a:latin typeface="Helvetica Neue LT Std 67 Medium Condensed" charset="0"/>
+                <a:ea typeface="Helvetica Neue LT Std 67 Medium Condensed" charset="0"/>
+                <a:cs typeface="Helvetica Neue LT Std 67 Medium Condensed" charset="0"/>
+              </a:rPr>
+              <a:t>V</a:t>
+            </a:r>
+            <a:endParaRPr lang="de-DE" sz="1050" dirty="0">
+              <a:latin typeface="Helvetica Neue LT Std 67 Medium Condensed" charset="0"/>
+              <a:ea typeface="Helvetica Neue LT Std 67 Medium Condensed" charset="0"/>
+              <a:cs typeface="Helvetica Neue LT Std 67 Medium Condensed" charset="0"/>
+            </a:endParaRPr>
+          </a:p>
+        </p:txBody>
+      </p:sp>
+      <p:sp>
+        <p:nvSpPr>
+          <p:cNvPr id="222" name="Abgerundetes Rechteck 221"/>
           <p:cNvSpPr/>
           <p:nvPr/>
         </p:nvSpPr>
         <p:spPr>
           <a:xfrm>
-            <a:off x="5516804" y="3772794"/>
+            <a:off x="4020078" y="4346279"/>
             <a:ext cx="495160" cy="483856"/>
           </a:xfrm>
           <a:prstGeom prst="roundRect">
@@ -14422,14 +14729,14 @@
       </p:sp>
       <p:sp>
         <p:nvSpPr>
-          <p:cNvPr id="211" name="Textfeld 210"/>
+          <p:cNvPr id="223" name="Textfeld 222"/>
           <p:cNvSpPr txBox="1"/>
           <p:nvPr/>
         </p:nvSpPr>
         <p:spPr>
           <a:xfrm>
-            <a:off x="5478779" y="4025956"/>
-            <a:ext cx="255198" cy="253916"/>
+            <a:off x="3982053" y="4611491"/>
+            <a:ext cx="256802" cy="253916"/>
           </a:xfrm>
           <a:prstGeom prst="rect">
             <a:avLst/>
@@ -14451,347 +14758,9 @@
                 <a:ea typeface="Helvetica Neue LT Std 67 Medium Condensed" charset="0"/>
                 <a:cs typeface="Helvetica Neue LT Std 67 Medium Condensed" charset="0"/>
               </a:rPr>
-              <a:t>K</a:t>
+              <a:t>B</a:t>
             </a:r>
             <a:endParaRPr lang="de-DE" sz="1050" dirty="0">
-              <a:latin typeface="Helvetica Neue LT Std 67 Medium Condensed" charset="0"/>
-              <a:ea typeface="Helvetica Neue LT Std 67 Medium Condensed" charset="0"/>
-              <a:cs typeface="Helvetica Neue LT Std 67 Medium Condensed" charset="0"/>
-            </a:endParaRPr>
-          </a:p>
-        </p:txBody>
-      </p:sp>
-      <p:sp>
-        <p:nvSpPr>
-          <p:cNvPr id="212" name="Abgerundetes Rechteck 211"/>
-          <p:cNvSpPr/>
-          <p:nvPr/>
-        </p:nvSpPr>
-        <p:spPr>
-          <a:xfrm>
-            <a:off x="6724413" y="3772794"/>
-            <a:ext cx="495160" cy="483856"/>
-          </a:xfrm>
-          <a:prstGeom prst="roundRect">
-            <a:avLst>
-              <a:gd name="adj" fmla="val 8710"/>
-            </a:avLst>
-          </a:prstGeom>
-          <a:solidFill>
-            <a:schemeClr val="bg1"/>
-          </a:solidFill>
-          <a:ln>
-            <a:solidFill>
-              <a:schemeClr val="bg1">
-                <a:lumMod val="50000"/>
-              </a:schemeClr>
-            </a:solidFill>
-          </a:ln>
-        </p:spPr>
-        <p:style>
-          <a:lnRef idx="2">
-            <a:schemeClr val="accent1">
-              <a:shade val="50000"/>
-            </a:schemeClr>
-          </a:lnRef>
-          <a:fillRef idx="1">
-            <a:schemeClr val="accent1"/>
-          </a:fillRef>
-          <a:effectRef idx="0">
-            <a:schemeClr val="accent1"/>
-          </a:effectRef>
-          <a:fontRef idx="minor">
-            <a:schemeClr val="lt1"/>
-          </a:fontRef>
-        </p:style>
-        <p:txBody>
-          <a:bodyPr rtlCol="0" anchor="b"/>
-          <a:lstStyle/>
-          <a:p>
-            <a:endParaRPr lang="de-DE" sz="1000" dirty="0">
-              <a:solidFill>
-                <a:schemeClr val="tx1"/>
-              </a:solidFill>
-              <a:latin typeface="Helvetica Neue LT Std 67 Medium Condensed" charset="0"/>
-              <a:ea typeface="Helvetica Neue LT Std 67 Medium Condensed" charset="0"/>
-              <a:cs typeface="Helvetica Neue LT Std 67 Medium Condensed" charset="0"/>
-            </a:endParaRPr>
-          </a:p>
-        </p:txBody>
-      </p:sp>
-      <p:sp>
-        <p:nvSpPr>
-          <p:cNvPr id="213" name="Textfeld 212"/>
-          <p:cNvSpPr txBox="1"/>
-          <p:nvPr/>
-        </p:nvSpPr>
-        <p:spPr>
-          <a:xfrm>
-            <a:off x="6686388" y="4038068"/>
-            <a:ext cx="260008" cy="253916"/>
-          </a:xfrm>
-          <a:prstGeom prst="rect">
-            <a:avLst/>
-          </a:prstGeom>
-          <a:noFill/>
-          <a:ln>
-            <a:noFill/>
-          </a:ln>
-        </p:spPr>
-        <p:txBody>
-          <a:bodyPr wrap="none" rtlCol="0">
-            <a:spAutoFit/>
-          </a:bodyPr>
-          <a:lstStyle/>
-          <a:p>
-            <a:r>
-              <a:rPr lang="de-DE" sz="1050" dirty="0" smtClean="0">
-                <a:latin typeface="Helvetica Neue LT Std 67 Medium Condensed" charset="0"/>
-                <a:ea typeface="Helvetica Neue LT Std 67 Medium Condensed" charset="0"/>
-                <a:cs typeface="Helvetica Neue LT Std 67 Medium Condensed" charset="0"/>
-              </a:rPr>
-              <a:t>Ö</a:t>
-            </a:r>
-            <a:endParaRPr lang="de-DE" sz="1050" dirty="0">
-              <a:latin typeface="Helvetica Neue LT Std 67 Medium Condensed" charset="0"/>
-              <a:ea typeface="Helvetica Neue LT Std 67 Medium Condensed" charset="0"/>
-              <a:cs typeface="Helvetica Neue LT Std 67 Medium Condensed" charset="0"/>
-            </a:endParaRPr>
-          </a:p>
-        </p:txBody>
-      </p:sp>
-      <p:sp>
-        <p:nvSpPr>
-          <p:cNvPr id="215" name="Textfeld 214"/>
-          <p:cNvSpPr txBox="1"/>
-          <p:nvPr/>
-        </p:nvSpPr>
-        <p:spPr>
-          <a:xfrm>
-            <a:off x="7880176" y="4030871"/>
-            <a:ext cx="248786" cy="253916"/>
-          </a:xfrm>
-          <a:prstGeom prst="rect">
-            <a:avLst/>
-          </a:prstGeom>
-          <a:noFill/>
-          <a:ln>
-            <a:noFill/>
-          </a:ln>
-        </p:spPr>
-        <p:txBody>
-          <a:bodyPr wrap="none" rtlCol="0">
-            <a:spAutoFit/>
-          </a:bodyPr>
-          <a:lstStyle/>
-          <a:p>
-            <a:r>
-              <a:rPr lang="de-DE" sz="1050" dirty="0" smtClean="0">
-                <a:latin typeface="Helvetica Neue LT Std 67 Medium Condensed" charset="0"/>
-                <a:ea typeface="Helvetica Neue LT Std 67 Medium Condensed" charset="0"/>
-                <a:cs typeface="Helvetica Neue LT Std 67 Medium Condensed" charset="0"/>
-              </a:rPr>
-              <a:t>#</a:t>
-            </a:r>
-            <a:endParaRPr lang="de-DE" sz="1050" dirty="0">
-              <a:latin typeface="Helvetica Neue LT Std 67 Medium Condensed" charset="0"/>
-              <a:ea typeface="Helvetica Neue LT Std 67 Medium Condensed" charset="0"/>
-              <a:cs typeface="Helvetica Neue LT Std 67 Medium Condensed" charset="0"/>
-            </a:endParaRPr>
-          </a:p>
-        </p:txBody>
-      </p:sp>
-      <p:sp>
-        <p:nvSpPr>
-          <p:cNvPr id="221" name="Textfeld 220"/>
-          <p:cNvSpPr txBox="1"/>
-          <p:nvPr/>
-        </p:nvSpPr>
-        <p:spPr>
-          <a:xfrm>
-            <a:off x="3375987" y="4612399"/>
-            <a:ext cx="248786" cy="253916"/>
-          </a:xfrm>
-          <a:prstGeom prst="rect">
-            <a:avLst/>
-          </a:prstGeom>
-          <a:noFill/>
-          <a:ln>
-            <a:noFill/>
-          </a:ln>
-        </p:spPr>
-        <p:txBody>
-          <a:bodyPr wrap="none" rtlCol="0">
-            <a:spAutoFit/>
-          </a:bodyPr>
-          <a:lstStyle/>
-          <a:p>
-            <a:r>
-              <a:rPr lang="de-DE" sz="1050" dirty="0" smtClean="0">
-                <a:latin typeface="Helvetica Neue LT Std 67 Medium Condensed" charset="0"/>
-                <a:ea typeface="Helvetica Neue LT Std 67 Medium Condensed" charset="0"/>
-                <a:cs typeface="Helvetica Neue LT Std 67 Medium Condensed" charset="0"/>
-              </a:rPr>
-              <a:t>V</a:t>
-            </a:r>
-            <a:endParaRPr lang="de-DE" sz="1050" dirty="0">
-              <a:latin typeface="Helvetica Neue LT Std 67 Medium Condensed" charset="0"/>
-              <a:ea typeface="Helvetica Neue LT Std 67 Medium Condensed" charset="0"/>
-              <a:cs typeface="Helvetica Neue LT Std 67 Medium Condensed" charset="0"/>
-            </a:endParaRPr>
-          </a:p>
-        </p:txBody>
-      </p:sp>
-      <p:sp>
-        <p:nvSpPr>
-          <p:cNvPr id="222" name="Abgerundetes Rechteck 221"/>
-          <p:cNvSpPr/>
-          <p:nvPr/>
-        </p:nvSpPr>
-        <p:spPr>
-          <a:xfrm>
-            <a:off x="4020078" y="4346279"/>
-            <a:ext cx="495160" cy="483856"/>
-          </a:xfrm>
-          <a:prstGeom prst="roundRect">
-            <a:avLst>
-              <a:gd name="adj" fmla="val 8710"/>
-            </a:avLst>
-          </a:prstGeom>
-          <a:solidFill>
-            <a:schemeClr val="bg1"/>
-          </a:solidFill>
-          <a:ln>
-            <a:solidFill>
-              <a:schemeClr val="bg1">
-                <a:lumMod val="50000"/>
-              </a:schemeClr>
-            </a:solidFill>
-          </a:ln>
-        </p:spPr>
-        <p:style>
-          <a:lnRef idx="2">
-            <a:schemeClr val="accent1">
-              <a:shade val="50000"/>
-            </a:schemeClr>
-          </a:lnRef>
-          <a:fillRef idx="1">
-            <a:schemeClr val="accent1"/>
-          </a:fillRef>
-          <a:effectRef idx="0">
-            <a:schemeClr val="accent1"/>
-          </a:effectRef>
-          <a:fontRef idx="minor">
-            <a:schemeClr val="lt1"/>
-          </a:fontRef>
-        </p:style>
-        <p:txBody>
-          <a:bodyPr rtlCol="0" anchor="b"/>
-          <a:lstStyle/>
-          <a:p>
-            <a:endParaRPr lang="de-DE" sz="1000" dirty="0">
-              <a:solidFill>
-                <a:schemeClr val="tx1"/>
-              </a:solidFill>
-              <a:latin typeface="Helvetica Neue LT Std 67 Medium Condensed" charset="0"/>
-              <a:ea typeface="Helvetica Neue LT Std 67 Medium Condensed" charset="0"/>
-              <a:cs typeface="Helvetica Neue LT Std 67 Medium Condensed" charset="0"/>
-            </a:endParaRPr>
-          </a:p>
-        </p:txBody>
-      </p:sp>
-      <p:sp>
-        <p:nvSpPr>
-          <p:cNvPr id="223" name="Textfeld 222"/>
-          <p:cNvSpPr txBox="1"/>
-          <p:nvPr/>
-        </p:nvSpPr>
-        <p:spPr>
-          <a:xfrm>
-            <a:off x="3982053" y="4611491"/>
-            <a:ext cx="256802" cy="253916"/>
-          </a:xfrm>
-          <a:prstGeom prst="rect">
-            <a:avLst/>
-          </a:prstGeom>
-          <a:noFill/>
-          <a:ln>
-            <a:noFill/>
-          </a:ln>
-        </p:spPr>
-        <p:txBody>
-          <a:bodyPr wrap="none" rtlCol="0">
-            <a:spAutoFit/>
-          </a:bodyPr>
-          <a:lstStyle/>
-          <a:p>
-            <a:r>
-              <a:rPr lang="de-DE" sz="1050" dirty="0" smtClean="0">
-                <a:latin typeface="Helvetica Neue LT Std 67 Medium Condensed" charset="0"/>
-                <a:ea typeface="Helvetica Neue LT Std 67 Medium Condensed" charset="0"/>
-                <a:cs typeface="Helvetica Neue LT Std 67 Medium Condensed" charset="0"/>
-              </a:rPr>
-              <a:t>B</a:t>
-            </a:r>
-            <a:endParaRPr lang="de-DE" sz="1050" dirty="0">
-              <a:latin typeface="Helvetica Neue LT Std 67 Medium Condensed" charset="0"/>
-              <a:ea typeface="Helvetica Neue LT Std 67 Medium Condensed" charset="0"/>
-              <a:cs typeface="Helvetica Neue LT Std 67 Medium Condensed" charset="0"/>
-            </a:endParaRPr>
-          </a:p>
-        </p:txBody>
-      </p:sp>
-      <p:sp>
-        <p:nvSpPr>
-          <p:cNvPr id="224" name="Abgerundetes Rechteck 223"/>
-          <p:cNvSpPr/>
-          <p:nvPr/>
-        </p:nvSpPr>
-        <p:spPr>
-          <a:xfrm>
-            <a:off x="4618087" y="4346279"/>
-            <a:ext cx="495160" cy="483856"/>
-          </a:xfrm>
-          <a:prstGeom prst="roundRect">
-            <a:avLst>
-              <a:gd name="adj" fmla="val 8710"/>
-            </a:avLst>
-          </a:prstGeom>
-          <a:solidFill>
-            <a:schemeClr val="bg1"/>
-          </a:solidFill>
-          <a:ln>
-            <a:solidFill>
-              <a:schemeClr val="bg1">
-                <a:lumMod val="50000"/>
-              </a:schemeClr>
-            </a:solidFill>
-          </a:ln>
-        </p:spPr>
-        <p:style>
-          <a:lnRef idx="2">
-            <a:schemeClr val="accent1">
-              <a:shade val="50000"/>
-            </a:schemeClr>
-          </a:lnRef>
-          <a:fillRef idx="1">
-            <a:schemeClr val="accent1"/>
-          </a:fillRef>
-          <a:effectRef idx="0">
-            <a:schemeClr val="accent1"/>
-          </a:effectRef>
-          <a:fontRef idx="minor">
-            <a:schemeClr val="lt1"/>
-          </a:fontRef>
-        </p:style>
-        <p:txBody>
-          <a:bodyPr rtlCol="0" anchor="b"/>
-          <a:lstStyle/>
-          <a:p>
-            <a:endParaRPr lang="de-DE" sz="1000" dirty="0">
-              <a:solidFill>
-                <a:schemeClr val="tx1"/>
-              </a:solidFill>
               <a:latin typeface="Helvetica Neue LT Std 67 Medium Condensed" charset="0"/>
               <a:ea typeface="Helvetica Neue LT Std 67 Medium Condensed" charset="0"/>
               <a:cs typeface="Helvetica Neue LT Std 67 Medium Condensed" charset="0"/>
@@ -17914,17 +17883,7 @@
                   </a:schemeClr>
                 </a:solidFill>
               </a:rPr>
-              <a:t>Version: </a:t>
-            </a:r>
-            <a:r>
-              <a:rPr lang="de-DE" sz="1400" dirty="0" smtClean="0">
-                <a:solidFill>
-                  <a:schemeClr val="bg2">
-                    <a:lumMod val="50000"/>
-                  </a:schemeClr>
-                </a:solidFill>
-              </a:rPr>
-              <a:t>3.0.2</a:t>
+              <a:t>Version: 3.0.2</a:t>
             </a:r>
             <a:endParaRPr lang="de-DE" sz="1400" dirty="0">
               <a:solidFill>
@@ -18176,7 +18135,7 @@
         </p:nvSpPr>
         <p:spPr>
           <a:xfrm>
-            <a:off x="1721654" y="3155120"/>
+            <a:off x="1760840" y="3142058"/>
             <a:ext cx="248786" cy="246221"/>
           </a:xfrm>
           <a:prstGeom prst="rect">
@@ -18214,7 +18173,7 @@
         </p:nvSpPr>
         <p:spPr>
           <a:xfrm>
-            <a:off x="1784865" y="3195152"/>
+            <a:off x="1824051" y="3182090"/>
             <a:ext cx="490840" cy="220573"/>
           </a:xfrm>
           <a:prstGeom prst="rect">
@@ -18978,6 +18937,910 @@
               <a:ea typeface="Helvetica Neue LT Std 67 Medium Condensed" charset="0"/>
               <a:cs typeface="Helvetica Neue LT Std 67 Medium Condensed" charset="0"/>
             </a:endParaRPr>
+          </a:p>
+        </p:txBody>
+      </p:sp>
+      <p:sp>
+        <p:nvSpPr>
+          <p:cNvPr id="300" name="Rechteck 299"/>
+          <p:cNvSpPr/>
+          <p:nvPr/>
+        </p:nvSpPr>
+        <p:spPr>
+          <a:xfrm>
+            <a:off x="1813019" y="3332516"/>
+            <a:ext cx="494046" cy="220573"/>
+          </a:xfrm>
+          <a:prstGeom prst="rect">
+            <a:avLst/>
+          </a:prstGeom>
+        </p:spPr>
+        <p:txBody>
+          <a:bodyPr wrap="none">
+            <a:spAutoFit/>
+          </a:bodyPr>
+          <a:lstStyle/>
+          <a:p>
+            <a:pPr algn="r">
+              <a:lnSpc>
+                <a:spcPts val="500"/>
+              </a:lnSpc>
+            </a:pPr>
+            <a:r>
+              <a:rPr lang="de-DE" sz="500" dirty="0">
+                <a:solidFill>
+                  <a:schemeClr val="accent6">
+                    <a:lumMod val="75000"/>
+                  </a:schemeClr>
+                </a:solidFill>
+                <a:latin typeface="Helvetica Neue LT Std 67 Medium Condensed" charset="0"/>
+                <a:ea typeface="Helvetica Neue LT Std 67 Medium Condensed" charset="0"/>
+                <a:cs typeface="Helvetica Neue LT Std 67 Medium Condensed" charset="0"/>
+              </a:rPr>
+              <a:t>⌥ </a:t>
+            </a:r>
+            <a:r>
+              <a:rPr lang="de-DE" sz="500" dirty="0" smtClean="0">
+                <a:solidFill>
+                  <a:schemeClr val="accent6">
+                    <a:lumMod val="75000"/>
+                  </a:schemeClr>
+                </a:solidFill>
+                <a:latin typeface="Helvetica Neue LT Std 67 Medium Condensed" charset="0"/>
+                <a:ea typeface="Helvetica Neue LT Std 67 Medium Condensed" charset="0"/>
+                <a:cs typeface="Helvetica Neue LT Std 67 Medium Condensed" charset="0"/>
+              </a:rPr>
+              <a:t>Go </a:t>
+            </a:r>
+            <a:r>
+              <a:rPr lang="de-DE" sz="500" dirty="0" err="1" smtClean="0">
+                <a:solidFill>
+                  <a:schemeClr val="accent6">
+                    <a:lumMod val="75000"/>
+                  </a:schemeClr>
+                </a:solidFill>
+                <a:latin typeface="Helvetica Neue LT Std 67 Medium Condensed" charset="0"/>
+                <a:ea typeface="Helvetica Neue LT Std 67 Medium Condensed" charset="0"/>
+                <a:cs typeface="Helvetica Neue LT Std 67 Medium Condensed" charset="0"/>
+              </a:rPr>
+              <a:t>to</a:t>
+            </a:r>
+            <a:r>
+              <a:rPr lang="de-DE" sz="500" dirty="0" smtClean="0">
+                <a:solidFill>
+                  <a:schemeClr val="accent6">
+                    <a:lumMod val="75000"/>
+                  </a:schemeClr>
+                </a:solidFill>
+                <a:latin typeface="Helvetica Neue LT Std 67 Medium Condensed" charset="0"/>
+                <a:ea typeface="Helvetica Neue LT Std 67 Medium Condensed" charset="0"/>
+                <a:cs typeface="Helvetica Neue LT Std 67 Medium Condensed" charset="0"/>
+              </a:rPr>
+              <a:t> End</a:t>
+            </a:r>
+            <a:r>
+              <a:rPr lang="de-DE" sz="500" dirty="0" smtClean="0">
+                <a:solidFill>
+                  <a:schemeClr val="accent6">
+                    <a:lumMod val="75000"/>
+                  </a:schemeClr>
+                </a:solidFill>
+                <a:latin typeface="Helvetica Neue LT Std 67 Medium Condensed" charset="0"/>
+                <a:ea typeface="Helvetica Neue LT Std 67 Medium Condensed" charset="0"/>
+                <a:cs typeface="Helvetica Neue LT Std 67 Medium Condensed" charset="0"/>
+              </a:rPr>
+              <a:t/>
+            </a:r>
+            <a:br>
+              <a:rPr lang="de-DE" sz="500" dirty="0" smtClean="0">
+                <a:solidFill>
+                  <a:schemeClr val="accent6">
+                    <a:lumMod val="75000"/>
+                  </a:schemeClr>
+                </a:solidFill>
+                <a:latin typeface="Helvetica Neue LT Std 67 Medium Condensed" charset="0"/>
+                <a:ea typeface="Helvetica Neue LT Std 67 Medium Condensed" charset="0"/>
+                <a:cs typeface="Helvetica Neue LT Std 67 Medium Condensed" charset="0"/>
+              </a:rPr>
+            </a:br>
+            <a:r>
+              <a:rPr lang="de-DE" sz="500" dirty="0" err="1" smtClean="0">
+                <a:solidFill>
+                  <a:schemeClr val="accent6">
+                    <a:lumMod val="75000"/>
+                  </a:schemeClr>
+                </a:solidFill>
+                <a:latin typeface="Helvetica Neue LT Std 67 Medium Condensed" charset="0"/>
+                <a:ea typeface="Helvetica Neue LT Std 67 Medium Condensed" charset="0"/>
+                <a:cs typeface="Helvetica Neue LT Std 67 Medium Condensed" charset="0"/>
+              </a:rPr>
+              <a:t>of</a:t>
+            </a:r>
+            <a:r>
+              <a:rPr lang="de-DE" sz="500" dirty="0" smtClean="0">
+                <a:solidFill>
+                  <a:schemeClr val="accent6">
+                    <a:lumMod val="75000"/>
+                  </a:schemeClr>
+                </a:solidFill>
+                <a:latin typeface="Helvetica Neue LT Std 67 Medium Condensed" charset="0"/>
+                <a:ea typeface="Helvetica Neue LT Std 67 Medium Condensed" charset="0"/>
+                <a:cs typeface="Helvetica Neue LT Std 67 Medium Condensed" charset="0"/>
+              </a:rPr>
+              <a:t> Project</a:t>
+            </a:r>
+            <a:endParaRPr lang="de-DE" sz="500" dirty="0">
+              <a:solidFill>
+                <a:schemeClr val="accent6">
+                  <a:lumMod val="75000"/>
+                </a:schemeClr>
+              </a:solidFill>
+              <a:latin typeface="Helvetica Neue LT Std 67 Medium Condensed" charset="0"/>
+              <a:ea typeface="Helvetica Neue LT Std 67 Medium Condensed" charset="0"/>
+              <a:cs typeface="Helvetica Neue LT Std 67 Medium Condensed" charset="0"/>
+            </a:endParaRPr>
+          </a:p>
+        </p:txBody>
+      </p:sp>
+      <p:sp>
+        <p:nvSpPr>
+          <p:cNvPr id="301" name="Textfeld 300"/>
+          <p:cNvSpPr txBox="1"/>
+          <p:nvPr/>
+        </p:nvSpPr>
+        <p:spPr>
+          <a:xfrm>
+            <a:off x="3006354" y="3177876"/>
+            <a:ext cx="524503" cy="169277"/>
+          </a:xfrm>
+          <a:prstGeom prst="rect">
+            <a:avLst/>
+          </a:prstGeom>
+          <a:noFill/>
+        </p:spPr>
+        <p:txBody>
+          <a:bodyPr wrap="none" rtlCol="0">
+            <a:spAutoFit/>
+          </a:bodyPr>
+          <a:lstStyle/>
+          <a:p>
+            <a:pPr>
+              <a:lnSpc>
+                <a:spcPts val="640"/>
+              </a:lnSpc>
+            </a:pPr>
+            <a:r>
+              <a:rPr lang="de-DE" sz="500" dirty="0" err="1" smtClean="0">
+                <a:latin typeface="Helvetica Neue LT Std 67 Medium Condensed" charset="0"/>
+                <a:ea typeface="Helvetica Neue LT Std 67 Medium Condensed" charset="0"/>
+                <a:cs typeface="Helvetica Neue LT Std 67 Medium Condensed" charset="0"/>
+              </a:rPr>
+              <a:t>Toglle</a:t>
+            </a:r>
+            <a:r>
+              <a:rPr lang="de-DE" sz="500" dirty="0" smtClean="0">
+                <a:latin typeface="Helvetica Neue LT Std 67 Medium Condensed" charset="0"/>
+                <a:ea typeface="Helvetica Neue LT Std 67 Medium Condensed" charset="0"/>
+                <a:cs typeface="Helvetica Neue LT Std 67 Medium Condensed" charset="0"/>
+              </a:rPr>
+              <a:t> Repeat</a:t>
+            </a:r>
+            <a:endParaRPr lang="de-DE" sz="500" dirty="0">
+              <a:latin typeface="Helvetica Neue LT Std 67 Medium Condensed" charset="0"/>
+              <a:ea typeface="Helvetica Neue LT Std 67 Medium Condensed" charset="0"/>
+              <a:cs typeface="Helvetica Neue LT Std 67 Medium Condensed" charset="0"/>
+            </a:endParaRPr>
+          </a:p>
+        </p:txBody>
+      </p:sp>
+      <p:sp>
+        <p:nvSpPr>
+          <p:cNvPr id="302" name="Textfeld 301"/>
+          <p:cNvSpPr txBox="1"/>
+          <p:nvPr/>
+        </p:nvSpPr>
+        <p:spPr>
+          <a:xfrm>
+            <a:off x="1423693" y="3935589"/>
+            <a:ext cx="669410" cy="169277"/>
+          </a:xfrm>
+          <a:prstGeom prst="rect">
+            <a:avLst/>
+          </a:prstGeom>
+          <a:noFill/>
+        </p:spPr>
+        <p:txBody>
+          <a:bodyPr wrap="square" rtlCol="0" anchor="t">
+            <a:spAutoFit/>
+          </a:bodyPr>
+          <a:lstStyle/>
+          <a:p>
+            <a:r>
+              <a:rPr lang="de-DE" sz="500" smtClean="0">
+                <a:solidFill>
+                  <a:srgbClr val="7030A0"/>
+                </a:solidFill>
+                <a:latin typeface="Helvetica Neue LT Std 67 Medium Condensed" charset="0"/>
+                <a:ea typeface="Helvetica Neue LT Std 67 Medium Condensed" charset="0"/>
+                <a:cs typeface="Helvetica Neue LT Std 67 Medium Condensed" charset="0"/>
+              </a:rPr>
+              <a:t>Select </a:t>
+            </a:r>
+            <a:r>
+              <a:rPr lang="de-DE" sz="500" dirty="0" smtClean="0">
+                <a:solidFill>
+                  <a:srgbClr val="7030A0"/>
+                </a:solidFill>
+                <a:latin typeface="Helvetica Neue LT Std 67 Medium Condensed" charset="0"/>
+                <a:ea typeface="Helvetica Neue LT Std 67 Medium Condensed" charset="0"/>
+                <a:cs typeface="Helvetica Neue LT Std 67 Medium Condensed" charset="0"/>
+              </a:rPr>
+              <a:t>All</a:t>
+            </a:r>
+            <a:endParaRPr lang="de-DE" sz="500" dirty="0" smtClean="0">
+              <a:solidFill>
+                <a:srgbClr val="7030A0"/>
+              </a:solidFill>
+              <a:latin typeface="Helvetica Neue LT Std 67 Medium Condensed" charset="0"/>
+              <a:ea typeface="Helvetica Neue LT Std 67 Medium Condensed" charset="0"/>
+              <a:cs typeface="Helvetica Neue LT Std 67 Medium Condensed" charset="0"/>
+            </a:endParaRPr>
+          </a:p>
+        </p:txBody>
+      </p:sp>
+      <p:sp>
+        <p:nvSpPr>
+          <p:cNvPr id="303" name="Rechteck 302"/>
+          <p:cNvSpPr/>
+          <p:nvPr/>
+        </p:nvSpPr>
+        <p:spPr>
+          <a:xfrm>
+            <a:off x="1323995" y="3929777"/>
+            <a:ext cx="261610" cy="184666"/>
+          </a:xfrm>
+          <a:prstGeom prst="rect">
+            <a:avLst/>
+          </a:prstGeom>
+        </p:spPr>
+        <p:txBody>
+          <a:bodyPr wrap="none">
+            <a:spAutoFit/>
+          </a:bodyPr>
+          <a:lstStyle/>
+          <a:p>
+            <a:r>
+              <a:rPr lang="de-DE" sz="600" b="1" dirty="0" smtClean="0">
+                <a:solidFill>
+                  <a:srgbClr val="7030A0"/>
+                </a:solidFill>
+                <a:latin typeface="Helvetica Neue LT Std 67 Medium Condensed" charset="0"/>
+                <a:ea typeface="Helvetica Neue LT Std 67 Medium Condensed" charset="0"/>
+                <a:cs typeface="Helvetica Neue LT Std 67 Medium Condensed" charset="0"/>
+              </a:rPr>
+              <a:t>⌘</a:t>
+            </a:r>
+            <a:endParaRPr lang="de-DE" sz="4000" b="1" dirty="0">
+              <a:solidFill>
+                <a:srgbClr val="7030A0"/>
+              </a:solidFill>
+            </a:endParaRPr>
+          </a:p>
+        </p:txBody>
+      </p:sp>
+      <p:sp>
+        <p:nvSpPr>
+          <p:cNvPr id="305" name="Textfeld 304"/>
+          <p:cNvSpPr txBox="1"/>
+          <p:nvPr/>
+        </p:nvSpPr>
+        <p:spPr>
+          <a:xfrm>
+            <a:off x="2290184" y="3775438"/>
+            <a:ext cx="759239" cy="220573"/>
+          </a:xfrm>
+          <a:prstGeom prst="rect">
+            <a:avLst/>
+          </a:prstGeom>
+          <a:noFill/>
+        </p:spPr>
+        <p:txBody>
+          <a:bodyPr wrap="square" rtlCol="0" anchor="t">
+            <a:spAutoFit/>
+          </a:bodyPr>
+          <a:lstStyle/>
+          <a:p>
+            <a:pPr algn="r">
+              <a:lnSpc>
+                <a:spcPts val="500"/>
+              </a:lnSpc>
+            </a:pPr>
+            <a:r>
+              <a:rPr lang="de-DE" sz="500" smtClean="0">
+                <a:latin typeface="Helvetica Neue LT Std 67 Medium Condensed" charset="0"/>
+                <a:ea typeface="Helvetica Neue LT Std 67 Medium Condensed" charset="0"/>
+                <a:cs typeface="Helvetica Neue LT Std 67 Medium Condensed" charset="0"/>
+              </a:rPr>
+              <a:t>          </a:t>
+            </a:r>
+            <a:r>
+              <a:rPr lang="de-DE" sz="500" smtClean="0">
+                <a:latin typeface="Helvetica Neue LT Std 67 Medium Condensed" charset="0"/>
+                <a:ea typeface="Helvetica Neue LT Std 67 Medium Condensed" charset="0"/>
+                <a:cs typeface="Helvetica Neue LT Std 67 Medium Condensed" charset="0"/>
+              </a:rPr>
+              <a:t>Dynamic</a:t>
+            </a:r>
+            <a:br>
+              <a:rPr lang="de-DE" sz="500" smtClean="0">
+                <a:latin typeface="Helvetica Neue LT Std 67 Medium Condensed" charset="0"/>
+                <a:ea typeface="Helvetica Neue LT Std 67 Medium Condensed" charset="0"/>
+                <a:cs typeface="Helvetica Neue LT Std 67 Medium Condensed" charset="0"/>
+              </a:rPr>
+            </a:br>
+            <a:r>
+              <a:rPr lang="de-DE" sz="500" smtClean="0">
+                <a:latin typeface="Helvetica Neue LT Std 67 Medium Condensed" charset="0"/>
+                <a:ea typeface="Helvetica Neue LT Std 67 Medium Condensed" charset="0"/>
+                <a:cs typeface="Helvetica Neue LT Std 67 Medium Condensed" charset="0"/>
+              </a:rPr>
+              <a:t>Split Items</a:t>
+            </a:r>
+            <a:endParaRPr lang="de-DE" sz="1000" dirty="0" smtClean="0">
+              <a:solidFill>
+                <a:schemeClr val="accent2">
+                  <a:lumMod val="75000"/>
+                </a:schemeClr>
+              </a:solidFill>
+              <a:latin typeface="Helvetica Neue LT Std 67 Medium Condensed" charset="0"/>
+              <a:ea typeface="Helvetica Neue LT Std 67 Medium Condensed" charset="0"/>
+              <a:cs typeface="Helvetica Neue LT Std 67 Medium Condensed" charset="0"/>
+            </a:endParaRPr>
+          </a:p>
+        </p:txBody>
+      </p:sp>
+      <p:sp>
+        <p:nvSpPr>
+          <p:cNvPr id="306" name="Rechteck 305"/>
+          <p:cNvSpPr/>
+          <p:nvPr/>
+        </p:nvSpPr>
+        <p:spPr>
+          <a:xfrm>
+            <a:off x="2510305" y="3916889"/>
+            <a:ext cx="538930" cy="220573"/>
+          </a:xfrm>
+          <a:prstGeom prst="rect">
+            <a:avLst/>
+          </a:prstGeom>
+        </p:spPr>
+        <p:txBody>
+          <a:bodyPr wrap="none">
+            <a:spAutoFit/>
+          </a:bodyPr>
+          <a:lstStyle/>
+          <a:p>
+            <a:pPr algn="r">
+              <a:lnSpc>
+                <a:spcPts val="500"/>
+              </a:lnSpc>
+            </a:pPr>
+            <a:r>
+              <a:rPr lang="de-DE" sz="500" dirty="0">
+                <a:solidFill>
+                  <a:schemeClr val="accent6">
+                    <a:lumMod val="75000"/>
+                  </a:schemeClr>
+                </a:solidFill>
+                <a:latin typeface="Helvetica Neue LT Std 67 Medium Condensed" charset="0"/>
+                <a:ea typeface="Helvetica Neue LT Std 67 Medium Condensed" charset="0"/>
+                <a:cs typeface="Helvetica Neue LT Std 67 Medium Condensed" charset="0"/>
+              </a:rPr>
+              <a:t>⌥ </a:t>
+            </a:r>
+            <a:r>
+              <a:rPr lang="de-DE" sz="500" dirty="0" err="1" smtClean="0">
+                <a:solidFill>
+                  <a:schemeClr val="accent6">
+                    <a:lumMod val="75000"/>
+                  </a:schemeClr>
+                </a:solidFill>
+                <a:latin typeface="Helvetica Neue LT Std 67 Medium Condensed" charset="0"/>
+                <a:ea typeface="Helvetica Neue LT Std 67 Medium Condensed" charset="0"/>
+                <a:cs typeface="Helvetica Neue LT Std 67 Medium Condensed" charset="0"/>
+              </a:rPr>
+              <a:t>Toggle</a:t>
+            </a:r>
+            <a:r>
+              <a:rPr lang="de-DE" sz="500" dirty="0" smtClean="0">
+                <a:solidFill>
+                  <a:schemeClr val="accent6">
+                    <a:lumMod val="75000"/>
+                  </a:schemeClr>
+                </a:solidFill>
+                <a:latin typeface="Helvetica Neue LT Std 67 Medium Condensed" charset="0"/>
+                <a:ea typeface="Helvetica Neue LT Std 67 Medium Condensed" charset="0"/>
+                <a:cs typeface="Helvetica Neue LT Std 67 Medium Condensed" charset="0"/>
+              </a:rPr>
+              <a:t/>
+            </a:r>
+            <a:br>
+              <a:rPr lang="de-DE" sz="500" dirty="0" smtClean="0">
+                <a:solidFill>
+                  <a:schemeClr val="accent6">
+                    <a:lumMod val="75000"/>
+                  </a:schemeClr>
+                </a:solidFill>
+                <a:latin typeface="Helvetica Neue LT Std 67 Medium Condensed" charset="0"/>
+                <a:ea typeface="Helvetica Neue LT Std 67 Medium Condensed" charset="0"/>
+                <a:cs typeface="Helvetica Neue LT Std 67 Medium Condensed" charset="0"/>
+              </a:rPr>
+            </a:br>
+            <a:r>
+              <a:rPr lang="de-DE" sz="500" dirty="0" smtClean="0">
+                <a:solidFill>
+                  <a:schemeClr val="accent6">
+                    <a:lumMod val="75000"/>
+                  </a:schemeClr>
+                </a:solidFill>
+                <a:latin typeface="Helvetica Neue LT Std 67 Medium Condensed" charset="0"/>
+                <a:ea typeface="Helvetica Neue LT Std 67 Medium Condensed" charset="0"/>
+                <a:cs typeface="Helvetica Neue LT Std 67 Medium Condensed" charset="0"/>
+              </a:rPr>
+              <a:t>Docker Visible</a:t>
+            </a:r>
+            <a:endParaRPr lang="de-DE" sz="500" dirty="0">
+              <a:solidFill>
+                <a:schemeClr val="accent6">
+                  <a:lumMod val="75000"/>
+                </a:schemeClr>
+              </a:solidFill>
+              <a:latin typeface="Helvetica Neue LT Std 67 Medium Condensed" charset="0"/>
+              <a:ea typeface="Helvetica Neue LT Std 67 Medium Condensed" charset="0"/>
+              <a:cs typeface="Helvetica Neue LT Std 67 Medium Condensed" charset="0"/>
+            </a:endParaRPr>
+          </a:p>
+        </p:txBody>
+      </p:sp>
+      <p:sp>
+        <p:nvSpPr>
+          <p:cNvPr id="308" name="Textfeld 307"/>
+          <p:cNvSpPr txBox="1"/>
+          <p:nvPr/>
+        </p:nvSpPr>
+        <p:spPr>
+          <a:xfrm>
+            <a:off x="5023706" y="3778557"/>
+            <a:ext cx="759239" cy="169277"/>
+          </a:xfrm>
+          <a:prstGeom prst="rect">
+            <a:avLst/>
+          </a:prstGeom>
+          <a:noFill/>
+        </p:spPr>
+        <p:txBody>
+          <a:bodyPr wrap="square" rtlCol="0" anchor="t">
+            <a:spAutoFit/>
+          </a:bodyPr>
+          <a:lstStyle/>
+          <a:p>
+            <a:r>
+              <a:rPr lang="de-DE" sz="500" dirty="0" smtClean="0">
+                <a:solidFill>
+                  <a:srgbClr val="7030A0"/>
+                </a:solidFill>
+                <a:latin typeface="Helvetica Neue LT Std 67 Medium Condensed" charset="0"/>
+                <a:ea typeface="Helvetica Neue LT Std 67 Medium Condensed" charset="0"/>
+                <a:cs typeface="Helvetica Neue LT Std 67 Medium Condensed" charset="0"/>
+              </a:rPr>
+              <a:t>Jump </a:t>
+            </a:r>
+            <a:r>
+              <a:rPr lang="de-DE" sz="500" dirty="0" err="1" smtClean="0">
+                <a:solidFill>
+                  <a:srgbClr val="7030A0"/>
+                </a:solidFill>
+                <a:latin typeface="Helvetica Neue LT Std 67 Medium Condensed" charset="0"/>
+                <a:ea typeface="Helvetica Neue LT Std 67 Medium Condensed" charset="0"/>
+                <a:cs typeface="Helvetica Neue LT Std 67 Medium Condensed" charset="0"/>
+              </a:rPr>
+              <a:t>To</a:t>
+            </a:r>
+            <a:r>
+              <a:rPr lang="de-DE" sz="500" dirty="0" smtClean="0">
+                <a:solidFill>
+                  <a:srgbClr val="7030A0"/>
+                </a:solidFill>
+                <a:latin typeface="Helvetica Neue LT Std 67 Medium Condensed" charset="0"/>
+                <a:ea typeface="Helvetica Neue LT Std 67 Medium Condensed" charset="0"/>
+                <a:cs typeface="Helvetica Neue LT Std 67 Medium Condensed" charset="0"/>
+              </a:rPr>
+              <a:t>...</a:t>
+            </a:r>
+            <a:endParaRPr lang="de-DE" sz="500" dirty="0" smtClean="0">
+              <a:solidFill>
+                <a:srgbClr val="7030A0"/>
+              </a:solidFill>
+              <a:latin typeface="Helvetica Neue LT Std 67 Medium Condensed" charset="0"/>
+              <a:ea typeface="Helvetica Neue LT Std 67 Medium Condensed" charset="0"/>
+              <a:cs typeface="Helvetica Neue LT Std 67 Medium Condensed" charset="0"/>
+            </a:endParaRPr>
+          </a:p>
+        </p:txBody>
+      </p:sp>
+      <p:sp>
+        <p:nvSpPr>
+          <p:cNvPr id="309" name="Rechteck 308"/>
+          <p:cNvSpPr/>
+          <p:nvPr/>
+        </p:nvSpPr>
+        <p:spPr>
+          <a:xfrm>
+            <a:off x="4925898" y="3762730"/>
+            <a:ext cx="261610" cy="184666"/>
+          </a:xfrm>
+          <a:prstGeom prst="rect">
+            <a:avLst/>
+          </a:prstGeom>
+        </p:spPr>
+        <p:txBody>
+          <a:bodyPr wrap="none">
+            <a:spAutoFit/>
+          </a:bodyPr>
+          <a:lstStyle/>
+          <a:p>
+            <a:r>
+              <a:rPr lang="de-DE" sz="600" b="1" dirty="0" smtClean="0">
+                <a:solidFill>
+                  <a:srgbClr val="7030A0"/>
+                </a:solidFill>
+                <a:latin typeface="Helvetica Neue LT Std 67 Medium Condensed" charset="0"/>
+                <a:ea typeface="Helvetica Neue LT Std 67 Medium Condensed" charset="0"/>
+                <a:cs typeface="Helvetica Neue LT Std 67 Medium Condensed" charset="0"/>
+              </a:rPr>
+              <a:t>⌘</a:t>
+            </a:r>
+            <a:endParaRPr lang="de-DE" sz="4000" b="1" dirty="0">
+              <a:solidFill>
+                <a:srgbClr val="7030A0"/>
+              </a:solidFill>
+            </a:endParaRPr>
+          </a:p>
+        </p:txBody>
+      </p:sp>
+      <p:sp>
+        <p:nvSpPr>
+          <p:cNvPr id="311" name="Rechteck 310"/>
+          <p:cNvSpPr/>
+          <p:nvPr/>
+        </p:nvSpPr>
+        <p:spPr>
+          <a:xfrm>
+            <a:off x="4655383" y="4304804"/>
+            <a:ext cx="248786" cy="246221"/>
+          </a:xfrm>
+          <a:prstGeom prst="rect">
+            <a:avLst/>
+          </a:prstGeom>
+        </p:spPr>
+        <p:txBody>
+          <a:bodyPr wrap="none">
+            <a:spAutoFit/>
+          </a:bodyPr>
+          <a:lstStyle/>
+          <a:p>
+            <a:r>
+              <a:rPr lang="de-DE" sz="1000" dirty="0" smtClean="0">
+                <a:solidFill>
+                  <a:schemeClr val="accent2">
+                    <a:lumMod val="75000"/>
+                  </a:schemeClr>
+                </a:solidFill>
+                <a:latin typeface="Helvetica Neue LT Std 67 Medium Condensed" charset="0"/>
+                <a:ea typeface="Helvetica Neue LT Std 67 Medium Condensed" charset="0"/>
+                <a:cs typeface="Helvetica Neue LT Std 67 Medium Condensed" charset="0"/>
+              </a:rPr>
+              <a:t>⇧</a:t>
+            </a:r>
+            <a:endParaRPr lang="de-DE" sz="1400" dirty="0"/>
+          </a:p>
+        </p:txBody>
+      </p:sp>
+      <p:sp>
+        <p:nvSpPr>
+          <p:cNvPr id="312" name="Rechteck 311"/>
+          <p:cNvSpPr/>
+          <p:nvPr/>
+        </p:nvSpPr>
+        <p:spPr>
+          <a:xfrm>
+            <a:off x="4729422" y="4344836"/>
+            <a:ext cx="436338" cy="287899"/>
+          </a:xfrm>
+          <a:prstGeom prst="rect">
+            <a:avLst/>
+          </a:prstGeom>
+        </p:spPr>
+        <p:txBody>
+          <a:bodyPr wrap="none">
+            <a:spAutoFit/>
+          </a:bodyPr>
+          <a:lstStyle/>
+          <a:p>
+            <a:pPr algn="r">
+              <a:lnSpc>
+                <a:spcPts val="500"/>
+              </a:lnSpc>
+            </a:pPr>
+            <a:r>
+              <a:rPr lang="de-DE" sz="500" dirty="0">
+                <a:solidFill>
+                  <a:schemeClr val="accent2">
+                    <a:lumMod val="75000"/>
+                  </a:schemeClr>
+                </a:solidFill>
+                <a:latin typeface="Helvetica Neue LT Std 67 Medium Condensed" charset="0"/>
+                <a:ea typeface="Helvetica Neue LT Std 67 Medium Condensed" charset="0"/>
+                <a:cs typeface="Helvetica Neue LT Std 67 Medium Condensed" charset="0"/>
+              </a:rPr>
+              <a:t> </a:t>
+            </a:r>
+            <a:r>
+              <a:rPr lang="de-DE" sz="500" dirty="0" err="1" smtClean="0">
+                <a:solidFill>
+                  <a:schemeClr val="accent2">
+                    <a:lumMod val="75000"/>
+                  </a:schemeClr>
+                </a:solidFill>
+                <a:latin typeface="Helvetica Neue LT Std 67 Medium Condensed" charset="0"/>
+                <a:ea typeface="Helvetica Neue LT Std 67 Medium Condensed" charset="0"/>
+                <a:cs typeface="Helvetica Neue LT Std 67 Medium Condensed" charset="0"/>
+              </a:rPr>
+              <a:t>Toggle</a:t>
+            </a:r>
+            <a:r>
+              <a:rPr lang="de-DE" sz="500" dirty="0">
+                <a:solidFill>
+                  <a:schemeClr val="accent2">
+                    <a:lumMod val="75000"/>
+                  </a:schemeClr>
+                </a:solidFill>
+                <a:latin typeface="Helvetica Neue LT Std 67 Medium Condensed" charset="0"/>
+                <a:ea typeface="Helvetica Neue LT Std 67 Medium Condensed" charset="0"/>
+                <a:cs typeface="Helvetica Neue LT Std 67 Medium Condensed" charset="0"/>
+              </a:rPr>
+              <a:t/>
+            </a:r>
+            <a:br>
+              <a:rPr lang="de-DE" sz="500" dirty="0">
+                <a:solidFill>
+                  <a:schemeClr val="accent2">
+                    <a:lumMod val="75000"/>
+                  </a:schemeClr>
+                </a:solidFill>
+                <a:latin typeface="Helvetica Neue LT Std 67 Medium Condensed" charset="0"/>
+                <a:ea typeface="Helvetica Neue LT Std 67 Medium Condensed" charset="0"/>
+                <a:cs typeface="Helvetica Neue LT Std 67 Medium Condensed" charset="0"/>
+              </a:rPr>
+            </a:br>
+            <a:r>
+              <a:rPr lang="de-DE" sz="500" dirty="0" err="1" smtClean="0">
+                <a:solidFill>
+                  <a:schemeClr val="accent2">
+                    <a:lumMod val="75000"/>
+                  </a:schemeClr>
+                </a:solidFill>
+                <a:latin typeface="Helvetica Neue LT Std 67 Medium Condensed" charset="0"/>
+                <a:ea typeface="Helvetica Neue LT Std 67 Medium Condensed" charset="0"/>
+                <a:cs typeface="Helvetica Neue LT Std 67 Medium Condensed" charset="0"/>
+              </a:rPr>
+              <a:t>Normalize</a:t>
+            </a:r>
+            <a:r>
+              <a:rPr lang="de-DE" sz="500" dirty="0" smtClean="0">
+                <a:solidFill>
+                  <a:schemeClr val="accent2">
+                    <a:lumMod val="75000"/>
+                  </a:schemeClr>
+                </a:solidFill>
+                <a:latin typeface="Helvetica Neue LT Std 67 Medium Condensed" charset="0"/>
+                <a:ea typeface="Helvetica Neue LT Std 67 Medium Condensed" charset="0"/>
+                <a:cs typeface="Helvetica Neue LT Std 67 Medium Condensed" charset="0"/>
+              </a:rPr>
+              <a:t/>
+            </a:r>
+            <a:br>
+              <a:rPr lang="de-DE" sz="500" dirty="0" smtClean="0">
+                <a:solidFill>
+                  <a:schemeClr val="accent2">
+                    <a:lumMod val="75000"/>
+                  </a:schemeClr>
+                </a:solidFill>
+                <a:latin typeface="Helvetica Neue LT Std 67 Medium Condensed" charset="0"/>
+                <a:ea typeface="Helvetica Neue LT Std 67 Medium Condensed" charset="0"/>
+                <a:cs typeface="Helvetica Neue LT Std 67 Medium Condensed" charset="0"/>
+              </a:rPr>
+            </a:br>
+            <a:r>
+              <a:rPr lang="de-DE" sz="500" dirty="0" smtClean="0">
+                <a:solidFill>
+                  <a:schemeClr val="accent2">
+                    <a:lumMod val="75000"/>
+                  </a:schemeClr>
+                </a:solidFill>
+                <a:latin typeface="Helvetica Neue LT Std 67 Medium Condensed" charset="0"/>
+                <a:ea typeface="Helvetica Neue LT Std 67 Medium Condensed" charset="0"/>
+                <a:cs typeface="Helvetica Neue LT Std 67 Medium Condensed" charset="0"/>
+              </a:rPr>
+              <a:t>Items</a:t>
+            </a:r>
+            <a:endParaRPr lang="de-DE" sz="500" dirty="0"/>
+          </a:p>
+        </p:txBody>
+      </p:sp>
+      <p:sp>
+        <p:nvSpPr>
+          <p:cNvPr id="313" name="Rechteck 312"/>
+          <p:cNvSpPr/>
+          <p:nvPr/>
+        </p:nvSpPr>
+        <p:spPr>
+          <a:xfrm>
+            <a:off x="7838804" y="3270632"/>
+            <a:ext cx="248786" cy="246221"/>
+          </a:xfrm>
+          <a:prstGeom prst="rect">
+            <a:avLst/>
+          </a:prstGeom>
+        </p:spPr>
+        <p:txBody>
+          <a:bodyPr wrap="none">
+            <a:spAutoFit/>
+          </a:bodyPr>
+          <a:lstStyle/>
+          <a:p>
+            <a:r>
+              <a:rPr lang="de-DE" sz="1000" dirty="0" smtClean="0">
+                <a:solidFill>
+                  <a:schemeClr val="accent2">
+                    <a:lumMod val="75000"/>
+                  </a:schemeClr>
+                </a:solidFill>
+                <a:latin typeface="Helvetica Neue LT Std 67 Medium Condensed" charset="0"/>
+                <a:ea typeface="Helvetica Neue LT Std 67 Medium Condensed" charset="0"/>
+                <a:cs typeface="Helvetica Neue LT Std 67 Medium Condensed" charset="0"/>
+              </a:rPr>
+              <a:t>⇧</a:t>
+            </a:r>
+            <a:endParaRPr lang="de-DE" sz="1400" dirty="0"/>
+          </a:p>
+        </p:txBody>
+      </p:sp>
+      <p:sp>
+        <p:nvSpPr>
+          <p:cNvPr id="314" name="Rechteck 313"/>
+          <p:cNvSpPr/>
+          <p:nvPr/>
+        </p:nvSpPr>
+        <p:spPr>
+          <a:xfrm>
+            <a:off x="7902015" y="3310664"/>
+            <a:ext cx="394660" cy="323165"/>
+          </a:xfrm>
+          <a:prstGeom prst="rect">
+            <a:avLst/>
+          </a:prstGeom>
+        </p:spPr>
+        <p:txBody>
+          <a:bodyPr wrap="none">
+            <a:spAutoFit/>
+          </a:bodyPr>
+          <a:lstStyle/>
+          <a:p>
+            <a:pPr algn="r"/>
+            <a:r>
+              <a:rPr lang="de-DE" sz="500" dirty="0" smtClean="0">
+                <a:solidFill>
+                  <a:schemeClr val="accent2">
+                    <a:lumMod val="75000"/>
+                  </a:schemeClr>
+                </a:solidFill>
+                <a:latin typeface="Helvetica Neue LT Std 67 Medium Condensed" charset="0"/>
+                <a:ea typeface="Helvetica Neue LT Std 67 Medium Condensed" charset="0"/>
+                <a:cs typeface="Helvetica Neue LT Std 67 Medium Condensed" charset="0"/>
+              </a:rPr>
+              <a:t>Zoom </a:t>
+            </a:r>
+            <a:r>
+              <a:rPr lang="de-DE" sz="500" dirty="0" err="1" smtClean="0">
+                <a:solidFill>
+                  <a:schemeClr val="accent2">
+                    <a:lumMod val="75000"/>
+                  </a:schemeClr>
+                </a:solidFill>
+                <a:latin typeface="Helvetica Neue LT Std 67 Medium Condensed" charset="0"/>
+                <a:ea typeface="Helvetica Neue LT Std 67 Medium Condensed" charset="0"/>
+                <a:cs typeface="Helvetica Neue LT Std 67 Medium Condensed" charset="0"/>
+              </a:rPr>
+              <a:t>to</a:t>
+            </a:r>
+            <a:r>
+              <a:rPr lang="de-DE" sz="500" dirty="0">
+                <a:solidFill>
+                  <a:schemeClr val="accent2">
+                    <a:lumMod val="75000"/>
+                  </a:schemeClr>
+                </a:solidFill>
+                <a:latin typeface="Helvetica Neue LT Std 67 Medium Condensed" charset="0"/>
+                <a:ea typeface="Helvetica Neue LT Std 67 Medium Condensed" charset="0"/>
+                <a:cs typeface="Helvetica Neue LT Std 67 Medium Condensed" charset="0"/>
+              </a:rPr>
+              <a:t/>
+            </a:r>
+            <a:br>
+              <a:rPr lang="de-DE" sz="500" dirty="0">
+                <a:solidFill>
+                  <a:schemeClr val="accent2">
+                    <a:lumMod val="75000"/>
+                  </a:schemeClr>
+                </a:solidFill>
+                <a:latin typeface="Helvetica Neue LT Std 67 Medium Condensed" charset="0"/>
+                <a:ea typeface="Helvetica Neue LT Std 67 Medium Condensed" charset="0"/>
+                <a:cs typeface="Helvetica Neue LT Std 67 Medium Condensed" charset="0"/>
+              </a:rPr>
+            </a:br>
+            <a:r>
+              <a:rPr lang="de-DE" sz="500" dirty="0" err="1" smtClean="0">
+                <a:solidFill>
+                  <a:schemeClr val="accent2">
+                    <a:lumMod val="75000"/>
+                  </a:schemeClr>
+                </a:solidFill>
+                <a:latin typeface="Helvetica Neue LT Std 67 Medium Condensed" charset="0"/>
+                <a:ea typeface="Helvetica Neue LT Std 67 Medium Condensed" charset="0"/>
+                <a:cs typeface="Helvetica Neue LT Std 67 Medium Condensed" charset="0"/>
+              </a:rPr>
+              <a:t>selected</a:t>
+            </a:r>
+            <a:r>
+              <a:rPr lang="de-DE" sz="500" dirty="0" smtClean="0">
+                <a:solidFill>
+                  <a:schemeClr val="accent2">
+                    <a:lumMod val="75000"/>
+                  </a:schemeClr>
+                </a:solidFill>
+                <a:latin typeface="Helvetica Neue LT Std 67 Medium Condensed" charset="0"/>
+                <a:ea typeface="Helvetica Neue LT Std 67 Medium Condensed" charset="0"/>
+                <a:cs typeface="Helvetica Neue LT Std 67 Medium Condensed" charset="0"/>
+              </a:rPr>
+              <a:t/>
+            </a:r>
+            <a:br>
+              <a:rPr lang="de-DE" sz="500" dirty="0" smtClean="0">
+                <a:solidFill>
+                  <a:schemeClr val="accent2">
+                    <a:lumMod val="75000"/>
+                  </a:schemeClr>
+                </a:solidFill>
+                <a:latin typeface="Helvetica Neue LT Std 67 Medium Condensed" charset="0"/>
+                <a:ea typeface="Helvetica Neue LT Std 67 Medium Condensed" charset="0"/>
+                <a:cs typeface="Helvetica Neue LT Std 67 Medium Condensed" charset="0"/>
+              </a:rPr>
+            </a:br>
+            <a:r>
+              <a:rPr lang="de-DE" sz="500" dirty="0" smtClean="0">
+                <a:solidFill>
+                  <a:schemeClr val="accent2">
+                    <a:lumMod val="75000"/>
+                  </a:schemeClr>
+                </a:solidFill>
+                <a:latin typeface="Helvetica Neue LT Std 67 Medium Condensed" charset="0"/>
+                <a:ea typeface="Helvetica Neue LT Std 67 Medium Condensed" charset="0"/>
+                <a:cs typeface="Helvetica Neue LT Std 67 Medium Condensed" charset="0"/>
+              </a:rPr>
+              <a:t>Items</a:t>
+            </a:r>
+            <a:endParaRPr lang="de-DE" sz="500" dirty="0"/>
           </a:p>
         </p:txBody>
       </p:sp>

</xml_diff>

<commit_message>
Typo successfully fixed, alt+.
</commit_message>
<xml_diff>
--- a/Documentation/Keymap.pptx
+++ b/Documentation/Keymap.pptx
@@ -17053,7 +17053,7 @@
         <p:spPr>
           <a:xfrm>
             <a:off x="6208138" y="4411644"/>
-            <a:ext cx="759239" cy="323165"/>
+            <a:ext cx="759239" cy="246221"/>
           </a:xfrm>
           <a:prstGeom prst="rect">
             <a:avLst/>
@@ -17091,35 +17091,20 @@
               </a:rPr>
             </a:br>
             <a:r>
+              <a:rPr lang="de-DE" sz="500" dirty="0" smtClean="0">
+                <a:latin typeface="Helvetica Neue LT Std 67 Medium Condensed" charset="0"/>
+                <a:ea typeface="Helvetica Neue LT Std 67 Medium Condensed" charset="0"/>
+                <a:cs typeface="Helvetica Neue LT Std 67 Medium Condensed" charset="0"/>
+              </a:rPr>
+              <a:t>All </a:t>
+            </a:r>
+            <a:r>
               <a:rPr lang="de-DE" sz="500" dirty="0" err="1" smtClean="0">
                 <a:latin typeface="Helvetica Neue LT Std 67 Medium Condensed" charset="0"/>
                 <a:ea typeface="Helvetica Neue LT Std 67 Medium Condensed" charset="0"/>
                 <a:cs typeface="Helvetica Neue LT Std 67 Medium Condensed" charset="0"/>
               </a:rPr>
-              <a:t>Cough</a:t>
-            </a:r>
-            <a:r>
-              <a:rPr lang="de-DE" sz="500" dirty="0" smtClean="0">
-                <a:latin typeface="Helvetica Neue LT Std 67 Medium Condensed" charset="0"/>
-                <a:ea typeface="Helvetica Neue LT Std 67 Medium Condensed" charset="0"/>
-                <a:cs typeface="Helvetica Neue LT Std 67 Medium Condensed" charset="0"/>
-              </a:rPr>
-              <a:t>-Button</a:t>
-            </a:r>
-            <a:br>
-              <a:rPr lang="de-DE" sz="500" dirty="0" smtClean="0">
-                <a:latin typeface="Helvetica Neue LT Std 67 Medium Condensed" charset="0"/>
-                <a:ea typeface="Helvetica Neue LT Std 67 Medium Condensed" charset="0"/>
-                <a:cs typeface="Helvetica Neue LT Std 67 Medium Condensed" charset="0"/>
-              </a:rPr>
-            </a:br>
-            <a:r>
-              <a:rPr lang="de-DE" sz="500" dirty="0" smtClean="0">
-                <a:latin typeface="Helvetica Neue LT Std 67 Medium Condensed" charset="0"/>
-                <a:ea typeface="Helvetica Neue LT Std 67 Medium Condensed" charset="0"/>
-                <a:cs typeface="Helvetica Neue LT Std 67 Medium Condensed" charset="0"/>
-              </a:rPr>
-              <a:t>Mute Lane</a:t>
+              <a:t>Envelopes</a:t>
             </a:r>
             <a:endParaRPr lang="de-DE" sz="500" dirty="0" smtClean="0">
               <a:solidFill>
@@ -19969,6 +19954,109 @@
               <a:solidFill>
                 <a:srgbClr val="7030A0"/>
               </a:solidFill>
+            </a:endParaRPr>
+          </a:p>
+        </p:txBody>
+      </p:sp>
+      <p:sp>
+        <p:nvSpPr>
+          <p:cNvPr id="318" name="Rechteck 317"/>
+          <p:cNvSpPr/>
+          <p:nvPr/>
+        </p:nvSpPr>
+        <p:spPr>
+          <a:xfrm>
+            <a:off x="6399952" y="4578662"/>
+            <a:ext cx="566182" cy="220573"/>
+          </a:xfrm>
+          <a:prstGeom prst="rect">
+            <a:avLst/>
+          </a:prstGeom>
+        </p:spPr>
+        <p:txBody>
+          <a:bodyPr wrap="none">
+            <a:spAutoFit/>
+          </a:bodyPr>
+          <a:lstStyle/>
+          <a:p>
+            <a:pPr algn="r">
+              <a:lnSpc>
+                <a:spcPts val="500"/>
+              </a:lnSpc>
+            </a:pPr>
+            <a:r>
+              <a:rPr lang="de-DE" sz="500" dirty="0">
+                <a:solidFill>
+                  <a:schemeClr val="accent6">
+                    <a:lumMod val="75000"/>
+                  </a:schemeClr>
+                </a:solidFill>
+                <a:latin typeface="Helvetica Neue LT Std 67 Medium Condensed" charset="0"/>
+                <a:ea typeface="Helvetica Neue LT Std 67 Medium Condensed" charset="0"/>
+                <a:cs typeface="Helvetica Neue LT Std 67 Medium Condensed" charset="0"/>
+              </a:rPr>
+              <a:t>⌥ </a:t>
+            </a:r>
+            <a:r>
+              <a:rPr lang="de-DE" sz="500" dirty="0" err="1" smtClean="0">
+                <a:solidFill>
+                  <a:schemeClr val="accent6">
+                    <a:lumMod val="75000"/>
+                  </a:schemeClr>
+                </a:solidFill>
+                <a:latin typeface="Helvetica Neue LT Std 67 Medium Condensed" charset="0"/>
+                <a:ea typeface="Helvetica Neue LT Std 67 Medium Condensed" charset="0"/>
+                <a:cs typeface="Helvetica Neue LT Std 67 Medium Condensed" charset="0"/>
+              </a:rPr>
+              <a:t>Toggle</a:t>
+            </a:r>
+            <a:r>
+              <a:rPr lang="de-DE" sz="500" dirty="0" smtClean="0">
+                <a:solidFill>
+                  <a:schemeClr val="accent6">
+                    <a:lumMod val="75000"/>
+                  </a:schemeClr>
+                </a:solidFill>
+                <a:latin typeface="Helvetica Neue LT Std 67 Medium Condensed" charset="0"/>
+                <a:ea typeface="Helvetica Neue LT Std 67 Medium Condensed" charset="0"/>
+                <a:cs typeface="Helvetica Neue LT Std 67 Medium Condensed" charset="0"/>
+              </a:rPr>
+              <a:t> Mute</a:t>
+            </a:r>
+            <a:br>
+              <a:rPr lang="de-DE" sz="500" dirty="0" smtClean="0">
+                <a:solidFill>
+                  <a:schemeClr val="accent6">
+                    <a:lumMod val="75000"/>
+                  </a:schemeClr>
+                </a:solidFill>
+                <a:latin typeface="Helvetica Neue LT Std 67 Medium Condensed" charset="0"/>
+                <a:ea typeface="Helvetica Neue LT Std 67 Medium Condensed" charset="0"/>
+                <a:cs typeface="Helvetica Neue LT Std 67 Medium Condensed" charset="0"/>
+              </a:rPr>
+            </a:br>
+            <a:r>
+              <a:rPr lang="de-DE" sz="500" dirty="0" err="1" smtClean="0">
+                <a:solidFill>
+                  <a:schemeClr val="accent6">
+                    <a:lumMod val="75000"/>
+                  </a:schemeClr>
+                </a:solidFill>
+                <a:latin typeface="Helvetica Neue LT Std 67 Medium Condensed" charset="0"/>
+                <a:ea typeface="Helvetica Neue LT Std 67 Medium Condensed" charset="0"/>
+                <a:cs typeface="Helvetica Neue LT Std 67 Medium Condensed" charset="0"/>
+              </a:rPr>
+              <a:t>Envelope</a:t>
+            </a:r>
+            <a:endParaRPr lang="de-DE" sz="500" dirty="0">
+              <a:solidFill>
+                <a:schemeClr val="accent6">
+                  <a:lumMod val="75000"/>
+                </a:schemeClr>
+              </a:solidFill>
+              <a:latin typeface="Helvetica Neue LT Std 67 Medium Condensed" charset="0"/>
+              <a:ea typeface="Helvetica Neue LT Std 67 Medium Condensed" charset="0"/>
+              <a:cs typeface="Helvetica Neue LT Std 67 Medium Condensed" charset="0"/>
             </a:endParaRPr>
           </a:p>
         </p:txBody>

</xml_diff>

<commit_message>
Toggle recArm all Tracks
</commit_message>
<xml_diff>
--- a/Documentation/Keymap.pptx
+++ b/Documentation/Keymap.pptx
@@ -197,7 +197,7 @@
           <a:p>
             <a:fld id="{D04F8CED-0623-C742-B972-F53D35E16E19}" type="datetimeFigureOut">
               <a:rPr lang="de-DE" smtClean="0"/>
-              <a:t>12.11.17</a:t>
+              <a:t>02.12.17</a:t>
             </a:fld>
             <a:endParaRPr lang="de-DE"/>
           </a:p>
@@ -680,7 +680,7 @@
           <a:p>
             <a:fld id="{A97692CC-6688-1145-811E-FE1ABB97A7A4}" type="datetimeFigureOut">
               <a:rPr lang="de-DE" smtClean="0"/>
-              <a:t>12.11.17</a:t>
+              <a:t>02.12.17</a:t>
             </a:fld>
             <a:endParaRPr lang="de-DE"/>
           </a:p>
@@ -845,7 +845,7 @@
           <a:p>
             <a:fld id="{A97692CC-6688-1145-811E-FE1ABB97A7A4}" type="datetimeFigureOut">
               <a:rPr lang="de-DE" smtClean="0"/>
-              <a:t>12.11.17</a:t>
+              <a:t>02.12.17</a:t>
             </a:fld>
             <a:endParaRPr lang="de-DE"/>
           </a:p>
@@ -1020,7 +1020,7 @@
           <a:p>
             <a:fld id="{A97692CC-6688-1145-811E-FE1ABB97A7A4}" type="datetimeFigureOut">
               <a:rPr lang="de-DE" smtClean="0"/>
-              <a:t>12.11.17</a:t>
+              <a:t>02.12.17</a:t>
             </a:fld>
             <a:endParaRPr lang="de-DE"/>
           </a:p>
@@ -1185,7 +1185,7 @@
           <a:p>
             <a:fld id="{A97692CC-6688-1145-811E-FE1ABB97A7A4}" type="datetimeFigureOut">
               <a:rPr lang="de-DE" smtClean="0"/>
-              <a:t>12.11.17</a:t>
+              <a:t>02.12.17</a:t>
             </a:fld>
             <a:endParaRPr lang="de-DE"/>
           </a:p>
@@ -1424,7 +1424,7 @@
           <a:p>
             <a:fld id="{A97692CC-6688-1145-811E-FE1ABB97A7A4}" type="datetimeFigureOut">
               <a:rPr lang="de-DE" smtClean="0"/>
-              <a:t>12.11.17</a:t>
+              <a:t>02.12.17</a:t>
             </a:fld>
             <a:endParaRPr lang="de-DE"/>
           </a:p>
@@ -1651,7 +1651,7 @@
           <a:p>
             <a:fld id="{A97692CC-6688-1145-811E-FE1ABB97A7A4}" type="datetimeFigureOut">
               <a:rPr lang="de-DE" smtClean="0"/>
-              <a:t>12.11.17</a:t>
+              <a:t>02.12.17</a:t>
             </a:fld>
             <a:endParaRPr lang="de-DE"/>
           </a:p>
@@ -2013,7 +2013,7 @@
           <a:p>
             <a:fld id="{A97692CC-6688-1145-811E-FE1ABB97A7A4}" type="datetimeFigureOut">
               <a:rPr lang="de-DE" smtClean="0"/>
-              <a:t>12.11.17</a:t>
+              <a:t>02.12.17</a:t>
             </a:fld>
             <a:endParaRPr lang="de-DE"/>
           </a:p>
@@ -2126,7 +2126,7 @@
           <a:p>
             <a:fld id="{A97692CC-6688-1145-811E-FE1ABB97A7A4}" type="datetimeFigureOut">
               <a:rPr lang="de-DE" smtClean="0"/>
-              <a:t>12.11.17</a:t>
+              <a:t>02.12.17</a:t>
             </a:fld>
             <a:endParaRPr lang="de-DE"/>
           </a:p>
@@ -2216,7 +2216,7 @@
           <a:p>
             <a:fld id="{A97692CC-6688-1145-811E-FE1ABB97A7A4}" type="datetimeFigureOut">
               <a:rPr lang="de-DE" smtClean="0"/>
-              <a:t>12.11.17</a:t>
+              <a:t>02.12.17</a:t>
             </a:fld>
             <a:endParaRPr lang="de-DE"/>
           </a:p>
@@ -2488,7 +2488,7 @@
           <a:p>
             <a:fld id="{A97692CC-6688-1145-811E-FE1ABB97A7A4}" type="datetimeFigureOut">
               <a:rPr lang="de-DE" smtClean="0"/>
-              <a:t>12.11.17</a:t>
+              <a:t>02.12.17</a:t>
             </a:fld>
             <a:endParaRPr lang="de-DE"/>
           </a:p>
@@ -2740,7 +2740,7 @@
           <a:p>
             <a:fld id="{A97692CC-6688-1145-811E-FE1ABB97A7A4}" type="datetimeFigureOut">
               <a:rPr lang="de-DE" smtClean="0"/>
-              <a:t>12.11.17</a:t>
+              <a:t>02.12.17</a:t>
             </a:fld>
             <a:endParaRPr lang="de-DE"/>
           </a:p>
@@ -2948,7 +2948,7 @@
           <a:p>
             <a:fld id="{A97692CC-6688-1145-811E-FE1ABB97A7A4}" type="datetimeFigureOut">
               <a:rPr lang="de-DE" smtClean="0"/>
-              <a:t>12.11.17</a:t>
+              <a:t>02.12.17</a:t>
             </a:fld>
             <a:endParaRPr lang="de-DE"/>
           </a:p>
@@ -3557,14 +3557,6 @@
               </a:rPr>
               <a:t>Mode</a:t>
             </a:r>
-            <a:endParaRPr lang="de-DE" sz="500" dirty="0" smtClean="0">
-              <a:solidFill>
-                <a:srgbClr val="7030A0"/>
-              </a:solidFill>
-              <a:latin typeface="Helvetica Neue LT Std 67 Medium Condensed" charset="0"/>
-              <a:ea typeface="Helvetica Neue LT Std 67 Medium Condensed" charset="0"/>
-              <a:cs typeface="Helvetica Neue LT Std 67 Medium Condensed" charset="0"/>
-            </a:endParaRPr>
           </a:p>
         </p:txBody>
       </p:sp>
@@ -21287,14 +21279,6 @@
               </a:rPr>
               <a:t>Time Sel.</a:t>
             </a:r>
-            <a:endParaRPr lang="de-DE" sz="500" dirty="0" smtClean="0">
-              <a:solidFill>
-                <a:srgbClr val="7030A0"/>
-              </a:solidFill>
-              <a:latin typeface="Helvetica Neue LT Std 67 Medium Condensed" charset="0"/>
-              <a:ea typeface="Helvetica Neue LT Std 67 Medium Condensed" charset="0"/>
-              <a:cs typeface="Helvetica Neue LT Std 67 Medium Condensed" charset="0"/>
-            </a:endParaRPr>
           </a:p>
         </p:txBody>
       </p:sp>
@@ -21335,6 +21319,151 @@
                 <a:srgbClr val="7030A0"/>
               </a:solidFill>
             </a:endParaRPr>
+          </a:p>
+        </p:txBody>
+      </p:sp>
+      <p:sp>
+        <p:nvSpPr>
+          <p:cNvPr id="352" name="Rechteck 351"/>
+          <p:cNvSpPr/>
+          <p:nvPr/>
+        </p:nvSpPr>
+        <p:spPr>
+          <a:xfrm>
+            <a:off x="1410005" y="3981964"/>
+            <a:ext cx="248786" cy="246221"/>
+          </a:xfrm>
+          <a:prstGeom prst="rect">
+            <a:avLst/>
+          </a:prstGeom>
+        </p:spPr>
+        <p:txBody>
+          <a:bodyPr wrap="none">
+            <a:spAutoFit/>
+          </a:bodyPr>
+          <a:lstStyle/>
+          <a:p>
+            <a:r>
+              <a:rPr lang="de-DE" sz="1000" dirty="0" smtClean="0">
+                <a:solidFill>
+                  <a:schemeClr val="accent2">
+                    <a:lumMod val="75000"/>
+                  </a:schemeClr>
+                </a:solidFill>
+                <a:latin typeface="Helvetica Neue LT Std 67 Medium Condensed" charset="0"/>
+                <a:ea typeface="Helvetica Neue LT Std 67 Medium Condensed" charset="0"/>
+                <a:cs typeface="Helvetica Neue LT Std 67 Medium Condensed" charset="0"/>
+              </a:rPr>
+              <a:t>⇧</a:t>
+            </a:r>
+            <a:endParaRPr lang="de-DE" sz="1400" dirty="0"/>
+          </a:p>
+        </p:txBody>
+      </p:sp>
+      <p:sp>
+        <p:nvSpPr>
+          <p:cNvPr id="361" name="Rechteck 360"/>
+          <p:cNvSpPr/>
+          <p:nvPr/>
+        </p:nvSpPr>
+        <p:spPr>
+          <a:xfrm>
+            <a:off x="1478029" y="4026809"/>
+            <a:ext cx="367408" cy="221471"/>
+          </a:xfrm>
+          <a:prstGeom prst="rect">
+            <a:avLst/>
+          </a:prstGeom>
+        </p:spPr>
+        <p:txBody>
+          <a:bodyPr wrap="none">
+            <a:spAutoFit/>
+          </a:bodyPr>
+          <a:lstStyle/>
+          <a:p>
+            <a:pPr>
+              <a:lnSpc>
+                <a:spcPts val="500"/>
+              </a:lnSpc>
+            </a:pPr>
+            <a:r>
+              <a:rPr lang="de-DE" sz="500" dirty="0">
+                <a:solidFill>
+                  <a:schemeClr val="accent2">
+                    <a:lumMod val="75000"/>
+                  </a:schemeClr>
+                </a:solidFill>
+                <a:latin typeface="Helvetica Neue LT Std 67 Medium Condensed" charset="0"/>
+                <a:ea typeface="Helvetica Neue LT Std 67 Medium Condensed" charset="0"/>
+                <a:cs typeface="Helvetica Neue LT Std 67 Medium Condensed" charset="0"/>
+              </a:rPr>
+              <a:t> </a:t>
+            </a:r>
+            <a:r>
+              <a:rPr lang="de-DE" sz="500" dirty="0" err="1" smtClean="0">
+                <a:solidFill>
+                  <a:schemeClr val="accent2">
+                    <a:lumMod val="75000"/>
+                  </a:schemeClr>
+                </a:solidFill>
+                <a:latin typeface="Helvetica Neue LT Std 67 Medium Condensed" charset="0"/>
+                <a:ea typeface="Helvetica Neue LT Std 67 Medium Condensed" charset="0"/>
+                <a:cs typeface="Helvetica Neue LT Std 67 Medium Condensed" charset="0"/>
+              </a:rPr>
+              <a:t>Toggle</a:t>
+            </a:r>
+            <a:r>
+              <a:rPr lang="de-DE" sz="500" dirty="0" smtClean="0">
+                <a:solidFill>
+                  <a:schemeClr val="accent2">
+                    <a:lumMod val="75000"/>
+                  </a:schemeClr>
+                </a:solidFill>
+                <a:latin typeface="Helvetica Neue LT Std 67 Medium Condensed" charset="0"/>
+                <a:ea typeface="Helvetica Neue LT Std 67 Medium Condensed" charset="0"/>
+                <a:cs typeface="Helvetica Neue LT Std 67 Medium Condensed" charset="0"/>
+              </a:rPr>
+              <a:t/>
+            </a:r>
+            <a:br>
+              <a:rPr lang="de-DE" sz="500" dirty="0" smtClean="0">
+                <a:solidFill>
+                  <a:schemeClr val="accent2">
+                    <a:lumMod val="75000"/>
+                  </a:schemeClr>
+                </a:solidFill>
+                <a:latin typeface="Helvetica Neue LT Std 67 Medium Condensed" charset="0"/>
+                <a:ea typeface="Helvetica Neue LT Std 67 Medium Condensed" charset="0"/>
+                <a:cs typeface="Helvetica Neue LT Std 67 Medium Condensed" charset="0"/>
+              </a:rPr>
+            </a:br>
+            <a:r>
+              <a:rPr lang="de-DE" sz="500" dirty="0" err="1" smtClean="0">
+                <a:solidFill>
+                  <a:schemeClr val="accent2">
+                    <a:lumMod val="75000"/>
+                  </a:schemeClr>
+                </a:solidFill>
+                <a:latin typeface="Helvetica Neue LT Std 67 Medium Condensed" charset="0"/>
+                <a:ea typeface="Helvetica Neue LT Std 67 Medium Condensed" charset="0"/>
+                <a:cs typeface="Helvetica Neue LT Std 67 Medium Condensed" charset="0"/>
+              </a:rPr>
+              <a:t>recAr</a:t>
+            </a:r>
+            <a:r>
+              <a:rPr lang="de-DE" sz="500" dirty="0" err="1">
+                <a:solidFill>
+                  <a:schemeClr val="accent2">
+                    <a:lumMod val="75000"/>
+                  </a:schemeClr>
+                </a:solidFill>
+                <a:latin typeface="Helvetica Neue LT Std 67 Medium Condensed" charset="0"/>
+                <a:ea typeface="Helvetica Neue LT Std 67 Medium Condensed" charset="0"/>
+                <a:cs typeface="Helvetica Neue LT Std 67 Medium Condensed" charset="0"/>
+              </a:rPr>
+              <a:t>m</a:t>
+            </a:r>
+            <a:endParaRPr lang="de-DE" sz="500" dirty="0"/>
           </a:p>
         </p:txBody>
       </p:sp>

</xml_diff>

<commit_message>
Added: toggle envelope height (shift + h)
</commit_message>
<xml_diff>
--- a/Documentation/Keymap.pptx
+++ b/Documentation/Keymap.pptx
@@ -4350,7 +4350,7 @@
         </p:nvSpPr>
         <p:spPr>
           <a:xfrm>
-            <a:off x="4101876" y="3780303"/>
+            <a:off x="4106358" y="3748929"/>
             <a:ext cx="759239" cy="246221"/>
           </a:xfrm>
           <a:prstGeom prst="rect">
@@ -14593,7 +14593,7 @@
         </p:nvSpPr>
         <p:spPr>
           <a:xfrm>
-            <a:off x="4287959" y="4029640"/>
+            <a:off x="4278995" y="4043086"/>
             <a:ext cx="260008" cy="253916"/>
           </a:xfrm>
           <a:prstGeom prst="rect">
@@ -20987,7 +20987,7 @@
         </p:nvSpPr>
         <p:spPr>
           <a:xfrm>
-            <a:off x="4404237" y="4035578"/>
+            <a:off x="4408719" y="4062470"/>
             <a:ext cx="463588" cy="220573"/>
           </a:xfrm>
           <a:prstGeom prst="rect">
@@ -21462,6 +21462,156 @@
                 <a:cs typeface="Helvetica Neue LT Std 67 Medium Condensed" charset="0"/>
               </a:rPr>
               <a:t>m</a:t>
+            </a:r>
+            <a:endParaRPr lang="de-DE" sz="500" dirty="0"/>
+          </a:p>
+        </p:txBody>
+      </p:sp>
+      <p:sp>
+        <p:nvSpPr>
+          <p:cNvPr id="362" name="Rechteck 361"/>
+          <p:cNvSpPr/>
+          <p:nvPr/>
+        </p:nvSpPr>
+        <p:spPr>
+          <a:xfrm>
+            <a:off x="4454008" y="3856194"/>
+            <a:ext cx="248786" cy="246221"/>
+          </a:xfrm>
+          <a:prstGeom prst="rect">
+            <a:avLst/>
+          </a:prstGeom>
+        </p:spPr>
+        <p:txBody>
+          <a:bodyPr wrap="none">
+            <a:spAutoFit/>
+          </a:bodyPr>
+          <a:lstStyle/>
+          <a:p>
+            <a:r>
+              <a:rPr lang="de-DE" sz="1000" dirty="0" smtClean="0">
+                <a:solidFill>
+                  <a:schemeClr val="accent2">
+                    <a:lumMod val="75000"/>
+                  </a:schemeClr>
+                </a:solidFill>
+                <a:latin typeface="Helvetica Neue LT Std 67 Medium Condensed" charset="0"/>
+                <a:ea typeface="Helvetica Neue LT Std 67 Medium Condensed" charset="0"/>
+                <a:cs typeface="Helvetica Neue LT Std 67 Medium Condensed" charset="0"/>
+              </a:rPr>
+              <a:t>⇧</a:t>
+            </a:r>
+            <a:endParaRPr lang="de-DE" sz="1400" dirty="0"/>
+          </a:p>
+        </p:txBody>
+      </p:sp>
+      <p:sp>
+        <p:nvSpPr>
+          <p:cNvPr id="363" name="Rechteck 362"/>
+          <p:cNvSpPr/>
+          <p:nvPr/>
+        </p:nvSpPr>
+        <p:spPr>
+          <a:xfrm>
+            <a:off x="4291791" y="3913480"/>
+            <a:ext cx="579005" cy="220573"/>
+          </a:xfrm>
+          <a:prstGeom prst="rect">
+            <a:avLst/>
+          </a:prstGeom>
+        </p:spPr>
+        <p:txBody>
+          <a:bodyPr wrap="none">
+            <a:spAutoFit/>
+          </a:bodyPr>
+          <a:lstStyle/>
+          <a:p>
+            <a:pPr algn="r">
+              <a:lnSpc>
+                <a:spcPts val="500"/>
+              </a:lnSpc>
+            </a:pPr>
+            <a:r>
+              <a:rPr lang="de-DE" sz="500" dirty="0">
+                <a:solidFill>
+                  <a:schemeClr val="accent2">
+                    <a:lumMod val="75000"/>
+                  </a:schemeClr>
+                </a:solidFill>
+                <a:latin typeface="Helvetica Neue LT Std 67 Medium Condensed" charset="0"/>
+                <a:ea typeface="Helvetica Neue LT Std 67 Medium Condensed" charset="0"/>
+                <a:cs typeface="Helvetica Neue LT Std 67 Medium Condensed" charset="0"/>
+              </a:rPr>
+              <a:t> </a:t>
+            </a:r>
+            <a:r>
+              <a:rPr lang="de-DE" sz="500" dirty="0" err="1" smtClean="0">
+                <a:solidFill>
+                  <a:schemeClr val="accent2">
+                    <a:lumMod val="75000"/>
+                  </a:schemeClr>
+                </a:solidFill>
+                <a:latin typeface="Helvetica Neue LT Std 67 Medium Condensed" charset="0"/>
+                <a:ea typeface="Helvetica Neue LT Std 67 Medium Condensed" charset="0"/>
+                <a:cs typeface="Helvetica Neue LT Std 67 Medium Condensed" charset="0"/>
+              </a:rPr>
+              <a:t>Toggle</a:t>
+            </a:r>
+            <a:endParaRPr lang="de-DE" sz="500" dirty="0">
+              <a:solidFill>
+                <a:schemeClr val="accent2">
+                  <a:lumMod val="75000"/>
+                </a:schemeClr>
+              </a:solidFill>
+              <a:latin typeface="Helvetica Neue LT Std 67 Medium Condensed" charset="0"/>
+              <a:ea typeface="Helvetica Neue LT Std 67 Medium Condensed" charset="0"/>
+              <a:cs typeface="Helvetica Neue LT Std 67 Medium Condensed" charset="0"/>
+            </a:endParaRPr>
+          </a:p>
+          <a:p>
+            <a:pPr>
+              <a:lnSpc>
+                <a:spcPts val="500"/>
+              </a:lnSpc>
+            </a:pPr>
+            <a:r>
+              <a:rPr lang="de-DE" sz="500" dirty="0" err="1" smtClean="0">
+                <a:solidFill>
+                  <a:schemeClr val="accent2">
+                    <a:lumMod val="75000"/>
+                  </a:schemeClr>
+                </a:solidFill>
+                <a:latin typeface="Helvetica Neue LT Std 67 Medium Condensed" charset="0"/>
+                <a:ea typeface="Helvetica Neue LT Std 67 Medium Condensed" charset="0"/>
+                <a:cs typeface="Helvetica Neue LT Std 67 Medium Condensed" charset="0"/>
+              </a:rPr>
+              <a:t>Envelope</a:t>
+            </a:r>
+            <a:r>
+              <a:rPr lang="de-DE" sz="500" dirty="0" smtClean="0">
+                <a:solidFill>
+                  <a:schemeClr val="accent2">
+                    <a:lumMod val="75000"/>
+                  </a:schemeClr>
+                </a:solidFill>
+                <a:latin typeface="Helvetica Neue LT Std 67 Medium Condensed" charset="0"/>
+                <a:ea typeface="Helvetica Neue LT Std 67 Medium Condensed" charset="0"/>
+                <a:cs typeface="Helvetica Neue LT Std 67 Medium Condensed" charset="0"/>
+              </a:rPr>
+              <a:t> </a:t>
+            </a:r>
+            <a:r>
+              <a:rPr lang="de-DE" sz="500" dirty="0" err="1" smtClean="0">
+                <a:solidFill>
+                  <a:schemeClr val="accent2">
+                    <a:lumMod val="75000"/>
+                  </a:schemeClr>
+                </a:solidFill>
+                <a:latin typeface="Helvetica Neue LT Std 67 Medium Condensed" charset="0"/>
+                <a:ea typeface="Helvetica Neue LT Std 67 Medium Condensed" charset="0"/>
+                <a:cs typeface="Helvetica Neue LT Std 67 Medium Condensed" charset="0"/>
+              </a:rPr>
+              <a:t>height</a:t>
             </a:r>
             <a:endParaRPr lang="de-DE" sz="500" dirty="0"/>
           </a:p>

</xml_diff>

<commit_message>
Fix for planned markers and keymap
</commit_message>
<xml_diff>
--- a/Documentation/Keymap.pptx
+++ b/Documentation/Keymap.pptx
@@ -197,7 +197,7 @@
           <a:p>
             <a:fld id="{D04F8CED-0623-C742-B972-F53D35E16E19}" type="datetimeFigureOut">
               <a:rPr lang="de-DE" smtClean="0"/>
-              <a:t>05.01.18</a:t>
+              <a:t>16.01.18</a:t>
             </a:fld>
             <a:endParaRPr lang="de-DE"/>
           </a:p>
@@ -680,7 +680,7 @@
           <a:p>
             <a:fld id="{A97692CC-6688-1145-811E-FE1ABB97A7A4}" type="datetimeFigureOut">
               <a:rPr lang="de-DE" smtClean="0"/>
-              <a:t>05.01.18</a:t>
+              <a:t>16.01.18</a:t>
             </a:fld>
             <a:endParaRPr lang="de-DE"/>
           </a:p>
@@ -845,7 +845,7 @@
           <a:p>
             <a:fld id="{A97692CC-6688-1145-811E-FE1ABB97A7A4}" type="datetimeFigureOut">
               <a:rPr lang="de-DE" smtClean="0"/>
-              <a:t>05.01.18</a:t>
+              <a:t>16.01.18</a:t>
             </a:fld>
             <a:endParaRPr lang="de-DE"/>
           </a:p>
@@ -1020,7 +1020,7 @@
           <a:p>
             <a:fld id="{A97692CC-6688-1145-811E-FE1ABB97A7A4}" type="datetimeFigureOut">
               <a:rPr lang="de-DE" smtClean="0"/>
-              <a:t>05.01.18</a:t>
+              <a:t>16.01.18</a:t>
             </a:fld>
             <a:endParaRPr lang="de-DE"/>
           </a:p>
@@ -1185,7 +1185,7 @@
           <a:p>
             <a:fld id="{A97692CC-6688-1145-811E-FE1ABB97A7A4}" type="datetimeFigureOut">
               <a:rPr lang="de-DE" smtClean="0"/>
-              <a:t>05.01.18</a:t>
+              <a:t>16.01.18</a:t>
             </a:fld>
             <a:endParaRPr lang="de-DE"/>
           </a:p>
@@ -1424,7 +1424,7 @@
           <a:p>
             <a:fld id="{A97692CC-6688-1145-811E-FE1ABB97A7A4}" type="datetimeFigureOut">
               <a:rPr lang="de-DE" smtClean="0"/>
-              <a:t>05.01.18</a:t>
+              <a:t>16.01.18</a:t>
             </a:fld>
             <a:endParaRPr lang="de-DE"/>
           </a:p>
@@ -1651,7 +1651,7 @@
           <a:p>
             <a:fld id="{A97692CC-6688-1145-811E-FE1ABB97A7A4}" type="datetimeFigureOut">
               <a:rPr lang="de-DE" smtClean="0"/>
-              <a:t>05.01.18</a:t>
+              <a:t>16.01.18</a:t>
             </a:fld>
             <a:endParaRPr lang="de-DE"/>
           </a:p>
@@ -2013,7 +2013,7 @@
           <a:p>
             <a:fld id="{A97692CC-6688-1145-811E-FE1ABB97A7A4}" type="datetimeFigureOut">
               <a:rPr lang="de-DE" smtClean="0"/>
-              <a:t>05.01.18</a:t>
+              <a:t>16.01.18</a:t>
             </a:fld>
             <a:endParaRPr lang="de-DE"/>
           </a:p>
@@ -2126,7 +2126,7 @@
           <a:p>
             <a:fld id="{A97692CC-6688-1145-811E-FE1ABB97A7A4}" type="datetimeFigureOut">
               <a:rPr lang="de-DE" smtClean="0"/>
-              <a:t>05.01.18</a:t>
+              <a:t>16.01.18</a:t>
             </a:fld>
             <a:endParaRPr lang="de-DE"/>
           </a:p>
@@ -2216,7 +2216,7 @@
           <a:p>
             <a:fld id="{A97692CC-6688-1145-811E-FE1ABB97A7A4}" type="datetimeFigureOut">
               <a:rPr lang="de-DE" smtClean="0"/>
-              <a:t>05.01.18</a:t>
+              <a:t>16.01.18</a:t>
             </a:fld>
             <a:endParaRPr lang="de-DE"/>
           </a:p>
@@ -2488,7 +2488,7 @@
           <a:p>
             <a:fld id="{A97692CC-6688-1145-811E-FE1ABB97A7A4}" type="datetimeFigureOut">
               <a:rPr lang="de-DE" smtClean="0"/>
-              <a:t>05.01.18</a:t>
+              <a:t>16.01.18</a:t>
             </a:fld>
             <a:endParaRPr lang="de-DE"/>
           </a:p>
@@ -2740,7 +2740,7 @@
           <a:p>
             <a:fld id="{A97692CC-6688-1145-811E-FE1ABB97A7A4}" type="datetimeFigureOut">
               <a:rPr lang="de-DE" smtClean="0"/>
-              <a:t>05.01.18</a:t>
+              <a:t>16.01.18</a:t>
             </a:fld>
             <a:endParaRPr lang="de-DE"/>
           </a:p>
@@ -2948,7 +2948,7 @@
           <a:p>
             <a:fld id="{A97692CC-6688-1145-811E-FE1ABB97A7A4}" type="datetimeFigureOut">
               <a:rPr lang="de-DE" smtClean="0"/>
-              <a:t>05.01.18</a:t>
+              <a:t>16.01.18</a:t>
             </a:fld>
             <a:endParaRPr lang="de-DE"/>
           </a:p>
@@ -11563,15 +11563,7 @@
                 <a:ea typeface="Helvetica Neue LT Std 67 Medium Condensed" charset="0"/>
                 <a:cs typeface="Helvetica Neue LT Std 67 Medium Condensed" charset="0"/>
               </a:rPr>
-              <a:t>Zoom </a:t>
-            </a:r>
-            <a:r>
-              <a:rPr lang="de-DE" sz="500" dirty="0" smtClean="0">
-                <a:latin typeface="Helvetica Neue LT Std 67 Medium Condensed" charset="0"/>
-                <a:ea typeface="Helvetica Neue LT Std 67 Medium Condensed" charset="0"/>
-                <a:cs typeface="Helvetica Neue LT Std 67 Medium Condensed" charset="0"/>
-              </a:rPr>
-              <a:t>in</a:t>
+              <a:t>Zoom in</a:t>
             </a:r>
             <a:br>
               <a:rPr lang="de-DE" sz="500" dirty="0" smtClean="0">
@@ -11737,15 +11729,7 @@
                 <a:ea typeface="Helvetica Neue LT Std 67 Medium Condensed" charset="0"/>
                 <a:cs typeface="Helvetica Neue LT Std 67 Medium Condensed" charset="0"/>
               </a:rPr>
-              <a:t>Zoom </a:t>
-            </a:r>
-            <a:r>
-              <a:rPr lang="de-DE" sz="500" dirty="0" smtClean="0">
-                <a:latin typeface="Helvetica Neue LT Std 67 Medium Condensed" charset="0"/>
-                <a:ea typeface="Helvetica Neue LT Std 67 Medium Condensed" charset="0"/>
-                <a:cs typeface="Helvetica Neue LT Std 67 Medium Condensed" charset="0"/>
-              </a:rPr>
-              <a:t>out</a:t>
+              <a:t>Zoom out</a:t>
             </a:r>
             <a:br>
               <a:rPr lang="de-DE" sz="500" dirty="0" smtClean="0">
@@ -17213,64 +17197,6 @@
       </p:sp>
       <p:sp>
         <p:nvSpPr>
-          <p:cNvPr id="277" name="Textfeld 276"/>
-          <p:cNvSpPr txBox="1"/>
-          <p:nvPr/>
-        </p:nvSpPr>
-        <p:spPr>
-          <a:xfrm>
-            <a:off x="4163986" y="4335308"/>
-            <a:ext cx="398899" cy="323165"/>
-          </a:xfrm>
-          <a:prstGeom prst="rect">
-            <a:avLst/>
-          </a:prstGeom>
-          <a:noFill/>
-        </p:spPr>
-        <p:txBody>
-          <a:bodyPr wrap="square" rtlCol="0" anchor="t">
-            <a:spAutoFit/>
-          </a:bodyPr>
-          <a:lstStyle/>
-          <a:p>
-            <a:pPr algn="r"/>
-            <a:r>
-              <a:rPr lang="de-DE" sz="500" dirty="0" smtClean="0">
-                <a:solidFill>
-                  <a:srgbClr val="7030A0"/>
-                </a:solidFill>
-                <a:latin typeface="Helvetica Neue LT Std 67 Medium Condensed" charset="0"/>
-                <a:ea typeface="Helvetica Neue LT Std 67 Medium Condensed" charset="0"/>
-                <a:cs typeface="Helvetica Neue LT Std 67 Medium Condensed" charset="0"/>
-              </a:rPr>
-              <a:t>Open</a:t>
-            </a:r>
-            <a:br>
-              <a:rPr lang="de-DE" sz="500" dirty="0" smtClean="0">
-                <a:solidFill>
-                  <a:srgbClr val="7030A0"/>
-                </a:solidFill>
-                <a:latin typeface="Helvetica Neue LT Std 67 Medium Condensed" charset="0"/>
-                <a:ea typeface="Helvetica Neue LT Std 67 Medium Condensed" charset="0"/>
-                <a:cs typeface="Helvetica Neue LT Std 67 Medium Condensed" charset="0"/>
-              </a:rPr>
-            </a:br>
-            <a:r>
-              <a:rPr lang="de-DE" sz="500" dirty="0" smtClean="0">
-                <a:solidFill>
-                  <a:srgbClr val="7030A0"/>
-                </a:solidFill>
-                <a:latin typeface="Helvetica Neue LT Std 67 Medium Condensed" charset="0"/>
-                <a:ea typeface="Helvetica Neue LT Std 67 Medium Condensed" charset="0"/>
-                <a:cs typeface="Helvetica Neue LT Std 67 Medium Condensed" charset="0"/>
-              </a:rPr>
-              <a:t>Project Folder</a:t>
-            </a:r>
-          </a:p>
-        </p:txBody>
-      </p:sp>
-      <p:sp>
-        <p:nvSpPr>
           <p:cNvPr id="278" name="Rechteck 277"/>
           <p:cNvSpPr/>
           <p:nvPr/>
@@ -17358,7 +17284,7 @@
         </p:nvSpPr>
         <p:spPr>
           <a:xfrm>
-            <a:off x="3974606" y="4302565"/>
+            <a:off x="4005812" y="4450176"/>
             <a:ext cx="325730" cy="261610"/>
           </a:xfrm>
           <a:prstGeom prst="rect">
@@ -21228,46 +21154,6 @@
       </p:sp>
       <p:sp>
         <p:nvSpPr>
-          <p:cNvPr id="353" name="Rechteck 352"/>
-          <p:cNvSpPr/>
-          <p:nvPr/>
-        </p:nvSpPr>
-        <p:spPr>
-          <a:xfrm>
-            <a:off x="4163585" y="4325295"/>
-            <a:ext cx="261610" cy="184666"/>
-          </a:xfrm>
-          <a:prstGeom prst="rect">
-            <a:avLst/>
-          </a:prstGeom>
-        </p:spPr>
-        <p:txBody>
-          <a:bodyPr wrap="none">
-            <a:spAutoFit/>
-          </a:bodyPr>
-          <a:lstStyle/>
-          <a:p>
-            <a:r>
-              <a:rPr lang="de-DE" sz="600" b="1" dirty="0" smtClean="0">
-                <a:solidFill>
-                  <a:srgbClr val="7030A0"/>
-                </a:solidFill>
-                <a:latin typeface="Helvetica Neue LT Std 67 Medium Condensed" charset="0"/>
-                <a:ea typeface="Helvetica Neue LT Std 67 Medium Condensed" charset="0"/>
-                <a:cs typeface="Helvetica Neue LT Std 67 Medium Condensed" charset="0"/>
-              </a:rPr>
-              <a:t>⌘</a:t>
-            </a:r>
-            <a:endParaRPr lang="de-DE" sz="4000" b="1" dirty="0">
-              <a:solidFill>
-                <a:srgbClr val="7030A0"/>
-              </a:solidFill>
-            </a:endParaRPr>
-          </a:p>
-        </p:txBody>
-      </p:sp>
-      <p:sp>
-        <p:nvSpPr>
           <p:cNvPr id="357" name="Textfeld 356"/>
           <p:cNvSpPr txBox="1"/>
           <p:nvPr/>
@@ -21895,6 +21781,196 @@
             <a:endParaRPr lang="de-DE" sz="500" dirty="0">
               <a:solidFill>
                 <a:schemeClr val="accent6">
+                  <a:lumMod val="75000"/>
+                </a:schemeClr>
+              </a:solidFill>
+              <a:latin typeface="Helvetica Neue LT Std 67 Medium Condensed" charset="0"/>
+              <a:ea typeface="Helvetica Neue LT Std 67 Medium Condensed" charset="0"/>
+              <a:cs typeface="Helvetica Neue LT Std 67 Medium Condensed" charset="0"/>
+            </a:endParaRPr>
+          </a:p>
+        </p:txBody>
+      </p:sp>
+      <p:sp>
+        <p:nvSpPr>
+          <p:cNvPr id="367" name="Rechteck 366"/>
+          <p:cNvSpPr/>
+          <p:nvPr/>
+        </p:nvSpPr>
+        <p:spPr>
+          <a:xfrm>
+            <a:off x="4174250" y="4541108"/>
+            <a:ext cx="385105" cy="284693"/>
+          </a:xfrm>
+          <a:prstGeom prst="rect">
+            <a:avLst/>
+          </a:prstGeom>
+        </p:spPr>
+        <p:txBody>
+          <a:bodyPr wrap="none">
+            <a:spAutoFit/>
+          </a:bodyPr>
+          <a:lstStyle/>
+          <a:p>
+            <a:pPr algn="r">
+              <a:lnSpc>
+                <a:spcPts val="500"/>
+              </a:lnSpc>
+            </a:pPr>
+            <a:r>
+              <a:rPr lang="de-DE" sz="500" dirty="0">
+                <a:solidFill>
+                  <a:schemeClr val="accent6">
+                    <a:lumMod val="75000"/>
+                  </a:schemeClr>
+                </a:solidFill>
+                <a:latin typeface="Helvetica Neue LT Std 67 Medium Condensed" charset="0"/>
+                <a:ea typeface="Helvetica Neue LT Std 67 Medium Condensed" charset="0"/>
+                <a:cs typeface="Helvetica Neue LT Std 67 Medium Condensed" charset="0"/>
+              </a:rPr>
+              <a:t>⌥ </a:t>
+            </a:r>
+            <a:r>
+              <a:rPr lang="de-DE" sz="500" dirty="0" smtClean="0">
+                <a:solidFill>
+                  <a:schemeClr val="accent6">
+                    <a:lumMod val="75000"/>
+                  </a:schemeClr>
+                </a:solidFill>
+                <a:latin typeface="Helvetica Neue LT Std 67 Medium Condensed" charset="0"/>
+                <a:ea typeface="Helvetica Neue LT Std 67 Medium Condensed" charset="0"/>
+                <a:cs typeface="Helvetica Neue LT Std 67 Medium Condensed" charset="0"/>
+              </a:rPr>
+              <a:t>Open</a:t>
+            </a:r>
+            <a:br>
+              <a:rPr lang="de-DE" sz="500" dirty="0" smtClean="0">
+                <a:solidFill>
+                  <a:schemeClr val="accent6">
+                    <a:lumMod val="75000"/>
+                  </a:schemeClr>
+                </a:solidFill>
+                <a:latin typeface="Helvetica Neue LT Std 67 Medium Condensed" charset="0"/>
+                <a:ea typeface="Helvetica Neue LT Std 67 Medium Condensed" charset="0"/>
+                <a:cs typeface="Helvetica Neue LT Std 67 Medium Condensed" charset="0"/>
+              </a:rPr>
+            </a:br>
+            <a:r>
+              <a:rPr lang="de-DE" sz="500" dirty="0" smtClean="0">
+                <a:solidFill>
+                  <a:schemeClr val="accent6">
+                    <a:lumMod val="75000"/>
+                  </a:schemeClr>
+                </a:solidFill>
+                <a:latin typeface="Helvetica Neue LT Std 67 Medium Condensed" charset="0"/>
+                <a:ea typeface="Helvetica Neue LT Std 67 Medium Condensed" charset="0"/>
+                <a:cs typeface="Helvetica Neue LT Std 67 Medium Condensed" charset="0"/>
+              </a:rPr>
+              <a:t>Project</a:t>
+            </a:r>
+            <a:br>
+              <a:rPr lang="de-DE" sz="500" dirty="0" smtClean="0">
+                <a:solidFill>
+                  <a:schemeClr val="accent6">
+                    <a:lumMod val="75000"/>
+                  </a:schemeClr>
+                </a:solidFill>
+                <a:latin typeface="Helvetica Neue LT Std 67 Medium Condensed" charset="0"/>
+                <a:ea typeface="Helvetica Neue LT Std 67 Medium Condensed" charset="0"/>
+                <a:cs typeface="Helvetica Neue LT Std 67 Medium Condensed" charset="0"/>
+              </a:rPr>
+            </a:br>
+            <a:r>
+              <a:rPr lang="de-DE" sz="500" dirty="0" smtClean="0">
+                <a:solidFill>
+                  <a:schemeClr val="accent6">
+                    <a:lumMod val="75000"/>
+                  </a:schemeClr>
+                </a:solidFill>
+                <a:latin typeface="Helvetica Neue LT Std 67 Medium Condensed" charset="0"/>
+                <a:ea typeface="Helvetica Neue LT Std 67 Medium Condensed" charset="0"/>
+                <a:cs typeface="Helvetica Neue LT Std 67 Medium Condensed" charset="0"/>
+              </a:rPr>
+              <a:t>Folder</a:t>
+            </a:r>
+            <a:endParaRPr lang="de-DE" sz="500" dirty="0">
+              <a:solidFill>
+                <a:schemeClr val="accent6">
+                  <a:lumMod val="75000"/>
+                </a:schemeClr>
+              </a:solidFill>
+              <a:latin typeface="Helvetica Neue LT Std 67 Medium Condensed" charset="0"/>
+              <a:ea typeface="Helvetica Neue LT Std 67 Medium Condensed" charset="0"/>
+              <a:cs typeface="Helvetica Neue LT Std 67 Medium Condensed" charset="0"/>
+            </a:endParaRPr>
+          </a:p>
+        </p:txBody>
+      </p:sp>
+      <p:sp>
+        <p:nvSpPr>
+          <p:cNvPr id="368" name="Textfeld 367"/>
+          <p:cNvSpPr txBox="1"/>
+          <p:nvPr/>
+        </p:nvSpPr>
+        <p:spPr>
+          <a:xfrm>
+            <a:off x="4000668" y="4342236"/>
+            <a:ext cx="563170" cy="246221"/>
+          </a:xfrm>
+          <a:prstGeom prst="rect">
+            <a:avLst/>
+          </a:prstGeom>
+          <a:noFill/>
+        </p:spPr>
+        <p:txBody>
+          <a:bodyPr wrap="square" rtlCol="0" anchor="t">
+            <a:spAutoFit/>
+          </a:bodyPr>
+          <a:lstStyle/>
+          <a:p>
+            <a:pPr algn="r"/>
+            <a:r>
+              <a:rPr lang="de-DE" sz="500" dirty="0" smtClean="0">
+                <a:latin typeface="Helvetica Neue LT Std 67 Medium Condensed" charset="0"/>
+                <a:ea typeface="Helvetica Neue LT Std 67 Medium Condensed" charset="0"/>
+                <a:cs typeface="Helvetica Neue LT Std 67 Medium Condensed" charset="0"/>
+              </a:rPr>
+              <a:t>Set </a:t>
+            </a:r>
+            <a:r>
+              <a:rPr lang="de-DE" sz="500" dirty="0" err="1" smtClean="0">
+                <a:latin typeface="Helvetica Neue LT Std 67 Medium Condensed" charset="0"/>
+                <a:ea typeface="Helvetica Neue LT Std 67 Medium Condensed" charset="0"/>
+                <a:cs typeface="Helvetica Neue LT Std 67 Medium Condensed" charset="0"/>
+              </a:rPr>
+              <a:t>Planned</a:t>
+            </a:r>
+            <a:r>
+              <a:rPr lang="de-DE" sz="500" dirty="0" smtClean="0">
+                <a:latin typeface="Helvetica Neue LT Std 67 Medium Condensed" charset="0"/>
+                <a:ea typeface="Helvetica Neue LT Std 67 Medium Condensed" charset="0"/>
+                <a:cs typeface="Helvetica Neue LT Std 67 Medium Condensed" charset="0"/>
+              </a:rPr>
+              <a:t/>
+            </a:r>
+            <a:br>
+              <a:rPr lang="de-DE" sz="500" dirty="0" smtClean="0">
+                <a:latin typeface="Helvetica Neue LT Std 67 Medium Condensed" charset="0"/>
+                <a:ea typeface="Helvetica Neue LT Std 67 Medium Condensed" charset="0"/>
+                <a:cs typeface="Helvetica Neue LT Std 67 Medium Condensed" charset="0"/>
+              </a:rPr>
+            </a:br>
+            <a:r>
+              <a:rPr lang="de-DE" sz="500" dirty="0" smtClean="0">
+                <a:latin typeface="Helvetica Neue LT Std 67 Medium Condensed" charset="0"/>
+                <a:ea typeface="Helvetica Neue LT Std 67 Medium Condensed" charset="0"/>
+                <a:cs typeface="Helvetica Neue LT Std 67 Medium Condensed" charset="0"/>
+              </a:rPr>
+              <a:t>Marker</a:t>
+            </a:r>
+            <a:endParaRPr lang="de-DE" sz="500" dirty="0" smtClean="0">
+              <a:solidFill>
+                <a:schemeClr val="accent2">
                   <a:lumMod val="75000"/>
                 </a:schemeClr>
               </a:solidFill>

</xml_diff>